<commit_message>
Other: do something with the show ppt
</commit_message>
<xml_diff>
--- a/Doc/迭代一/Gitmining迭代一项目演示.pptx
+++ b/Doc/迭代一/Gitmining迭代一项目演示.pptx
@@ -3,26 +3,26 @@
 <p:presentation xmlns:a="http://schemas.openxmlformats.org/drawingml/2006/main" xmlns:r="http://schemas.openxmlformats.org/officeDocument/2006/relationships" xmlns:p="http://schemas.openxmlformats.org/presentationml/2006/main" removePersonalInfoOnSave="1" saveSubsetFonts="1">
   <p:sldMasterIdLst>
     <p:sldMasterId id="2147483648" r:id="rId1"/>
-    <p:sldMasterId id="2147483660" r:id="rId3"/>
+    <p:sldMasterId id="2147483660" r:id="rId2"/>
   </p:sldMasterIdLst>
   <p:notesMasterIdLst>
-    <p:notesMasterId r:id="rId15"/>
+    <p:notesMasterId r:id="rId14"/>
   </p:notesMasterIdLst>
   <p:handoutMasterIdLst>
-    <p:handoutMasterId r:id="rId16"/>
+    <p:handoutMasterId r:id="rId15"/>
   </p:handoutMasterIdLst>
   <p:sldIdLst>
-    <p:sldId id="267" r:id="rId4"/>
-    <p:sldId id="257" r:id="rId5"/>
-    <p:sldId id="258" r:id="rId6"/>
-    <p:sldId id="259" r:id="rId7"/>
-    <p:sldId id="260" r:id="rId8"/>
-    <p:sldId id="261" r:id="rId9"/>
-    <p:sldId id="264" r:id="rId10"/>
-    <p:sldId id="262" r:id="rId11"/>
-    <p:sldId id="263" r:id="rId12"/>
-    <p:sldId id="265" r:id="rId13"/>
-    <p:sldId id="266" r:id="rId14"/>
+    <p:sldId id="267" r:id="rId3"/>
+    <p:sldId id="257" r:id="rId4"/>
+    <p:sldId id="258" r:id="rId5"/>
+    <p:sldId id="259" r:id="rId6"/>
+    <p:sldId id="260" r:id="rId7"/>
+    <p:sldId id="261" r:id="rId8"/>
+    <p:sldId id="264" r:id="rId9"/>
+    <p:sldId id="262" r:id="rId10"/>
+    <p:sldId id="263" r:id="rId11"/>
+    <p:sldId id="265" r:id="rId12"/>
+    <p:sldId id="266" r:id="rId13"/>
   </p:sldIdLst>
   <p:sldSz cx="12192000" cy="6858000"/>
   <p:notesSz cx="6858000" cy="9144000"/>
@@ -121,6 +121,25 @@
       </a:defRPr>
     </a:lvl9pPr>
   </p:defaultTextStyle>
+  <p:extLst>
+    <p:ext uri="{EFAFB233-063F-42B5-8137-9DF3F51BA10A}">
+      <p15:sldGuideLst xmlns:p15="http://schemas.microsoft.com/office/powerpoint/2012/main">
+        <p15:guide id="1" orient="horz" pos="2160">
+          <p15:clr>
+            <a:srgbClr val="A4A3A4"/>
+          </p15:clr>
+        </p15:guide>
+        <p15:guide id="2" pos="3840">
+          <p15:clr>
+            <a:srgbClr val="A4A3A4"/>
+          </p15:clr>
+        </p15:guide>
+      </p15:sldGuideLst>
+    </p:ext>
+    <p:ext uri="{2D200454-40CA-4A62-9FC3-DE9A4176ACB9}">
+      <p15:notesGuideLst xmlns:p15="http://schemas.microsoft.com/office/powerpoint/2012/main"/>
+    </p:ext>
+  </p:extLst>
 </p:presentation>
 </file>
 
@@ -5631,6 +5650,13 @@
     <dgm:pt modelId="{29EADAFA-A450-43D7-B01E-E9E5E8FE7373}" type="pres">
       <dgm:prSet presAssocID="{802306BC-46CC-4081-A261-E7EEFCA13485}" presName="Name13" presStyleLbl="parChTrans1D2" presStyleIdx="1" presStyleCnt="4"/>
       <dgm:spPr/>
+      <dgm:t>
+        <a:bodyPr/>
+        <a:lstStyle/>
+        <a:p>
+          <a:endParaRPr lang="zh-CN" altLang="en-US"/>
+        </a:p>
+      </dgm:t>
     </dgm:pt>
     <dgm:pt modelId="{DB910009-D45F-4D57-B10A-934EC3E5E24F}" type="pres">
       <dgm:prSet presAssocID="{67671F9F-603C-4FE3-BD46-B3A2CD2E4619}" presName="childText" presStyleLbl="bgAcc1" presStyleIdx="1" presStyleCnt="4">
@@ -5710,6 +5736,13 @@
     <dgm:pt modelId="{EA8D7378-E222-4C55-A033-43249730ED27}" type="pres">
       <dgm:prSet presAssocID="{5A8BE835-1C72-4A7E-9115-089F248EF402}" presName="Name13" presStyleLbl="parChTrans1D2" presStyleIdx="3" presStyleCnt="4"/>
       <dgm:spPr/>
+      <dgm:t>
+        <a:bodyPr/>
+        <a:lstStyle/>
+        <a:p>
+          <a:endParaRPr lang="zh-CN" altLang="en-US"/>
+        </a:p>
+      </dgm:t>
     </dgm:pt>
     <dgm:pt modelId="{6D8E477D-924C-473C-91AC-6D2B9553E33C}" type="pres">
       <dgm:prSet presAssocID="{F26FB52D-33DC-4D46-BD76-AD8685C51DC5}" presName="childText" presStyleLbl="bgAcc1" presStyleIdx="3" presStyleCnt="4">
@@ -5728,25 +5761,25 @@
     </dgm:pt>
   </dgm:ptLst>
   <dgm:cxnLst>
-    <dgm:cxn modelId="{03772AAD-C9E5-4645-B88C-E278AD1163DF}" type="presOf" srcId="{839ACD05-9C12-412F-A2D5-CF1591CAE56C}" destId="{3FA6329C-A2A8-46C6-B223-4CD29890A57A}" srcOrd="1" destOrd="0" presId="urn:microsoft.com/office/officeart/2005/8/layout/hierarchy3"/>
-    <dgm:cxn modelId="{777DC5C0-1206-40DF-BE44-749C11A74B8D}" type="presOf" srcId="{D34E00D3-ECBA-46A5-8A33-7A57246CEA95}" destId="{F52D0DAB-881A-4D0F-8B43-D55C8E2431B0}" srcOrd="1" destOrd="0" presId="urn:microsoft.com/office/officeart/2005/8/layout/hierarchy3"/>
-    <dgm:cxn modelId="{355DFBEA-F543-4849-B4E9-513216B7A28B}" type="presOf" srcId="{1E87AF89-1015-45BB-B7EE-D8931EB740BF}" destId="{50E8D4B1-746A-4046-A8DB-25F9F3B04F5A}" srcOrd="0" destOrd="0" presId="urn:microsoft.com/office/officeart/2005/8/layout/hierarchy3"/>
-    <dgm:cxn modelId="{E8756D59-BF13-4415-B0BA-BB10818E41CF}" type="presOf" srcId="{67671F9F-603C-4FE3-BD46-B3A2CD2E4619}" destId="{DB910009-D45F-4D57-B10A-934EC3E5E24F}" srcOrd="0" destOrd="0" presId="urn:microsoft.com/office/officeart/2005/8/layout/hierarchy3"/>
-    <dgm:cxn modelId="{0F37DD3B-F0D5-498C-A56E-758683C4C476}" type="presOf" srcId="{F26FB52D-33DC-4D46-BD76-AD8685C51DC5}" destId="{6D8E477D-924C-473C-91AC-6D2B9553E33C}" srcOrd="0" destOrd="0" presId="urn:microsoft.com/office/officeart/2005/8/layout/hierarchy3"/>
+    <dgm:cxn modelId="{1397DD4C-51BF-45EF-B2A5-6D661495470E}" type="presOf" srcId="{0E383264-623F-4952-B60D-5FC424EB6CA7}" destId="{3C188B19-A77B-44CF-B678-8A70AEC38B1D}" srcOrd="0" destOrd="0" presId="urn:microsoft.com/office/officeart/2005/8/layout/hierarchy3"/>
+    <dgm:cxn modelId="{DA7B02E0-E5A6-4645-A0C6-A0EAEB325C22}" srcId="{C6F8BADE-A621-4E19-8423-5F344DEED120}" destId="{839ACD05-9C12-412F-A2D5-CF1591CAE56C}" srcOrd="1" destOrd="0" parTransId="{90515C67-D541-4EE7-9AD3-9361CE4CE5E6}" sibTransId="{3E965261-66F8-4955-974C-C648540D9A5B}"/>
+    <dgm:cxn modelId="{E964962E-7034-4B54-AB2B-023F93CC43E2}" srcId="{839ACD05-9C12-412F-A2D5-CF1591CAE56C}" destId="{CAB7B91D-86E4-4CC4-9BF8-263F9E3FD77E}" srcOrd="0" destOrd="0" parTransId="{1E87AF89-1015-45BB-B7EE-D8931EB740BF}" sibTransId="{B7C01FD1-E648-48FD-882D-F6F52848FB7F}"/>
+    <dgm:cxn modelId="{A5DC85C1-6335-4555-B6E8-C37FC3EA38BF}" type="presOf" srcId="{CAB7B91D-86E4-4CC4-9BF8-263F9E3FD77E}" destId="{C1EC1154-0E49-4B37-B380-D6FF7D72E727}" srcOrd="0" destOrd="0" presId="urn:microsoft.com/office/officeart/2005/8/layout/hierarchy3"/>
     <dgm:cxn modelId="{02AEFA28-4ADD-4B06-8EB6-EC2E45AC6D31}" srcId="{839ACD05-9C12-412F-A2D5-CF1591CAE56C}" destId="{F26FB52D-33DC-4D46-BD76-AD8685C51DC5}" srcOrd="1" destOrd="0" parTransId="{5A8BE835-1C72-4A7E-9115-089F248EF402}" sibTransId="{15CBF95D-F2AC-4F0F-9A94-49A56BB6C0D8}"/>
     <dgm:cxn modelId="{F56CAF26-70D1-4D5E-B35B-7DC89A0C6B2D}" srcId="{D34E00D3-ECBA-46A5-8A33-7A57246CEA95}" destId="{8C6798E6-3F36-4315-B879-415E9C4A9983}" srcOrd="0" destOrd="0" parTransId="{0E383264-623F-4952-B60D-5FC424EB6CA7}" sibTransId="{8FA0E11E-7DF8-48EA-8138-24C0E7732B76}"/>
+    <dgm:cxn modelId="{0F37DD3B-F0D5-498C-A56E-758683C4C476}" type="presOf" srcId="{F26FB52D-33DC-4D46-BD76-AD8685C51DC5}" destId="{6D8E477D-924C-473C-91AC-6D2B9553E33C}" srcOrd="0" destOrd="0" presId="urn:microsoft.com/office/officeart/2005/8/layout/hierarchy3"/>
+    <dgm:cxn modelId="{649EBD5C-8601-466A-9E9A-2C79FD4CE0D3}" type="presOf" srcId="{839ACD05-9C12-412F-A2D5-CF1591CAE56C}" destId="{85CF7BFC-8460-4C1E-9911-E5A9544357DB}" srcOrd="0" destOrd="0" presId="urn:microsoft.com/office/officeart/2005/8/layout/hierarchy3"/>
+    <dgm:cxn modelId="{D72D476F-E314-471A-ABED-F6A86C821FF5}" type="presOf" srcId="{802306BC-46CC-4081-A261-E7EEFCA13485}" destId="{29EADAFA-A450-43D7-B01E-E9E5E8FE7373}" srcOrd="0" destOrd="0" presId="urn:microsoft.com/office/officeart/2005/8/layout/hierarchy3"/>
+    <dgm:cxn modelId="{BA33BEDF-EAD6-4515-8ED1-2F08781AD162}" type="presOf" srcId="{5A8BE835-1C72-4A7E-9115-089F248EF402}" destId="{EA8D7378-E222-4C55-A033-43249730ED27}" srcOrd="0" destOrd="0" presId="urn:microsoft.com/office/officeart/2005/8/layout/hierarchy3"/>
     <dgm:cxn modelId="{625F567D-E947-4479-AE1D-D8E1CCCF6343}" type="presOf" srcId="{8C6798E6-3F36-4315-B879-415E9C4A9983}" destId="{946B726D-8ECD-4AA5-A32C-F8DDEA344C30}" srcOrd="0" destOrd="0" presId="urn:microsoft.com/office/officeart/2005/8/layout/hierarchy3"/>
-    <dgm:cxn modelId="{1397DD4C-51BF-45EF-B2A5-6D661495470E}" type="presOf" srcId="{0E383264-623F-4952-B60D-5FC424EB6CA7}" destId="{3C188B19-A77B-44CF-B678-8A70AEC38B1D}" srcOrd="0" destOrd="0" presId="urn:microsoft.com/office/officeart/2005/8/layout/hierarchy3"/>
-    <dgm:cxn modelId="{BA33BEDF-EAD6-4515-8ED1-2F08781AD162}" type="presOf" srcId="{5A8BE835-1C72-4A7E-9115-089F248EF402}" destId="{EA8D7378-E222-4C55-A033-43249730ED27}" srcOrd="0" destOrd="0" presId="urn:microsoft.com/office/officeart/2005/8/layout/hierarchy3"/>
-    <dgm:cxn modelId="{649EBD5C-8601-466A-9E9A-2C79FD4CE0D3}" type="presOf" srcId="{839ACD05-9C12-412F-A2D5-CF1591CAE56C}" destId="{85CF7BFC-8460-4C1E-9911-E5A9544357DB}" srcOrd="0" destOrd="0" presId="urn:microsoft.com/office/officeart/2005/8/layout/hierarchy3"/>
+    <dgm:cxn modelId="{355DFBEA-F543-4849-B4E9-513216B7A28B}" type="presOf" srcId="{1E87AF89-1015-45BB-B7EE-D8931EB740BF}" destId="{50E8D4B1-746A-4046-A8DB-25F9F3B04F5A}" srcOrd="0" destOrd="0" presId="urn:microsoft.com/office/officeart/2005/8/layout/hierarchy3"/>
+    <dgm:cxn modelId="{419F8E14-F2EB-42E9-BD1C-E5DB8163E109}" type="presOf" srcId="{C6F8BADE-A621-4E19-8423-5F344DEED120}" destId="{13803739-73CE-435F-A5A2-E509FD44435D}" srcOrd="0" destOrd="0" presId="urn:microsoft.com/office/officeart/2005/8/layout/hierarchy3"/>
+    <dgm:cxn modelId="{03772AAD-C9E5-4645-B88C-E278AD1163DF}" type="presOf" srcId="{839ACD05-9C12-412F-A2D5-CF1591CAE56C}" destId="{3FA6329C-A2A8-46C6-B223-4CD29890A57A}" srcOrd="1" destOrd="0" presId="urn:microsoft.com/office/officeart/2005/8/layout/hierarchy3"/>
     <dgm:cxn modelId="{2C5A9AC8-603D-4000-B446-CCE41E76C5A3}" type="presOf" srcId="{D34E00D3-ECBA-46A5-8A33-7A57246CEA95}" destId="{EEA4795B-68FF-49EA-BCED-5D1412A26292}" srcOrd="0" destOrd="0" presId="urn:microsoft.com/office/officeart/2005/8/layout/hierarchy3"/>
-    <dgm:cxn modelId="{D72D476F-E314-471A-ABED-F6A86C821FF5}" type="presOf" srcId="{802306BC-46CC-4081-A261-E7EEFCA13485}" destId="{29EADAFA-A450-43D7-B01E-E9E5E8FE7373}" srcOrd="0" destOrd="0" presId="urn:microsoft.com/office/officeart/2005/8/layout/hierarchy3"/>
+    <dgm:cxn modelId="{E8756D59-BF13-4415-B0BA-BB10818E41CF}" type="presOf" srcId="{67671F9F-603C-4FE3-BD46-B3A2CD2E4619}" destId="{DB910009-D45F-4D57-B10A-934EC3E5E24F}" srcOrd="0" destOrd="0" presId="urn:microsoft.com/office/officeart/2005/8/layout/hierarchy3"/>
+    <dgm:cxn modelId="{777DC5C0-1206-40DF-BE44-749C11A74B8D}" type="presOf" srcId="{D34E00D3-ECBA-46A5-8A33-7A57246CEA95}" destId="{F52D0DAB-881A-4D0F-8B43-D55C8E2431B0}" srcOrd="1" destOrd="0" presId="urn:microsoft.com/office/officeart/2005/8/layout/hierarchy3"/>
+    <dgm:cxn modelId="{45DA777D-DD40-4649-BE27-AF4492946135}" srcId="{D34E00D3-ECBA-46A5-8A33-7A57246CEA95}" destId="{67671F9F-603C-4FE3-BD46-B3A2CD2E4619}" srcOrd="1" destOrd="0" parTransId="{802306BC-46CC-4081-A261-E7EEFCA13485}" sibTransId="{0149F9B4-91FB-4386-8BBF-B28A8CFF2AA2}"/>
     <dgm:cxn modelId="{236CF7A3-078A-4B89-94F1-F24C051CF58E}" srcId="{C6F8BADE-A621-4E19-8423-5F344DEED120}" destId="{D34E00D3-ECBA-46A5-8A33-7A57246CEA95}" srcOrd="0" destOrd="0" parTransId="{2DA7A531-80B1-4010-AF98-E0E0DD023027}" sibTransId="{73343882-CF80-42E6-B48E-01FB4D953BC2}"/>
-    <dgm:cxn modelId="{45DA777D-DD40-4649-BE27-AF4492946135}" srcId="{D34E00D3-ECBA-46A5-8A33-7A57246CEA95}" destId="{67671F9F-603C-4FE3-BD46-B3A2CD2E4619}" srcOrd="1" destOrd="0" parTransId="{802306BC-46CC-4081-A261-E7EEFCA13485}" sibTransId="{0149F9B4-91FB-4386-8BBF-B28A8CFF2AA2}"/>
-    <dgm:cxn modelId="{E964962E-7034-4B54-AB2B-023F93CC43E2}" srcId="{839ACD05-9C12-412F-A2D5-CF1591CAE56C}" destId="{CAB7B91D-86E4-4CC4-9BF8-263F9E3FD77E}" srcOrd="0" destOrd="0" parTransId="{1E87AF89-1015-45BB-B7EE-D8931EB740BF}" sibTransId="{B7C01FD1-E648-48FD-882D-F6F52848FB7F}"/>
-    <dgm:cxn modelId="{A5DC85C1-6335-4555-B6E8-C37FC3EA38BF}" type="presOf" srcId="{CAB7B91D-86E4-4CC4-9BF8-263F9E3FD77E}" destId="{C1EC1154-0E49-4B37-B380-D6FF7D72E727}" srcOrd="0" destOrd="0" presId="urn:microsoft.com/office/officeart/2005/8/layout/hierarchy3"/>
-    <dgm:cxn modelId="{DA7B02E0-E5A6-4645-A0C6-A0EAEB325C22}" srcId="{C6F8BADE-A621-4E19-8423-5F344DEED120}" destId="{839ACD05-9C12-412F-A2D5-CF1591CAE56C}" srcOrd="1" destOrd="0" parTransId="{90515C67-D541-4EE7-9AD3-9361CE4CE5E6}" sibTransId="{3E965261-66F8-4955-974C-C648540D9A5B}"/>
-    <dgm:cxn modelId="{419F8E14-F2EB-42E9-BD1C-E5DB8163E109}" type="presOf" srcId="{C6F8BADE-A621-4E19-8423-5F344DEED120}" destId="{13803739-73CE-435F-A5A2-E509FD44435D}" srcOrd="0" destOrd="0" presId="urn:microsoft.com/office/officeart/2005/8/layout/hierarchy3"/>
     <dgm:cxn modelId="{30CB999D-0B76-4122-BFE1-0DAE67781804}" type="presParOf" srcId="{13803739-73CE-435F-A5A2-E509FD44435D}" destId="{1F00E9D8-0D7B-49EC-A09A-205CF5D86DFE}" srcOrd="0" destOrd="0" presId="urn:microsoft.com/office/officeart/2005/8/layout/hierarchy3"/>
     <dgm:cxn modelId="{C4BDC73A-7C40-46B7-90F9-C61B175830C7}" type="presParOf" srcId="{1F00E9D8-0D7B-49EC-A09A-205CF5D86DFE}" destId="{A62FBD41-69A6-46AE-9B69-DDEAE8694E1C}" srcOrd="0" destOrd="0" presId="urn:microsoft.com/office/officeart/2005/8/layout/hierarchy3"/>
     <dgm:cxn modelId="{B8CD4D72-76F2-41B4-B489-CE640A70EE29}" type="presParOf" srcId="{A62FBD41-69A6-46AE-9B69-DDEAE8694E1C}" destId="{EEA4795B-68FF-49EA-BCED-5D1412A26292}" srcOrd="0" destOrd="0" presId="urn:microsoft.com/office/officeart/2005/8/layout/hierarchy3"/>
@@ -6156,6 +6189,13 @@
         </dgm:presLayoutVars>
       </dgm:prSet>
       <dgm:spPr/>
+      <dgm:t>
+        <a:bodyPr/>
+        <a:lstStyle/>
+        <a:p>
+          <a:endParaRPr lang="zh-CN" altLang="en-US"/>
+        </a:p>
+      </dgm:t>
     </dgm:pt>
     <dgm:pt modelId="{78867893-85E0-4E6F-A3D8-B121D9E28AD4}" type="pres">
       <dgm:prSet presAssocID="{C1D198DF-77D6-48B0-BDE3-5CC72D9CF8D9}" presName="linNode" presStyleCnt="0"/>
@@ -6169,6 +6209,13 @@
         </dgm:presLayoutVars>
       </dgm:prSet>
       <dgm:spPr/>
+      <dgm:t>
+        <a:bodyPr/>
+        <a:lstStyle/>
+        <a:p>
+          <a:endParaRPr lang="zh-CN" altLang="en-US"/>
+        </a:p>
+      </dgm:t>
     </dgm:pt>
     <dgm:pt modelId="{001E576D-89BD-4763-9AC5-31DE0BF1A2B0}" type="pres">
       <dgm:prSet presAssocID="{C1D198DF-77D6-48B0-BDE3-5CC72D9CF8D9}" presName="descendantText" presStyleLbl="alignAccFollowNode1" presStyleIdx="0" presStyleCnt="3">
@@ -6201,6 +6248,13 @@
         </dgm:presLayoutVars>
       </dgm:prSet>
       <dgm:spPr/>
+      <dgm:t>
+        <a:bodyPr/>
+        <a:lstStyle/>
+        <a:p>
+          <a:endParaRPr lang="zh-CN" altLang="en-US"/>
+        </a:p>
+      </dgm:t>
     </dgm:pt>
     <dgm:pt modelId="{399F7127-3C1C-4E31-823E-71ADC3A6F5C0}" type="pres">
       <dgm:prSet presAssocID="{A9255373-6B2B-4354-A72B-20BAA9579A07}" presName="descendantText" presStyleLbl="alignAccFollowNode1" presStyleIdx="1" presStyleCnt="3">
@@ -6233,6 +6287,13 @@
         </dgm:presLayoutVars>
       </dgm:prSet>
       <dgm:spPr/>
+      <dgm:t>
+        <a:bodyPr/>
+        <a:lstStyle/>
+        <a:p>
+          <a:endParaRPr lang="zh-CN" altLang="en-US"/>
+        </a:p>
+      </dgm:t>
     </dgm:pt>
     <dgm:pt modelId="{9268D53B-2568-42FC-AB01-1D13BD7AB530}" type="pres">
       <dgm:prSet presAssocID="{F4D35594-A8E5-40CE-B87F-4AD0B9351291}" presName="descendantText" presStyleLbl="alignAccFollowNode1" presStyleIdx="2" presStyleCnt="3">
@@ -6241,28 +6302,35 @@
         </dgm:presLayoutVars>
       </dgm:prSet>
       <dgm:spPr/>
+      <dgm:t>
+        <a:bodyPr/>
+        <a:lstStyle/>
+        <a:p>
+          <a:endParaRPr lang="zh-CN" altLang="en-US"/>
+        </a:p>
+      </dgm:t>
     </dgm:pt>
   </dgm:ptLst>
   <dgm:cxnLst>
-    <dgm:cxn modelId="{19B6108A-80FA-41A1-8883-E51A9599AE9F}" srcId="{A9255373-6B2B-4354-A72B-20BAA9579A07}" destId="{2DA01002-C980-4A22-82F8-B7217EC2A1C1}" srcOrd="2" destOrd="0" parTransId="{E9F4067C-F94E-443B-A8A8-A794A6E90E50}" sibTransId="{A111CC83-EF37-46B4-A03D-24547221FAE8}"/>
-    <dgm:cxn modelId="{5263FF42-E268-4DB7-9087-9AFE9DEB3F2F}" srcId="{A9255373-6B2B-4354-A72B-20BAA9579A07}" destId="{9DD5910B-D53F-44E2-9A4A-06B08B28BB8C}" srcOrd="0" destOrd="0" parTransId="{528A44A4-BEC5-4271-B9D5-7C57BB5BB0AA}" sibTransId="{F56CFF0F-1DD0-4F20-B424-1AFC9A4C60CC}"/>
-    <dgm:cxn modelId="{755B4ECD-BCA0-43E9-8BB2-626C496043B7}" type="presOf" srcId="{9DD5910B-D53F-44E2-9A4A-06B08B28BB8C}" destId="{399F7127-3C1C-4E31-823E-71ADC3A6F5C0}" srcOrd="0" destOrd="0" presId="urn:microsoft.com/office/officeart/2005/8/layout/vList5"/>
+    <dgm:cxn modelId="{9BE7A485-36B8-4DE7-A024-68EBDEEA4007}" type="presOf" srcId="{DB36D4FF-548F-402F-A2B8-2D6E4DEC62E7}" destId="{9268D53B-2568-42FC-AB01-1D13BD7AB530}" srcOrd="0" destOrd="1" presId="urn:microsoft.com/office/officeart/2005/8/layout/vList5"/>
+    <dgm:cxn modelId="{0D84FAD5-59E3-4D33-A065-3F9AED3D6A7F}" srcId="{A9255373-6B2B-4354-A72B-20BAA9579A07}" destId="{80BEC002-AD4A-4B12-878B-3F9005A75BD3}" srcOrd="1" destOrd="0" parTransId="{B7DDC856-9D48-4781-A90F-3061062F6B44}" sibTransId="{2FB3131D-3099-417F-A521-E4D0646D7F82}"/>
+    <dgm:cxn modelId="{26BF464E-6E17-4B2D-8248-32B9A4603C52}" type="presOf" srcId="{3BF2B84D-7DDD-4420-AC6F-088BE6106255}" destId="{9268D53B-2568-42FC-AB01-1D13BD7AB530}" srcOrd="0" destOrd="0" presId="urn:microsoft.com/office/officeart/2005/8/layout/vList5"/>
     <dgm:cxn modelId="{6BFC10C7-8252-4DDD-BB2E-7ECF6EB162EB}" type="presOf" srcId="{C1D198DF-77D6-48B0-BDE3-5CC72D9CF8D9}" destId="{F3D316E4-43BE-49A9-ACEA-CBE477344977}" srcOrd="0" destOrd="0" presId="urn:microsoft.com/office/officeart/2005/8/layout/vList5"/>
     <dgm:cxn modelId="{10CBAF9E-FF04-4F59-B516-CE93E816A7E6}" srcId="{3238AFC2-8CED-4682-859F-F9667E119FD8}" destId="{C1D198DF-77D6-48B0-BDE3-5CC72D9CF8D9}" srcOrd="0" destOrd="0" parTransId="{8A754082-79E7-4223-98B7-EB18343B7A7E}" sibTransId="{94DCD1D4-1D59-4DAA-89A4-89085DFCDB22}"/>
+    <dgm:cxn modelId="{DC75BE3C-F614-4FB8-84B8-DC0737C895DB}" srcId="{F4D35594-A8E5-40CE-B87F-4AD0B9351291}" destId="{DB36D4FF-548F-402F-A2B8-2D6E4DEC62E7}" srcOrd="1" destOrd="0" parTransId="{0F24B493-E4DE-47CE-A309-6607F4860098}" sibTransId="{3CE8A036-34BA-40F1-8ED2-625624F7C87E}"/>
+    <dgm:cxn modelId="{D17539B7-30E9-4148-82CA-6ADF3EFFB6E2}" srcId="{3238AFC2-8CED-4682-859F-F9667E119FD8}" destId="{F4D35594-A8E5-40CE-B87F-4AD0B9351291}" srcOrd="2" destOrd="0" parTransId="{F6A62355-8D78-411A-9C19-B17FEDDA843A}" sibTransId="{638138AF-DA3E-4D93-9E50-B96F3E88DF13}"/>
+    <dgm:cxn modelId="{60FEB1AF-BC31-401D-A91C-EDF39ECA8D37}" srcId="{3238AFC2-8CED-4682-859F-F9667E119FD8}" destId="{A9255373-6B2B-4354-A72B-20BAA9579A07}" srcOrd="1" destOrd="0" parTransId="{F657B7A5-99A7-41D5-B478-7BC5E31F9DFA}" sibTransId="{D3FFEDA0-5D94-495F-AFDF-751233D6D7EE}"/>
+    <dgm:cxn modelId="{5263FF42-E268-4DB7-9087-9AFE9DEB3F2F}" srcId="{A9255373-6B2B-4354-A72B-20BAA9579A07}" destId="{9DD5910B-D53F-44E2-9A4A-06B08B28BB8C}" srcOrd="0" destOrd="0" parTransId="{528A44A4-BEC5-4271-B9D5-7C57BB5BB0AA}" sibTransId="{F56CFF0F-1DD0-4F20-B424-1AFC9A4C60CC}"/>
+    <dgm:cxn modelId="{3E727E96-5C56-4804-97A2-DEDDE3C7C555}" srcId="{C1D198DF-77D6-48B0-BDE3-5CC72D9CF8D9}" destId="{23A3C19C-1379-4BBC-8A0F-6D8BFC455397}" srcOrd="0" destOrd="0" parTransId="{E3F97128-08BE-42A4-B84F-7AE77DBD21FC}" sibTransId="{4EB3CB00-EA66-4BA5-86A4-0855ADD34E5C}"/>
+    <dgm:cxn modelId="{19B6108A-80FA-41A1-8883-E51A9599AE9F}" srcId="{A9255373-6B2B-4354-A72B-20BAA9579A07}" destId="{2DA01002-C980-4A22-82F8-B7217EC2A1C1}" srcOrd="2" destOrd="0" parTransId="{E9F4067C-F94E-443B-A8A8-A794A6E90E50}" sibTransId="{A111CC83-EF37-46B4-A03D-24547221FAE8}"/>
     <dgm:cxn modelId="{127A9141-7A12-422E-A79A-603B0AA8DE68}" srcId="{F4D35594-A8E5-40CE-B87F-4AD0B9351291}" destId="{3BF2B84D-7DDD-4420-AC6F-088BE6106255}" srcOrd="0" destOrd="0" parTransId="{C71395F0-0EB1-4E1E-945F-A072D07A609C}" sibTransId="{5EBDC0E7-E86F-4530-A379-C603EFE54D64}"/>
-    <dgm:cxn modelId="{0D84FAD5-59E3-4D33-A065-3F9AED3D6A7F}" srcId="{A9255373-6B2B-4354-A72B-20BAA9579A07}" destId="{80BEC002-AD4A-4B12-878B-3F9005A75BD3}" srcOrd="1" destOrd="0" parTransId="{B7DDC856-9D48-4781-A90F-3061062F6B44}" sibTransId="{2FB3131D-3099-417F-A521-E4D0646D7F82}"/>
-    <dgm:cxn modelId="{DC75BE3C-F614-4FB8-84B8-DC0737C895DB}" srcId="{F4D35594-A8E5-40CE-B87F-4AD0B9351291}" destId="{DB36D4FF-548F-402F-A2B8-2D6E4DEC62E7}" srcOrd="1" destOrd="0" parTransId="{0F24B493-E4DE-47CE-A309-6607F4860098}" sibTransId="{3CE8A036-34BA-40F1-8ED2-625624F7C87E}"/>
+    <dgm:cxn modelId="{DBF02700-5FF3-49C5-A253-38CE06A0B7CC}" type="presOf" srcId="{3238AFC2-8CED-4682-859F-F9667E119FD8}" destId="{1B417161-983C-490F-8BE4-F09CE311FA69}" srcOrd="0" destOrd="0" presId="urn:microsoft.com/office/officeart/2005/8/layout/vList5"/>
+    <dgm:cxn modelId="{0BD15C49-8623-4A21-9B98-C3300CA2A48A}" type="presOf" srcId="{80BEC002-AD4A-4B12-878B-3F9005A75BD3}" destId="{399F7127-3C1C-4E31-823E-71ADC3A6F5C0}" srcOrd="0" destOrd="1" presId="urn:microsoft.com/office/officeart/2005/8/layout/vList5"/>
+    <dgm:cxn modelId="{1D9B1FE1-8548-4D01-988C-FFF75FD6AD59}" type="presOf" srcId="{2DA01002-C980-4A22-82F8-B7217EC2A1C1}" destId="{399F7127-3C1C-4E31-823E-71ADC3A6F5C0}" srcOrd="0" destOrd="2" presId="urn:microsoft.com/office/officeart/2005/8/layout/vList5"/>
+    <dgm:cxn modelId="{755B4ECD-BCA0-43E9-8BB2-626C496043B7}" type="presOf" srcId="{9DD5910B-D53F-44E2-9A4A-06B08B28BB8C}" destId="{399F7127-3C1C-4E31-823E-71ADC3A6F5C0}" srcOrd="0" destOrd="0" presId="urn:microsoft.com/office/officeart/2005/8/layout/vList5"/>
+    <dgm:cxn modelId="{213E63CF-BEAF-4A98-B31E-E05D981D76DC}" type="presOf" srcId="{23A3C19C-1379-4BBC-8A0F-6D8BFC455397}" destId="{001E576D-89BD-4763-9AC5-31DE0BF1A2B0}" srcOrd="0" destOrd="0" presId="urn:microsoft.com/office/officeart/2005/8/layout/vList5"/>
     <dgm:cxn modelId="{4A1ABB53-D9B6-468E-AB77-CCF17EC3D04D}" type="presOf" srcId="{A9255373-6B2B-4354-A72B-20BAA9579A07}" destId="{A962D324-CBAD-449F-A474-863543A6CA86}" srcOrd="0" destOrd="0" presId="urn:microsoft.com/office/officeart/2005/8/layout/vList5"/>
-    <dgm:cxn modelId="{9BE7A485-36B8-4DE7-A024-68EBDEEA4007}" type="presOf" srcId="{DB36D4FF-548F-402F-A2B8-2D6E4DEC62E7}" destId="{9268D53B-2568-42FC-AB01-1D13BD7AB530}" srcOrd="0" destOrd="1" presId="urn:microsoft.com/office/officeart/2005/8/layout/vList5"/>
     <dgm:cxn modelId="{2D5EF703-C216-43D5-8411-D2F37BBD6B5C}" type="presOf" srcId="{F4D35594-A8E5-40CE-B87F-4AD0B9351291}" destId="{3D578473-AF45-4D0F-9D9A-A1B12A5CEC77}" srcOrd="0" destOrd="0" presId="urn:microsoft.com/office/officeart/2005/8/layout/vList5"/>
-    <dgm:cxn modelId="{26BF464E-6E17-4B2D-8248-32B9A4603C52}" type="presOf" srcId="{3BF2B84D-7DDD-4420-AC6F-088BE6106255}" destId="{9268D53B-2568-42FC-AB01-1D13BD7AB530}" srcOrd="0" destOrd="0" presId="urn:microsoft.com/office/officeart/2005/8/layout/vList5"/>
-    <dgm:cxn modelId="{D17539B7-30E9-4148-82CA-6ADF3EFFB6E2}" srcId="{3238AFC2-8CED-4682-859F-F9667E119FD8}" destId="{F4D35594-A8E5-40CE-B87F-4AD0B9351291}" srcOrd="2" destOrd="0" parTransId="{F6A62355-8D78-411A-9C19-B17FEDDA843A}" sibTransId="{638138AF-DA3E-4D93-9E50-B96F3E88DF13}"/>
-    <dgm:cxn modelId="{3E727E96-5C56-4804-97A2-DEDDE3C7C555}" srcId="{C1D198DF-77D6-48B0-BDE3-5CC72D9CF8D9}" destId="{23A3C19C-1379-4BBC-8A0F-6D8BFC455397}" srcOrd="0" destOrd="0" parTransId="{E3F97128-08BE-42A4-B84F-7AE77DBD21FC}" sibTransId="{4EB3CB00-EA66-4BA5-86A4-0855ADD34E5C}"/>
-    <dgm:cxn modelId="{0BD15C49-8623-4A21-9B98-C3300CA2A48A}" type="presOf" srcId="{80BEC002-AD4A-4B12-878B-3F9005A75BD3}" destId="{399F7127-3C1C-4E31-823E-71ADC3A6F5C0}" srcOrd="0" destOrd="1" presId="urn:microsoft.com/office/officeart/2005/8/layout/vList5"/>
-    <dgm:cxn modelId="{DBF02700-5FF3-49C5-A253-38CE06A0B7CC}" type="presOf" srcId="{3238AFC2-8CED-4682-859F-F9667E119FD8}" destId="{1B417161-983C-490F-8BE4-F09CE311FA69}" srcOrd="0" destOrd="0" presId="urn:microsoft.com/office/officeart/2005/8/layout/vList5"/>
-    <dgm:cxn modelId="{213E63CF-BEAF-4A98-B31E-E05D981D76DC}" type="presOf" srcId="{23A3C19C-1379-4BBC-8A0F-6D8BFC455397}" destId="{001E576D-89BD-4763-9AC5-31DE0BF1A2B0}" srcOrd="0" destOrd="0" presId="urn:microsoft.com/office/officeart/2005/8/layout/vList5"/>
-    <dgm:cxn modelId="{60FEB1AF-BC31-401D-A91C-EDF39ECA8D37}" srcId="{3238AFC2-8CED-4682-859F-F9667E119FD8}" destId="{A9255373-6B2B-4354-A72B-20BAA9579A07}" srcOrd="1" destOrd="0" parTransId="{F657B7A5-99A7-41D5-B478-7BC5E31F9DFA}" sibTransId="{D3FFEDA0-5D94-495F-AFDF-751233D6D7EE}"/>
-    <dgm:cxn modelId="{1D9B1FE1-8548-4D01-988C-FFF75FD6AD59}" type="presOf" srcId="{2DA01002-C980-4A22-82F8-B7217EC2A1C1}" destId="{399F7127-3C1C-4E31-823E-71ADC3A6F5C0}" srcOrd="0" destOrd="2" presId="urn:microsoft.com/office/officeart/2005/8/layout/vList5"/>
     <dgm:cxn modelId="{6807CFC8-C285-4EDD-B3AD-E893868F6C9E}" type="presParOf" srcId="{1B417161-983C-490F-8BE4-F09CE311FA69}" destId="{78867893-85E0-4E6F-A3D8-B121D9E28AD4}" srcOrd="0" destOrd="0" presId="urn:microsoft.com/office/officeart/2005/8/layout/vList5"/>
     <dgm:cxn modelId="{68074FA9-AB9E-4299-8275-E1D73617F131}" type="presParOf" srcId="{78867893-85E0-4E6F-A3D8-B121D9E28AD4}" destId="{F3D316E4-43BE-49A9-ACEA-CBE477344977}" srcOrd="0" destOrd="0" presId="urn:microsoft.com/office/officeart/2005/8/layout/vList5"/>
     <dgm:cxn modelId="{89EBC1E6-0A9E-45C6-B2DB-E2E7A53F8D49}" type="presParOf" srcId="{78867893-85E0-4E6F-A3D8-B121D9E28AD4}" destId="{001E576D-89BD-4763-9AC5-31DE0BF1A2B0}" srcOrd="1" destOrd="0" presId="urn:microsoft.com/office/officeart/2005/8/layout/vList5"/>
@@ -6562,6 +6630,13 @@
         </dgm:presLayoutVars>
       </dgm:prSet>
       <dgm:spPr/>
+      <dgm:t>
+        <a:bodyPr/>
+        <a:lstStyle/>
+        <a:p>
+          <a:endParaRPr lang="zh-CN" altLang="en-US"/>
+        </a:p>
+      </dgm:t>
     </dgm:pt>
     <dgm:pt modelId="{7E201614-3B3B-4AD4-B787-DE920A9F4080}" type="pres">
       <dgm:prSet presAssocID="{04D601AB-1671-42C0-BD81-F9C778CA0DA0}" presName="circle1" presStyleLbl="node1" presStyleIdx="0" presStyleCnt="3"/>
@@ -6574,6 +6649,13 @@
     <dgm:pt modelId="{8F274263-1CE7-4EC0-9F0C-8D05A7046E40}" type="pres">
       <dgm:prSet presAssocID="{04D601AB-1671-42C0-BD81-F9C778CA0DA0}" presName="rect1" presStyleLbl="alignAcc1" presStyleIdx="0" presStyleCnt="3"/>
       <dgm:spPr/>
+      <dgm:t>
+        <a:bodyPr/>
+        <a:lstStyle/>
+        <a:p>
+          <a:endParaRPr lang="zh-CN" altLang="en-US"/>
+        </a:p>
+      </dgm:t>
     </dgm:pt>
     <dgm:pt modelId="{F0DF4888-07C4-4F74-8D98-DE8AE4DE7015}" type="pres">
       <dgm:prSet presAssocID="{DCD6DD5F-5758-4A9F-B71C-97DD1DDF6805}" presName="vertSpace2" presStyleLbl="node1" presStyleIdx="0" presStyleCnt="3"/>
@@ -6605,6 +6687,13 @@
     <dgm:pt modelId="{70D09977-887B-4AE9-87DC-B5E1DC2C8618}" type="pres">
       <dgm:prSet presAssocID="{11AEACFE-09CF-4712-A676-5800B492C24E}" presName="rect3" presStyleLbl="alignAcc1" presStyleIdx="2" presStyleCnt="3"/>
       <dgm:spPr/>
+      <dgm:t>
+        <a:bodyPr/>
+        <a:lstStyle/>
+        <a:p>
+          <a:endParaRPr lang="zh-CN" altLang="en-US"/>
+        </a:p>
+      </dgm:t>
     </dgm:pt>
     <dgm:pt modelId="{DDDEA78A-E646-414B-A887-3F286A7CC228}" type="pres">
       <dgm:prSet presAssocID="{04D601AB-1671-42C0-BD81-F9C778CA0DA0}" presName="rect1ParTx" presStyleLbl="alignAcc1" presStyleIdx="2" presStyleCnt="3">
@@ -6614,6 +6703,13 @@
         </dgm:presLayoutVars>
       </dgm:prSet>
       <dgm:spPr/>
+      <dgm:t>
+        <a:bodyPr/>
+        <a:lstStyle/>
+        <a:p>
+          <a:endParaRPr lang="zh-CN" altLang="en-US"/>
+        </a:p>
+      </dgm:t>
     </dgm:pt>
     <dgm:pt modelId="{4DD91175-4CCB-4B91-93E1-FC6B107E8398}" type="pres">
       <dgm:prSet presAssocID="{04D601AB-1671-42C0-BD81-F9C778CA0DA0}" presName="rect1ChTx" presStyleLbl="alignAcc1" presStyleIdx="2" presStyleCnt="3">
@@ -6669,6 +6765,13 @@
         </dgm:presLayoutVars>
       </dgm:prSet>
       <dgm:spPr/>
+      <dgm:t>
+        <a:bodyPr/>
+        <a:lstStyle/>
+        <a:p>
+          <a:endParaRPr lang="zh-CN" altLang="en-US"/>
+        </a:p>
+      </dgm:t>
     </dgm:pt>
     <dgm:pt modelId="{8507B361-43A4-4B00-8266-3A5DD9BAAA8A}" type="pres">
       <dgm:prSet presAssocID="{11AEACFE-09CF-4712-A676-5800B492C24E}" presName="rect3ChTx" presStyleLbl="alignAcc1" presStyleIdx="2" presStyleCnt="3">
@@ -6677,6 +6780,13 @@
         </dgm:presLayoutVars>
       </dgm:prSet>
       <dgm:spPr/>
+      <dgm:t>
+        <a:bodyPr/>
+        <a:lstStyle/>
+        <a:p>
+          <a:endParaRPr lang="zh-CN" altLang="en-US"/>
+        </a:p>
+      </dgm:t>
     </dgm:pt>
   </dgm:ptLst>
   <dgm:cxnLst>
@@ -6688,8 +6798,8 @@
     <dgm:cxn modelId="{CDD6773C-A7D3-4FD7-AC10-7F218126141D}" type="presOf" srcId="{2FA1F0B2-F756-4CD9-8DD2-79D582FAD795}" destId="{DC4C6E81-988D-4E64-BD8B-9EE3FDD7DE63}" srcOrd="0" destOrd="0" presId="urn:microsoft.com/office/officeart/2005/8/layout/target3"/>
     <dgm:cxn modelId="{C4FF76A7-5299-439B-A611-9F358E2AA0CD}" type="presOf" srcId="{11AEACFE-09CF-4712-A676-5800B492C24E}" destId="{70D09977-887B-4AE9-87DC-B5E1DC2C8618}" srcOrd="0" destOrd="0" presId="urn:microsoft.com/office/officeart/2005/8/layout/target3"/>
     <dgm:cxn modelId="{B2149DB6-2F55-47F9-B046-0E394398898F}" type="presOf" srcId="{5145F6BE-25C1-4D6F-8A5E-FD84B61F119A}" destId="{4DD91175-4CCB-4B91-93E1-FC6B107E8398}" srcOrd="0" destOrd="0" presId="urn:microsoft.com/office/officeart/2005/8/layout/target3"/>
+    <dgm:cxn modelId="{973523C1-C2AA-450C-B081-7B9D5AC98FB7}" type="presOf" srcId="{2789A4CD-B086-483A-AA46-F82C59CAD686}" destId="{B1EB3481-3F28-430E-A396-EF1C1AEDEB9F}" srcOrd="0" destOrd="0" presId="urn:microsoft.com/office/officeart/2005/8/layout/target3"/>
     <dgm:cxn modelId="{4447E796-44AF-445C-A372-2C7CC97AA7C2}" type="presOf" srcId="{BB355B1D-7028-4058-A794-08DFB54A0B34}" destId="{B1EB3481-3F28-430E-A396-EF1C1AEDEB9F}" srcOrd="0" destOrd="1" presId="urn:microsoft.com/office/officeart/2005/8/layout/target3"/>
-    <dgm:cxn modelId="{973523C1-C2AA-450C-B081-7B9D5AC98FB7}" type="presOf" srcId="{2789A4CD-B086-483A-AA46-F82C59CAD686}" destId="{B1EB3481-3F28-430E-A396-EF1C1AEDEB9F}" srcOrd="0" destOrd="0" presId="urn:microsoft.com/office/officeart/2005/8/layout/target3"/>
     <dgm:cxn modelId="{2F137B12-8FC2-4A05-AFB4-F01E9DF73820}" srcId="{DCD6DD5F-5758-4A9F-B71C-97DD1DDF6805}" destId="{2789A4CD-B086-483A-AA46-F82C59CAD686}" srcOrd="0" destOrd="0" parTransId="{AC92C280-7AFB-4047-BE26-74F867293267}" sibTransId="{706D6C95-FD58-43F5-9158-082081752DCF}"/>
     <dgm:cxn modelId="{018C2112-FEB4-4E8F-8BF6-A2025249B05A}" type="presOf" srcId="{04D601AB-1671-42C0-BD81-F9C778CA0DA0}" destId="{DDDEA78A-E646-414B-A887-3F286A7CC228}" srcOrd="1" destOrd="0" presId="urn:microsoft.com/office/officeart/2005/8/layout/target3"/>
     <dgm:cxn modelId="{AEF2ED9C-0F58-4A9B-9D1A-F58832AA3284}" type="presOf" srcId="{DCD6DD5F-5758-4A9F-B71C-97DD1DDF6805}" destId="{8FDDA5B3-BE75-4E64-B81C-59B2F5BAC128}" srcOrd="1" destOrd="0" presId="urn:microsoft.com/office/officeart/2005/8/layout/target3"/>
@@ -6894,6 +7004,13 @@
         </dgm:presLayoutVars>
       </dgm:prSet>
       <dgm:spPr/>
+      <dgm:t>
+        <a:bodyPr/>
+        <a:lstStyle/>
+        <a:p>
+          <a:endParaRPr lang="zh-CN" altLang="en-US"/>
+        </a:p>
+      </dgm:t>
     </dgm:pt>
     <dgm:pt modelId="{2F5E6A9B-7A21-4785-BAF1-F9F1CFC684BB}" type="pres">
       <dgm:prSet presAssocID="{D543274F-93B6-4E67-BC89-C4D93EE9CF0E}" presName="parentText" presStyleLbl="node1" presStyleIdx="0" presStyleCnt="2">
@@ -6903,6 +7020,13 @@
         </dgm:presLayoutVars>
       </dgm:prSet>
       <dgm:spPr/>
+      <dgm:t>
+        <a:bodyPr/>
+        <a:lstStyle/>
+        <a:p>
+          <a:endParaRPr lang="zh-CN" altLang="en-US"/>
+        </a:p>
+      </dgm:t>
     </dgm:pt>
     <dgm:pt modelId="{98BA2F7B-50FF-4082-A415-82158AD29035}" type="pres">
       <dgm:prSet presAssocID="{D543274F-93B6-4E67-BC89-C4D93EE9CF0E}" presName="childText" presStyleLbl="revTx" presStyleIdx="0" presStyleCnt="2">
@@ -6927,6 +7051,13 @@
         </dgm:presLayoutVars>
       </dgm:prSet>
       <dgm:spPr/>
+      <dgm:t>
+        <a:bodyPr/>
+        <a:lstStyle/>
+        <a:p>
+          <a:endParaRPr lang="zh-CN" altLang="en-US"/>
+        </a:p>
+      </dgm:t>
     </dgm:pt>
     <dgm:pt modelId="{BBA439B9-2D33-42AF-95A4-B87D4EA42CAB}" type="pres">
       <dgm:prSet presAssocID="{3363C1B8-5813-4CB4-B022-184CF33D1F19}" presName="childText" presStyleLbl="revTx" presStyleIdx="1" presStyleCnt="2">
@@ -7143,6 +7274,13 @@
         </dgm:presLayoutVars>
       </dgm:prSet>
       <dgm:spPr/>
+      <dgm:t>
+        <a:bodyPr/>
+        <a:lstStyle/>
+        <a:p>
+          <a:endParaRPr lang="zh-CN" altLang="en-US"/>
+        </a:p>
+      </dgm:t>
     </dgm:pt>
     <dgm:pt modelId="{2F5E6A9B-7A21-4785-BAF1-F9F1CFC684BB}" type="pres">
       <dgm:prSet presAssocID="{D543274F-93B6-4E67-BC89-C4D93EE9CF0E}" presName="parentText" presStyleLbl="node1" presStyleIdx="0" presStyleCnt="2" custLinFactNeighborY="1862">
@@ -7233,23 +7371,16 @@
 </file>
 
 <file path=ppt/diagrams/drawing1.xml><?xml version="1.0" encoding="utf-8"?>
-<dsp:drawing xmlns:dgm="http://schemas.openxmlformats.org/drawingml/2006/diagram" xmlns:dsp="http://schemas.microsoft.com/office/drawing/2008/diagram" xmlns:a="http://schemas.openxmlformats.org/drawingml/2006/main" xmlns:r="http://schemas.openxmlformats.org/officeDocument/2006/relationships">
+<dsp:drawing xmlns:dgm="http://schemas.openxmlformats.org/drawingml/2006/diagram" xmlns:dsp="http://schemas.microsoft.com/office/drawing/2008/diagram" xmlns:a="http://schemas.openxmlformats.org/drawingml/2006/main">
   <dsp:spTree>
     <dsp:nvGrpSpPr>
       <dsp:cNvPr id="0" name=""/>
       <dsp:cNvGrpSpPr/>
     </dsp:nvGrpSpPr>
-    <dsp:grpSpPr>
-      <a:xfrm>
-        <a:off x="0" y="0"/>
-        <a:ext cx="10131552" cy="4114800"/>
-        <a:chOff x="0" y="0"/>
-        <a:chExt cx="0" cy="0"/>
-      </a:xfrm>
-    </dsp:grpSpPr>
-    <dsp:sp>
+    <dsp:grpSpPr/>
+    <dsp:sp modelId="{02BD8CC7-75C5-4007-B516-3F3CB528DACF}">
       <dsp:nvSpPr>
-        <dsp:cNvPr id="1" name="矩形 0"/>
+        <dsp:cNvPr id="0" name=""/>
         <dsp:cNvSpPr/>
       </dsp:nvSpPr>
       <dsp:spPr>
@@ -7297,14 +7428,14 @@
           </a:pPr>
           <a:r>
             <a:rPr lang="zh-CN" altLang="en-US" sz="2900" kern="1200" dirty="0" smtClean="0">
-              <a:latin typeface="Microsoft YaHei UI" pitchFamily="34" charset="-122"/>
-              <a:ea typeface="Microsoft YaHei UI" pitchFamily="34" charset="-122"/>
+              <a:latin typeface="Microsoft YaHei UI" panose="020B0503020204020204" pitchFamily="34" charset="-122"/>
+              <a:ea typeface="Microsoft YaHei UI" panose="020B0503020204020204" pitchFamily="34" charset="-122"/>
             </a:rPr>
             <a:t>项目开始</a:t>
           </a:r>
           <a:endParaRPr lang="zh-CN" sz="2900" kern="1200" dirty="0">
-            <a:latin typeface="Microsoft YaHei UI" pitchFamily="34" charset="-122"/>
-            <a:ea typeface="Microsoft YaHei UI" pitchFamily="34" charset="-122"/>
+            <a:latin typeface="Microsoft YaHei UI" panose="020B0503020204020204" pitchFamily="34" charset="-122"/>
+            <a:ea typeface="Microsoft YaHei UI" panose="020B0503020204020204" pitchFamily="34" charset="-122"/>
           </a:endParaRPr>
         </a:p>
       </dsp:txBody>
@@ -7313,9 +7444,9 @@
         <a:ext cx="1940946" cy="639630"/>
       </dsp:txXfrm>
     </dsp:sp>
-    <dsp:sp>
+    <dsp:sp modelId="{A775BD15-F6A2-4C85-B5A6-F2B8DBF4784F}">
       <dsp:nvSpPr>
-        <dsp:cNvPr id="2" name="矩形 1"/>
+        <dsp:cNvPr id="0" name=""/>
         <dsp:cNvSpPr/>
       </dsp:nvSpPr>
       <dsp:spPr>
@@ -7363,15 +7494,11 @@
           </a:pPr>
           <a:r>
             <a:rPr lang="zh-CN" sz="3600" kern="1200" dirty="0">
-              <a:latin typeface="Microsoft YaHei UI" pitchFamily="34" charset="-122"/>
-              <a:ea typeface="Microsoft YaHei UI" pitchFamily="34" charset="-122"/>
+              <a:latin typeface="Microsoft YaHei UI" panose="020B0503020204020204" pitchFamily="34" charset="-122"/>
+              <a:ea typeface="Microsoft YaHei UI" panose="020B0503020204020204" pitchFamily="34" charset="-122"/>
             </a:rPr>
             <a:t>任务说明</a:t>
           </a:r>
-          <a:endParaRPr lang="zh-CN" sz="3600" kern="1200" dirty="0">
-            <a:latin typeface="Microsoft YaHei UI" pitchFamily="34" charset="-122"/>
-            <a:ea typeface="Microsoft YaHei UI" pitchFamily="34" charset="-122"/>
-          </a:endParaRPr>
         </a:p>
       </dsp:txBody>
       <dsp:txXfrm>
@@ -7379,9 +7506,9 @@
         <a:ext cx="1940946" cy="1198355"/>
       </dsp:txXfrm>
     </dsp:sp>
-    <dsp:sp>
+    <dsp:sp modelId="{1710FDBB-7EB9-4E4A-A75B-3A542F876BE1}">
       <dsp:nvSpPr>
-        <dsp:cNvPr id="3" name="椭圆 2"/>
+        <dsp:cNvPr id="0" name=""/>
         <dsp:cNvSpPr/>
       </dsp:nvSpPr>
       <dsp:spPr>
@@ -7443,9 +7570,9 @@
         </a:fontRef>
       </dsp:style>
     </dsp:sp>
-    <dsp:sp>
+    <dsp:sp modelId="{0493D973-D617-43F6-A9FC-EC07F463C01C}">
       <dsp:nvSpPr>
-        <dsp:cNvPr id="4" name="椭圆 3"/>
+        <dsp:cNvPr id="0" name=""/>
         <dsp:cNvSpPr/>
       </dsp:nvSpPr>
       <dsp:spPr>
@@ -7507,9 +7634,9 @@
         </a:fontRef>
       </dsp:style>
     </dsp:sp>
-    <dsp:sp>
+    <dsp:sp modelId="{8D260052-C17B-4CB4-9DF0-A0D8F7651349}">
       <dsp:nvSpPr>
-        <dsp:cNvPr id="5" name="椭圆 4"/>
+        <dsp:cNvPr id="0" name=""/>
         <dsp:cNvSpPr/>
       </dsp:nvSpPr>
       <dsp:spPr>
@@ -7571,9 +7698,9 @@
         </a:fontRef>
       </dsp:style>
     </dsp:sp>
-    <dsp:sp>
+    <dsp:sp modelId="{7DFA09A5-4CAF-43E4-9B7D-A4989815C95F}">
       <dsp:nvSpPr>
-        <dsp:cNvPr id="6" name="椭圆 5"/>
+        <dsp:cNvPr id="0" name=""/>
         <dsp:cNvSpPr/>
       </dsp:nvSpPr>
       <dsp:spPr>
@@ -7635,9 +7762,9 @@
         </a:fontRef>
       </dsp:style>
     </dsp:sp>
-    <dsp:sp>
+    <dsp:sp modelId="{A9CA1880-65F3-4813-B6F5-C6F2E2644340}">
       <dsp:nvSpPr>
-        <dsp:cNvPr id="7" name="椭圆 6"/>
+        <dsp:cNvPr id="0" name=""/>
         <dsp:cNvSpPr/>
       </dsp:nvSpPr>
       <dsp:spPr>
@@ -7699,9 +7826,9 @@
         </a:fontRef>
       </dsp:style>
     </dsp:sp>
-    <dsp:sp>
+    <dsp:sp modelId="{E79035E2-2FFD-41B2-BD4D-3F1C92B0F99F}">
       <dsp:nvSpPr>
-        <dsp:cNvPr id="8" name="椭圆 7"/>
+        <dsp:cNvPr id="0" name=""/>
         <dsp:cNvSpPr/>
       </dsp:nvSpPr>
       <dsp:spPr>
@@ -7763,9 +7890,9 @@
         </a:fontRef>
       </dsp:style>
     </dsp:sp>
-    <dsp:sp>
+    <dsp:sp modelId="{416A5933-FAE9-471C-B105-BE9A5A3650F1}">
       <dsp:nvSpPr>
-        <dsp:cNvPr id="9" name="椭圆 8"/>
+        <dsp:cNvPr id="0" name=""/>
         <dsp:cNvSpPr/>
       </dsp:nvSpPr>
       <dsp:spPr>
@@ -7827,9 +7954,9 @@
         </a:fontRef>
       </dsp:style>
     </dsp:sp>
-    <dsp:sp>
+    <dsp:sp modelId="{F3A49FC3-9EAE-4AC4-8047-462346D1D05C}">
       <dsp:nvSpPr>
-        <dsp:cNvPr id="10" name="椭圆 9"/>
+        <dsp:cNvPr id="0" name=""/>
         <dsp:cNvSpPr/>
       </dsp:nvSpPr>
       <dsp:spPr>
@@ -7891,9 +8018,9 @@
         </a:fontRef>
       </dsp:style>
     </dsp:sp>
-    <dsp:sp>
+    <dsp:sp modelId="{821370CB-735A-46D2-AFB5-DB7DC7F819DE}">
       <dsp:nvSpPr>
-        <dsp:cNvPr id="11" name="椭圆 10"/>
+        <dsp:cNvPr id="0" name=""/>
         <dsp:cNvSpPr/>
       </dsp:nvSpPr>
       <dsp:spPr>
@@ -7955,9 +8082,9 @@
         </a:fontRef>
       </dsp:style>
     </dsp:sp>
-    <dsp:sp>
+    <dsp:sp modelId="{05A41983-091B-4CE6-8055-03099A9D617B}">
       <dsp:nvSpPr>
-        <dsp:cNvPr id="12" name="椭圆 11"/>
+        <dsp:cNvPr id="0" name=""/>
         <dsp:cNvSpPr/>
       </dsp:nvSpPr>
       <dsp:spPr>
@@ -8019,9 +8146,9 @@
         </a:fontRef>
       </dsp:style>
     </dsp:sp>
-    <dsp:sp>
+    <dsp:sp modelId="{9B685A17-6B02-432C-B5F2-66B2500DAF94}">
       <dsp:nvSpPr>
-        <dsp:cNvPr id="13" name="椭圆 12"/>
+        <dsp:cNvPr id="0" name=""/>
         <dsp:cNvSpPr/>
       </dsp:nvSpPr>
       <dsp:spPr>
@@ -8083,9 +8210,9 @@
         </a:fontRef>
       </dsp:style>
     </dsp:sp>
-    <dsp:sp>
+    <dsp:sp modelId="{491B9DAD-4C2E-4E77-8D9E-21C4E3F394A7}">
       <dsp:nvSpPr>
-        <dsp:cNvPr id="14" name="椭圆 13"/>
+        <dsp:cNvPr id="0" name=""/>
         <dsp:cNvSpPr/>
       </dsp:nvSpPr>
       <dsp:spPr>
@@ -8147,9 +8274,9 @@
         </a:fontRef>
       </dsp:style>
     </dsp:sp>
-    <dsp:sp>
+    <dsp:sp modelId="{BAB21EFA-E85A-4C12-AD6F-FFBC8D74172F}">
       <dsp:nvSpPr>
-        <dsp:cNvPr id="15" name="椭圆 14"/>
+        <dsp:cNvPr id="0" name=""/>
         <dsp:cNvSpPr/>
       </dsp:nvSpPr>
       <dsp:spPr>
@@ -8211,9 +8338,9 @@
         </a:fontRef>
       </dsp:style>
     </dsp:sp>
-    <dsp:sp>
+    <dsp:sp modelId="{6FBB6BA5-1B27-4F83-B953-55857E2664C1}">
       <dsp:nvSpPr>
-        <dsp:cNvPr id="16" name="椭圆 15"/>
+        <dsp:cNvPr id="0" name=""/>
         <dsp:cNvSpPr/>
       </dsp:nvSpPr>
       <dsp:spPr>
@@ -8275,9 +8402,9 @@
         </a:fontRef>
       </dsp:style>
     </dsp:sp>
-    <dsp:sp>
+    <dsp:sp modelId="{84DC4750-EE53-40E5-9757-E2CD63C3CA50}">
       <dsp:nvSpPr>
-        <dsp:cNvPr id="17" name="椭圆 16"/>
+        <dsp:cNvPr id="0" name=""/>
         <dsp:cNvSpPr/>
       </dsp:nvSpPr>
       <dsp:spPr>
@@ -8339,9 +8466,9 @@
         </a:fontRef>
       </dsp:style>
     </dsp:sp>
-    <dsp:sp>
+    <dsp:sp modelId="{D1E30AF7-7767-4361-AFD5-8C5372C4FFED}">
       <dsp:nvSpPr>
-        <dsp:cNvPr id="18" name="椭圆 17"/>
+        <dsp:cNvPr id="0" name=""/>
         <dsp:cNvSpPr/>
       </dsp:nvSpPr>
       <dsp:spPr>
@@ -8403,9 +8530,9 @@
         </a:fontRef>
       </dsp:style>
     </dsp:sp>
-    <dsp:sp>
+    <dsp:sp modelId="{2895621B-2570-47B0-8689-B2ABCEF5EC9B}">
       <dsp:nvSpPr>
-        <dsp:cNvPr id="19" name="椭圆 18"/>
+        <dsp:cNvPr id="0" name=""/>
         <dsp:cNvSpPr/>
       </dsp:nvSpPr>
       <dsp:spPr>
@@ -8467,9 +8594,9 @@
         </a:fontRef>
       </dsp:style>
     </dsp:sp>
-    <dsp:sp>
+    <dsp:sp modelId="{926193B1-4EDA-4B42-B710-2E17F8B7CB86}">
       <dsp:nvSpPr>
-        <dsp:cNvPr id="20" name="椭圆 19"/>
+        <dsp:cNvPr id="0" name=""/>
         <dsp:cNvSpPr/>
       </dsp:nvSpPr>
       <dsp:spPr>
@@ -8531,9 +8658,9 @@
         </a:fontRef>
       </dsp:style>
     </dsp:sp>
-    <dsp:sp>
+    <dsp:sp modelId="{3B1A8840-8537-4C95-9D33-B0A0776641C0}">
       <dsp:nvSpPr>
-        <dsp:cNvPr id="21" name="燕尾形 20"/>
+        <dsp:cNvPr id="0" name=""/>
         <dsp:cNvSpPr/>
       </dsp:nvSpPr>
       <dsp:spPr>
@@ -8592,9 +8719,9 @@
         </a:fontRef>
       </dsp:style>
     </dsp:sp>
-    <dsp:sp>
+    <dsp:sp modelId="{1A3F70FD-275E-4E5C-A460-AE604F66D6BB}">
       <dsp:nvSpPr>
-        <dsp:cNvPr id="22" name="矩形 21"/>
+        <dsp:cNvPr id="0" name=""/>
         <dsp:cNvSpPr/>
       </dsp:nvSpPr>
       <dsp:spPr>
@@ -8642,14 +8769,14 @@
           </a:pPr>
           <a:r>
             <a:rPr lang="zh-CN" altLang="en-US" sz="2900" kern="1200" dirty="0" smtClean="0">
-              <a:latin typeface="Microsoft YaHei UI" pitchFamily="34" charset="-122"/>
-              <a:ea typeface="Microsoft YaHei UI" pitchFamily="34" charset="-122"/>
+              <a:latin typeface="Microsoft YaHei UI" panose="020B0503020204020204" pitchFamily="34" charset="-122"/>
+              <a:ea typeface="Microsoft YaHei UI" panose="020B0503020204020204" pitchFamily="34" charset="-122"/>
             </a:rPr>
             <a:t>需求分析</a:t>
           </a:r>
           <a:endParaRPr lang="zh-CN" sz="2900" kern="1200" dirty="0">
-            <a:latin typeface="Microsoft YaHei UI" pitchFamily="34" charset="-122"/>
-            <a:ea typeface="Microsoft YaHei UI" pitchFamily="34" charset="-122"/>
+            <a:latin typeface="Microsoft YaHei UI" panose="020B0503020204020204" pitchFamily="34" charset="-122"/>
+            <a:ea typeface="Microsoft YaHei UI" panose="020B0503020204020204" pitchFamily="34" charset="-122"/>
           </a:endParaRPr>
         </a:p>
       </dsp:txBody>
@@ -8658,9 +8785,9 @@
         <a:ext cx="1943278" cy="1360295"/>
       </dsp:txXfrm>
     </dsp:sp>
-    <dsp:sp>
+    <dsp:sp modelId="{FB31292E-6F27-45E0-92E2-A34D97F89EC9}">
       <dsp:nvSpPr>
-        <dsp:cNvPr id="23" name="矩形 22"/>
+        <dsp:cNvPr id="0" name=""/>
         <dsp:cNvSpPr/>
       </dsp:nvSpPr>
       <dsp:spPr>
@@ -8708,15 +8835,11 @@
           </a:pPr>
           <a:r>
             <a:rPr lang="zh-CN" sz="3600" kern="1200">
-              <a:latin typeface="Microsoft YaHei UI" pitchFamily="34" charset="-122"/>
-              <a:ea typeface="Microsoft YaHei UI" pitchFamily="34" charset="-122"/>
+              <a:latin typeface="Microsoft YaHei UI" panose="020B0503020204020204" pitchFamily="34" charset="-122"/>
+              <a:ea typeface="Microsoft YaHei UI" panose="020B0503020204020204" pitchFamily="34" charset="-122"/>
             </a:rPr>
             <a:t>任务说明</a:t>
           </a:r>
-          <a:endParaRPr lang="zh-CN" sz="3600" kern="1200">
-            <a:latin typeface="Microsoft YaHei UI" pitchFamily="34" charset="-122"/>
-            <a:ea typeface="Microsoft YaHei UI" pitchFamily="34" charset="-122"/>
-          </a:endParaRPr>
         </a:p>
       </dsp:txBody>
       <dsp:txXfrm>
@@ -8724,9 +8847,9 @@
         <a:ext cx="1943278" cy="1198355"/>
       </dsp:txXfrm>
     </dsp:sp>
-    <dsp:sp>
+    <dsp:sp modelId="{73C978A2-A371-4B30-B564-60B4CA481519}">
       <dsp:nvSpPr>
-        <dsp:cNvPr id="24" name="燕尾形 23"/>
+        <dsp:cNvPr id="0" name=""/>
         <dsp:cNvSpPr/>
       </dsp:nvSpPr>
       <dsp:spPr>
@@ -8785,9 +8908,9 @@
         </a:fontRef>
       </dsp:style>
     </dsp:sp>
-    <dsp:sp>
+    <dsp:sp modelId="{43CBD4FA-CCDE-48FA-8455-CBD4DF6D2801}">
       <dsp:nvSpPr>
-        <dsp:cNvPr id="25" name="矩形 24"/>
+        <dsp:cNvPr id="0" name=""/>
         <dsp:cNvSpPr/>
       </dsp:nvSpPr>
       <dsp:spPr>
@@ -8835,14 +8958,14 @@
           </a:pPr>
           <a:r>
             <a:rPr lang="zh-CN" altLang="en-US" sz="2900" kern="1200" dirty="0" smtClean="0">
-              <a:latin typeface="Microsoft YaHei UI" pitchFamily="34" charset="-122"/>
-              <a:ea typeface="Microsoft YaHei UI" pitchFamily="34" charset="-122"/>
+              <a:latin typeface="Microsoft YaHei UI" panose="020B0503020204020204" pitchFamily="34" charset="-122"/>
+              <a:ea typeface="Microsoft YaHei UI" panose="020B0503020204020204" pitchFamily="34" charset="-122"/>
             </a:rPr>
             <a:t>项目设计</a:t>
           </a:r>
           <a:endParaRPr lang="zh-CN" sz="2900" kern="1200" dirty="0">
-            <a:latin typeface="Microsoft YaHei UI" pitchFamily="34" charset="-122"/>
-            <a:ea typeface="Microsoft YaHei UI" pitchFamily="34" charset="-122"/>
+            <a:latin typeface="Microsoft YaHei UI" panose="020B0503020204020204" pitchFamily="34" charset="-122"/>
+            <a:ea typeface="Microsoft YaHei UI" panose="020B0503020204020204" pitchFamily="34" charset="-122"/>
           </a:endParaRPr>
         </a:p>
       </dsp:txBody>
@@ -8851,9 +8974,9 @@
         <a:ext cx="1943278" cy="1360295"/>
       </dsp:txXfrm>
     </dsp:sp>
-    <dsp:sp>
+    <dsp:sp modelId="{42546970-C3AB-4C04-AFA4-FA17D8EAB40F}">
       <dsp:nvSpPr>
-        <dsp:cNvPr id="26" name="矩形 25"/>
+        <dsp:cNvPr id="0" name=""/>
         <dsp:cNvSpPr/>
       </dsp:nvSpPr>
       <dsp:spPr>
@@ -8901,15 +9024,11 @@
           </a:pPr>
           <a:r>
             <a:rPr lang="zh-CN" sz="3600" kern="1200">
-              <a:latin typeface="Microsoft YaHei UI" pitchFamily="34" charset="-122"/>
-              <a:ea typeface="Microsoft YaHei UI" pitchFamily="34" charset="-122"/>
+              <a:latin typeface="Microsoft YaHei UI" panose="020B0503020204020204" pitchFamily="34" charset="-122"/>
+              <a:ea typeface="Microsoft YaHei UI" panose="020B0503020204020204" pitchFamily="34" charset="-122"/>
             </a:rPr>
             <a:t>任务说明</a:t>
           </a:r>
-          <a:endParaRPr lang="zh-CN" sz="3600" kern="1200">
-            <a:latin typeface="Microsoft YaHei UI" pitchFamily="34" charset="-122"/>
-            <a:ea typeface="Microsoft YaHei UI" pitchFamily="34" charset="-122"/>
-          </a:endParaRPr>
         </a:p>
       </dsp:txBody>
       <dsp:txXfrm>
@@ -8917,9 +9036,9 @@
         <a:ext cx="1943278" cy="1198355"/>
       </dsp:txXfrm>
     </dsp:sp>
-    <dsp:sp>
+    <dsp:sp modelId="{AFB19B90-CD9D-46ED-9B5E-96A29D3E2873}">
       <dsp:nvSpPr>
-        <dsp:cNvPr id="27" name="燕尾形 26"/>
+        <dsp:cNvPr id="0" name=""/>
         <dsp:cNvSpPr/>
       </dsp:nvSpPr>
       <dsp:spPr>
@@ -8978,9 +9097,9 @@
         </a:fontRef>
       </dsp:style>
     </dsp:sp>
-    <dsp:sp>
+    <dsp:sp modelId="{2C81D19C-5783-4597-A013-78093E3FD4AA}">
       <dsp:nvSpPr>
-        <dsp:cNvPr id="28" name="椭圆 27"/>
+        <dsp:cNvPr id="0" name=""/>
         <dsp:cNvSpPr/>
       </dsp:nvSpPr>
       <dsp:spPr>
@@ -9060,14 +9179,14 @@
           </a:pPr>
           <a:r>
             <a:rPr lang="zh-CN" altLang="en-US" sz="2900" kern="1200" dirty="0" smtClean="0">
-              <a:latin typeface="Microsoft YaHei UI" pitchFamily="34" charset="-122"/>
-              <a:ea typeface="Microsoft YaHei UI" pitchFamily="34" charset="-122"/>
+              <a:latin typeface="Microsoft YaHei UI" panose="020B0503020204020204" pitchFamily="34" charset="-122"/>
+              <a:ea typeface="Microsoft YaHei UI" panose="020B0503020204020204" pitchFamily="34" charset="-122"/>
             </a:rPr>
             <a:t>编码</a:t>
           </a:r>
           <a:endParaRPr lang="zh-CN" sz="2900" kern="1200" dirty="0">
-            <a:latin typeface="Microsoft YaHei UI" pitchFamily="34" charset="-122"/>
-            <a:ea typeface="Microsoft YaHei UI" pitchFamily="34" charset="-122"/>
+            <a:latin typeface="Microsoft YaHei UI" panose="020B0503020204020204" pitchFamily="34" charset="-122"/>
+            <a:ea typeface="Microsoft YaHei UI" panose="020B0503020204020204" pitchFamily="34" charset="-122"/>
           </a:endParaRPr>
         </a:p>
       </dsp:txBody>
@@ -9076,9 +9195,9 @@
         <a:ext cx="1167990" cy="1167990"/>
       </dsp:txXfrm>
     </dsp:sp>
-    <dsp:sp>
+    <dsp:sp modelId="{68A8D6FA-10EB-41B7-9487-79077C0C09C4}">
       <dsp:nvSpPr>
-        <dsp:cNvPr id="29" name="矩形 28"/>
+        <dsp:cNvPr id="0" name=""/>
         <dsp:cNvSpPr/>
       </dsp:nvSpPr>
       <dsp:spPr>
@@ -9126,15 +9245,11 @@
           </a:pPr>
           <a:r>
             <a:rPr lang="zh-CN" sz="3600" kern="1200">
-              <a:latin typeface="Microsoft YaHei UI" pitchFamily="34" charset="-122"/>
-              <a:ea typeface="Microsoft YaHei UI" pitchFamily="34" charset="-122"/>
+              <a:latin typeface="Microsoft YaHei UI" panose="020B0503020204020204" pitchFamily="34" charset="-122"/>
+              <a:ea typeface="Microsoft YaHei UI" panose="020B0503020204020204" pitchFamily="34" charset="-122"/>
             </a:rPr>
             <a:t>任务说明</a:t>
           </a:r>
-          <a:endParaRPr lang="zh-CN" sz="3600" kern="1200">
-            <a:latin typeface="Microsoft YaHei UI" pitchFamily="34" charset="-122"/>
-            <a:ea typeface="Microsoft YaHei UI" pitchFamily="34" charset="-122"/>
-          </a:endParaRPr>
         </a:p>
       </dsp:txBody>
       <dsp:txXfrm>
@@ -9147,23 +9262,16 @@
 </file>
 
 <file path=ppt/diagrams/drawing2.xml><?xml version="1.0" encoding="utf-8"?>
-<dsp:drawing xmlns:dgm="http://schemas.openxmlformats.org/drawingml/2006/diagram" xmlns:dsp="http://schemas.microsoft.com/office/drawing/2008/diagram" xmlns:a="http://schemas.openxmlformats.org/drawingml/2006/main" xmlns:r="http://schemas.openxmlformats.org/officeDocument/2006/relationships">
+<dsp:drawing xmlns:dgm="http://schemas.openxmlformats.org/drawingml/2006/diagram" xmlns:dsp="http://schemas.microsoft.com/office/drawing/2008/diagram" xmlns:a="http://schemas.openxmlformats.org/drawingml/2006/main">
   <dsp:spTree>
     <dsp:nvGrpSpPr>
       <dsp:cNvPr id="0" name=""/>
       <dsp:cNvGrpSpPr/>
     </dsp:nvGrpSpPr>
-    <dsp:grpSpPr>
-      <a:xfrm>
-        <a:off x="0" y="0"/>
-        <a:ext cx="10131552" cy="4114800"/>
-        <a:chOff x="0" y="0"/>
-        <a:chExt cx="0" cy="0"/>
-      </a:xfrm>
-    </dsp:grpSpPr>
-    <dsp:sp>
+    <dsp:grpSpPr/>
+    <dsp:sp modelId="{EEA4795B-68FF-49EA-BCED-5D1412A26292}">
       <dsp:nvSpPr>
-        <dsp:cNvPr id="1" name="圆角矩形 0"/>
+        <dsp:cNvPr id="0" name=""/>
         <dsp:cNvSpPr/>
       </dsp:nvSpPr>
       <dsp:spPr>
@@ -9245,14 +9353,14 @@
           </a:pPr>
           <a:r>
             <a:rPr lang="en-US" altLang="zh-CN" sz="5000" kern="1200" dirty="0" smtClean="0">
-              <a:latin typeface="Microsoft YaHei UI" pitchFamily="34" charset="-122"/>
-              <a:ea typeface="Microsoft YaHei UI" pitchFamily="34" charset="-122"/>
+              <a:latin typeface="Microsoft YaHei UI" panose="020B0503020204020204" pitchFamily="34" charset="-122"/>
+              <a:ea typeface="Microsoft YaHei UI" panose="020B0503020204020204" pitchFamily="34" charset="-122"/>
             </a:rPr>
             <a:t>User</a:t>
           </a:r>
           <a:endParaRPr lang="zh-CN" sz="5000" kern="1200" dirty="0">
-            <a:latin typeface="Microsoft YaHei UI" pitchFamily="34" charset="-122"/>
-            <a:ea typeface="Microsoft YaHei UI" pitchFamily="34" charset="-122"/>
+            <a:latin typeface="Microsoft YaHei UI" panose="020B0503020204020204" pitchFamily="34" charset="-122"/>
+            <a:ea typeface="Microsoft YaHei UI" panose="020B0503020204020204" pitchFamily="34" charset="-122"/>
           </a:endParaRPr>
         </a:p>
       </dsp:txBody>
@@ -9261,9 +9369,9 @@
         <a:ext cx="2281023" cy="1106099"/>
       </dsp:txXfrm>
     </dsp:sp>
-    <dsp:sp>
+    <dsp:sp modelId="{3C188B19-A77B-44CF-B678-8A70AEC38B1D}">
       <dsp:nvSpPr>
-        <dsp:cNvPr id="2" name="任意多边形 1"/>
+        <dsp:cNvPr id="0" name=""/>
         <dsp:cNvSpPr/>
       </dsp:nvSpPr>
       <dsp:spPr>
@@ -9319,9 +9427,9 @@
         <a:fontRef idx="minor"/>
       </dsp:style>
     </dsp:sp>
-    <dsp:sp>
+    <dsp:sp modelId="{946B726D-8ECD-4AA5-A32C-F8DDEA344C30}">
       <dsp:nvSpPr>
-        <dsp:cNvPr id="3" name="圆角矩形 2"/>
+        <dsp:cNvPr id="0" name=""/>
         <dsp:cNvSpPr/>
       </dsp:nvSpPr>
       <dsp:spPr>
@@ -9387,14 +9495,14 @@
           </a:pPr>
           <a:r>
             <a:rPr lang="en-US" altLang="zh-CN" sz="3700" kern="1200" dirty="0" smtClean="0">
-              <a:latin typeface="Microsoft YaHei UI" pitchFamily="34" charset="-122"/>
-              <a:ea typeface="Microsoft YaHei UI" pitchFamily="34" charset="-122"/>
+              <a:latin typeface="Microsoft YaHei UI" panose="020B0503020204020204" pitchFamily="34" charset="-122"/>
+              <a:ea typeface="Microsoft YaHei UI" panose="020B0503020204020204" pitchFamily="34" charset="-122"/>
             </a:rPr>
             <a:t>search</a:t>
           </a:r>
           <a:endParaRPr lang="zh-CN" sz="3700" kern="1200" dirty="0">
-            <a:latin typeface="Microsoft YaHei UI" pitchFamily="34" charset="-122"/>
-            <a:ea typeface="Microsoft YaHei UI" pitchFamily="34" charset="-122"/>
+            <a:latin typeface="Microsoft YaHei UI" panose="020B0503020204020204" pitchFamily="34" charset="-122"/>
+            <a:ea typeface="Microsoft YaHei UI" panose="020B0503020204020204" pitchFamily="34" charset="-122"/>
           </a:endParaRPr>
         </a:p>
       </dsp:txBody>
@@ -9403,9 +9511,9 @@
         <a:ext cx="1811053" cy="1106099"/>
       </dsp:txXfrm>
     </dsp:sp>
-    <dsp:sp>
+    <dsp:sp modelId="{29EADAFA-A450-43D7-B01E-E9E5E8FE7373}">
       <dsp:nvSpPr>
-        <dsp:cNvPr id="4" name="任意多边形 3"/>
+        <dsp:cNvPr id="0" name=""/>
         <dsp:cNvSpPr/>
       </dsp:nvSpPr>
       <dsp:spPr>
@@ -9461,9 +9569,9 @@
         <a:fontRef idx="minor"/>
       </dsp:style>
     </dsp:sp>
-    <dsp:sp>
+    <dsp:sp modelId="{DB910009-D45F-4D57-B10A-934EC3E5E24F}">
       <dsp:nvSpPr>
-        <dsp:cNvPr id="5" name="圆角矩形 4"/>
+        <dsp:cNvPr id="0" name=""/>
         <dsp:cNvSpPr/>
       </dsp:nvSpPr>
       <dsp:spPr>
@@ -9529,14 +9637,14 @@
           </a:pPr>
           <a:r>
             <a:rPr lang="en-US" altLang="zh-CN" sz="3700" kern="1200" dirty="0" smtClean="0">
-              <a:latin typeface="Microsoft YaHei UI" pitchFamily="34" charset="-122"/>
-              <a:ea typeface="Microsoft YaHei UI" pitchFamily="34" charset="-122"/>
+              <a:latin typeface="Microsoft YaHei UI" panose="020B0503020204020204" pitchFamily="34" charset="-122"/>
+              <a:ea typeface="Microsoft YaHei UI" panose="020B0503020204020204" pitchFamily="34" charset="-122"/>
             </a:rPr>
             <a:t>browse</a:t>
           </a:r>
           <a:endParaRPr lang="zh-CN" sz="3700" kern="1200" dirty="0">
-            <a:latin typeface="Microsoft YaHei UI" pitchFamily="34" charset="-122"/>
-            <a:ea typeface="Microsoft YaHei UI" pitchFamily="34" charset="-122"/>
+            <a:latin typeface="Microsoft YaHei UI" panose="020B0503020204020204" pitchFamily="34" charset="-122"/>
+            <a:ea typeface="Microsoft YaHei UI" panose="020B0503020204020204" pitchFamily="34" charset="-122"/>
           </a:endParaRPr>
         </a:p>
       </dsp:txBody>
@@ -9545,9 +9653,9 @@
         <a:ext cx="1811053" cy="1106099"/>
       </dsp:txXfrm>
     </dsp:sp>
-    <dsp:sp>
+    <dsp:sp modelId="{85CF7BFC-8460-4C1E-9911-E5A9544357DB}">
       <dsp:nvSpPr>
-        <dsp:cNvPr id="6" name="圆角矩形 5"/>
+        <dsp:cNvPr id="0" name=""/>
         <dsp:cNvSpPr/>
       </dsp:nvSpPr>
       <dsp:spPr>
@@ -9629,14 +9737,14 @@
           </a:pPr>
           <a:r>
             <a:rPr lang="en-US" altLang="zh-CN" sz="5000" kern="1200" dirty="0" smtClean="0">
-              <a:latin typeface="Microsoft YaHei UI" pitchFamily="34" charset="-122"/>
-              <a:ea typeface="Microsoft YaHei UI" pitchFamily="34" charset="-122"/>
+              <a:latin typeface="Microsoft YaHei UI" panose="020B0503020204020204" pitchFamily="34" charset="-122"/>
+              <a:ea typeface="Microsoft YaHei UI" panose="020B0503020204020204" pitchFamily="34" charset="-122"/>
             </a:rPr>
             <a:t>Repo</a:t>
           </a:r>
           <a:endParaRPr lang="zh-CN" sz="5000" kern="1200" dirty="0">
-            <a:latin typeface="Microsoft YaHei UI" pitchFamily="34" charset="-122"/>
-            <a:ea typeface="Microsoft YaHei UI" pitchFamily="34" charset="-122"/>
+            <a:latin typeface="Microsoft YaHei UI" panose="020B0503020204020204" pitchFamily="34" charset="-122"/>
+            <a:ea typeface="Microsoft YaHei UI" panose="020B0503020204020204" pitchFamily="34" charset="-122"/>
           </a:endParaRPr>
         </a:p>
       </dsp:txBody>
@@ -9645,9 +9753,9 @@
         <a:ext cx="2281023" cy="1106099"/>
       </dsp:txXfrm>
     </dsp:sp>
-    <dsp:sp>
+    <dsp:sp modelId="{50E8D4B1-746A-4046-A8DB-25F9F3B04F5A}">
       <dsp:nvSpPr>
-        <dsp:cNvPr id="7" name="任意多边形 6"/>
+        <dsp:cNvPr id="0" name=""/>
         <dsp:cNvSpPr/>
       </dsp:nvSpPr>
       <dsp:spPr>
@@ -9703,9 +9811,9 @@
         <a:fontRef idx="minor"/>
       </dsp:style>
     </dsp:sp>
-    <dsp:sp>
+    <dsp:sp modelId="{C1EC1154-0E49-4B37-B380-D6FF7D72E727}">
       <dsp:nvSpPr>
-        <dsp:cNvPr id="8" name="圆角矩形 7"/>
+        <dsp:cNvPr id="0" name=""/>
         <dsp:cNvSpPr/>
       </dsp:nvSpPr>
       <dsp:spPr>
@@ -9771,14 +9879,14 @@
           </a:pPr>
           <a:r>
             <a:rPr lang="en-US" altLang="zh-CN" sz="3700" kern="1200" dirty="0" smtClean="0">
-              <a:latin typeface="Microsoft YaHei UI" pitchFamily="34" charset="-122"/>
-              <a:ea typeface="Microsoft YaHei UI" pitchFamily="34" charset="-122"/>
+              <a:latin typeface="Microsoft YaHei UI" panose="020B0503020204020204" pitchFamily="34" charset="-122"/>
+              <a:ea typeface="Microsoft YaHei UI" panose="020B0503020204020204" pitchFamily="34" charset="-122"/>
             </a:rPr>
             <a:t>search</a:t>
           </a:r>
           <a:endParaRPr lang="zh-CN" sz="3700" kern="1200" dirty="0">
-            <a:latin typeface="Microsoft YaHei UI" pitchFamily="34" charset="-122"/>
-            <a:ea typeface="Microsoft YaHei UI" pitchFamily="34" charset="-122"/>
+            <a:latin typeface="Microsoft YaHei UI" panose="020B0503020204020204" pitchFamily="34" charset="-122"/>
+            <a:ea typeface="Microsoft YaHei UI" panose="020B0503020204020204" pitchFamily="34" charset="-122"/>
           </a:endParaRPr>
         </a:p>
       </dsp:txBody>
@@ -9787,9 +9895,9 @@
         <a:ext cx="1811053" cy="1106099"/>
       </dsp:txXfrm>
     </dsp:sp>
-    <dsp:sp>
+    <dsp:sp modelId="{EA8D7378-E222-4C55-A033-43249730ED27}">
       <dsp:nvSpPr>
-        <dsp:cNvPr id="9" name="任意多边形 8"/>
+        <dsp:cNvPr id="0" name=""/>
         <dsp:cNvSpPr/>
       </dsp:nvSpPr>
       <dsp:spPr>
@@ -9845,9 +9953,9 @@
         <a:fontRef idx="minor"/>
       </dsp:style>
     </dsp:sp>
-    <dsp:sp>
+    <dsp:sp modelId="{6D8E477D-924C-473C-91AC-6D2B9553E33C}">
       <dsp:nvSpPr>
-        <dsp:cNvPr id="10" name="圆角矩形 9"/>
+        <dsp:cNvPr id="0" name=""/>
         <dsp:cNvSpPr/>
       </dsp:nvSpPr>
       <dsp:spPr>
@@ -9913,14 +10021,14 @@
           </a:pPr>
           <a:r>
             <a:rPr lang="en-US" altLang="zh-CN" sz="3700" kern="1200" dirty="0" smtClean="0">
-              <a:latin typeface="Microsoft YaHei UI" pitchFamily="34" charset="-122"/>
-              <a:ea typeface="Microsoft YaHei UI" pitchFamily="34" charset="-122"/>
+              <a:latin typeface="Microsoft YaHei UI" panose="020B0503020204020204" pitchFamily="34" charset="-122"/>
+              <a:ea typeface="Microsoft YaHei UI" panose="020B0503020204020204" pitchFamily="34" charset="-122"/>
             </a:rPr>
             <a:t>browse</a:t>
           </a:r>
           <a:endParaRPr lang="zh-CN" sz="3700" kern="1200" dirty="0">
-            <a:latin typeface="Microsoft YaHei UI" pitchFamily="34" charset="-122"/>
-            <a:ea typeface="Microsoft YaHei UI" pitchFamily="34" charset="-122"/>
+            <a:latin typeface="Microsoft YaHei UI" panose="020B0503020204020204" pitchFamily="34" charset="-122"/>
+            <a:ea typeface="Microsoft YaHei UI" panose="020B0503020204020204" pitchFamily="34" charset="-122"/>
           </a:endParaRPr>
         </a:p>
       </dsp:txBody>
@@ -9934,23 +10042,16 @@
 </file>
 
 <file path=ppt/diagrams/drawing3.xml><?xml version="1.0" encoding="utf-8"?>
-<dsp:drawing xmlns:dgm="http://schemas.openxmlformats.org/drawingml/2006/diagram" xmlns:dsp="http://schemas.microsoft.com/office/drawing/2008/diagram" xmlns:a="http://schemas.openxmlformats.org/drawingml/2006/main" xmlns:r="http://schemas.openxmlformats.org/officeDocument/2006/relationships">
+<dsp:drawing xmlns:dgm="http://schemas.openxmlformats.org/drawingml/2006/diagram" xmlns:dsp="http://schemas.microsoft.com/office/drawing/2008/diagram" xmlns:a="http://schemas.openxmlformats.org/drawingml/2006/main">
   <dsp:spTree>
     <dsp:nvGrpSpPr>
       <dsp:cNvPr id="0" name=""/>
       <dsp:cNvGrpSpPr/>
     </dsp:nvGrpSpPr>
-    <dsp:grpSpPr>
-      <a:xfrm>
-        <a:off x="0" y="0"/>
-        <a:ext cx="8968635" cy="5273457"/>
-        <a:chOff x="0" y="0"/>
-        <a:chExt cx="0" cy="0"/>
-      </a:xfrm>
-    </dsp:grpSpPr>
-    <dsp:sp>
+    <dsp:grpSpPr/>
+    <dsp:sp modelId="{001E576D-89BD-4763-9AC5-31DE0BF1A2B0}">
       <dsp:nvSpPr>
-        <dsp:cNvPr id="1" name="同侧圆角矩形 0"/>
+        <dsp:cNvPr id="0" name=""/>
         <dsp:cNvSpPr/>
       </dsp:nvSpPr>
       <dsp:spPr>
@@ -10014,7 +10115,7 @@
             <a:spcAft>
               <a:spcPct val="15000"/>
             </a:spcAft>
-            <a:buChar char="•"/>
+            <a:buChar char="••"/>
           </a:pPr>
           <a:r>
             <a:rPr lang="zh-CN" altLang="en-US" sz="2300" kern="1200" dirty="0" smtClean="0"/>
@@ -10044,9 +10145,9 @@
         <a:ext cx="5673558" cy="1226827"/>
       </dsp:txXfrm>
     </dsp:sp>
-    <dsp:sp>
+    <dsp:sp modelId="{F3D316E4-43BE-49A9-ACEA-CBE477344977}">
       <dsp:nvSpPr>
-        <dsp:cNvPr id="2" name="圆角矩形 1"/>
+        <dsp:cNvPr id="0" name=""/>
         <dsp:cNvSpPr/>
       </dsp:nvSpPr>
       <dsp:spPr>
@@ -10121,9 +10222,9 @@
         <a:ext cx="3062788" cy="1533533"/>
       </dsp:txXfrm>
     </dsp:sp>
-    <dsp:sp>
+    <dsp:sp modelId="{399F7127-3C1C-4E31-823E-71ADC3A6F5C0}">
       <dsp:nvSpPr>
-        <dsp:cNvPr id="3" name="同侧圆角矩形 2"/>
+        <dsp:cNvPr id="0" name=""/>
         <dsp:cNvSpPr/>
       </dsp:nvSpPr>
       <dsp:spPr>
@@ -10187,7 +10288,7 @@
             <a:spcAft>
               <a:spcPct val="15000"/>
             </a:spcAft>
-            <a:buChar char="•"/>
+            <a:buChar char="••"/>
           </a:pPr>
           <a:r>
             <a:rPr lang="en-US" altLang="zh-CN" sz="2300" kern="1200" dirty="0" smtClean="0"/>
@@ -10210,7 +10311,7 @@
             <a:spcAft>
               <a:spcPct val="15000"/>
             </a:spcAft>
-            <a:buChar char="•"/>
+            <a:buChar char="••"/>
           </a:pPr>
           <a:r>
             <a:rPr lang="en-US" altLang="zh-CN" sz="2300" kern="1200" dirty="0" smtClean="0"/>
@@ -10233,7 +10334,7 @@
             <a:spcAft>
               <a:spcPct val="15000"/>
             </a:spcAft>
-            <a:buChar char="•"/>
+            <a:buChar char="••"/>
           </a:pPr>
           <a:endParaRPr lang="zh-CN" altLang="en-US" sz="2300" kern="1200" dirty="0"/>
         </a:p>
@@ -10243,9 +10344,9 @@
         <a:ext cx="5673558" cy="1226827"/>
       </dsp:txXfrm>
     </dsp:sp>
-    <dsp:sp>
+    <dsp:sp modelId="{A962D324-CBAD-449F-A474-863543A6CA86}">
       <dsp:nvSpPr>
-        <dsp:cNvPr id="4" name="圆角矩形 3"/>
+        <dsp:cNvPr id="0" name=""/>
         <dsp:cNvSpPr/>
       </dsp:nvSpPr>
       <dsp:spPr>
@@ -10320,9 +10421,9 @@
         <a:ext cx="3062788" cy="1533533"/>
       </dsp:txXfrm>
     </dsp:sp>
-    <dsp:sp>
+    <dsp:sp modelId="{9268D53B-2568-42FC-AB01-1D13BD7AB530}">
       <dsp:nvSpPr>
-        <dsp:cNvPr id="5" name="同侧圆角矩形 4"/>
+        <dsp:cNvPr id="0" name=""/>
         <dsp:cNvSpPr/>
       </dsp:nvSpPr>
       <dsp:spPr>
@@ -10386,7 +10487,7 @@
             <a:spcAft>
               <a:spcPct val="15000"/>
             </a:spcAft>
-            <a:buChar char="•"/>
+            <a:buChar char="••"/>
           </a:pPr>
           <a:r>
             <a:rPr lang="en-US" altLang="zh-CN" sz="2300" kern="1200" dirty="0" smtClean="0"/>
@@ -10409,7 +10510,7 @@
             <a:spcAft>
               <a:spcPct val="15000"/>
             </a:spcAft>
-            <a:buChar char="•"/>
+            <a:buChar char="••"/>
           </a:pPr>
           <a:r>
             <a:rPr lang="zh-CN" altLang="en-US" sz="2300" kern="1200" dirty="0" smtClean="0"/>
@@ -10423,9 +10524,9 @@
         <a:ext cx="5673558" cy="1226827"/>
       </dsp:txXfrm>
     </dsp:sp>
-    <dsp:sp>
+    <dsp:sp modelId="{3D578473-AF45-4D0F-9D9A-A1B12A5CEC77}">
       <dsp:nvSpPr>
-        <dsp:cNvPr id="6" name="圆角矩形 5"/>
+        <dsp:cNvPr id="0" name=""/>
         <dsp:cNvSpPr/>
       </dsp:nvSpPr>
       <dsp:spPr>
@@ -10505,23 +10606,16 @@
 </file>
 
 <file path=ppt/diagrams/drawing4.xml><?xml version="1.0" encoding="utf-8"?>
-<dsp:drawing xmlns:dgm="http://schemas.openxmlformats.org/drawingml/2006/diagram" xmlns:dsp="http://schemas.microsoft.com/office/drawing/2008/diagram" xmlns:a="http://schemas.openxmlformats.org/drawingml/2006/main" xmlns:r="http://schemas.openxmlformats.org/officeDocument/2006/relationships">
+<dsp:drawing xmlns:dgm="http://schemas.openxmlformats.org/drawingml/2006/diagram" xmlns:dsp="http://schemas.microsoft.com/office/drawing/2008/diagram" xmlns:a="http://schemas.openxmlformats.org/drawingml/2006/main">
   <dsp:spTree>
     <dsp:nvGrpSpPr>
       <dsp:cNvPr id="0" name=""/>
       <dsp:cNvGrpSpPr/>
     </dsp:nvGrpSpPr>
-    <dsp:grpSpPr>
-      <a:xfrm>
-        <a:off x="0" y="0"/>
-        <a:ext cx="11057699" cy="4710366"/>
-        <a:chOff x="0" y="0"/>
-        <a:chExt cx="0" cy="0"/>
-      </a:xfrm>
-    </dsp:grpSpPr>
-    <dsp:sp>
+    <dsp:grpSpPr/>
+    <dsp:sp modelId="{7E201614-3B3B-4AD4-B787-DE920A9F4080}">
       <dsp:nvSpPr>
-        <dsp:cNvPr id="1" name="饼形 0"/>
+        <dsp:cNvPr id="0" name=""/>
         <dsp:cNvSpPr/>
       </dsp:nvSpPr>
       <dsp:spPr>
@@ -10571,9 +10665,9 @@
         </a:fontRef>
       </dsp:style>
     </dsp:sp>
-    <dsp:sp>
+    <dsp:sp modelId="{8F274263-1CE7-4EC0-9F0C-8D05A7046E40}">
       <dsp:nvSpPr>
-        <dsp:cNvPr id="2" name="矩形 1"/>
+        <dsp:cNvPr id="0" name=""/>
         <dsp:cNvSpPr/>
       </dsp:nvSpPr>
       <dsp:spPr>
@@ -10647,9 +10741,9 @@
         <a:ext cx="4351258" cy="1413112"/>
       </dsp:txXfrm>
     </dsp:sp>
-    <dsp:sp>
+    <dsp:sp modelId="{14A4C7EB-374A-4AFD-A1C9-A60E2498A86C}">
       <dsp:nvSpPr>
-        <dsp:cNvPr id="3" name="饼形 2"/>
+        <dsp:cNvPr id="0" name=""/>
         <dsp:cNvSpPr/>
       </dsp:nvSpPr>
       <dsp:spPr>
@@ -10699,9 +10793,9 @@
         </a:fontRef>
       </dsp:style>
     </dsp:sp>
-    <dsp:sp>
+    <dsp:sp modelId="{779B205E-6874-4646-960C-F4B856B5ABE8}">
       <dsp:nvSpPr>
-        <dsp:cNvPr id="4" name="矩形 3"/>
+        <dsp:cNvPr id="0" name=""/>
         <dsp:cNvSpPr/>
       </dsp:nvSpPr>
       <dsp:spPr>
@@ -10775,9 +10869,9 @@
         <a:ext cx="4351258" cy="1413108"/>
       </dsp:txXfrm>
     </dsp:sp>
-    <dsp:sp>
+    <dsp:sp modelId="{E51B650D-ED35-4F8B-9962-409F17C2FE3F}">
       <dsp:nvSpPr>
-        <dsp:cNvPr id="5" name="饼形 4"/>
+        <dsp:cNvPr id="0" name=""/>
         <dsp:cNvSpPr/>
       </dsp:nvSpPr>
       <dsp:spPr>
@@ -10827,9 +10921,9 @@
         </a:fontRef>
       </dsp:style>
     </dsp:sp>
-    <dsp:sp>
+    <dsp:sp modelId="{70D09977-887B-4AE9-87DC-B5E1DC2C8618}">
       <dsp:nvSpPr>
-        <dsp:cNvPr id="6" name="矩形 5"/>
+        <dsp:cNvPr id="0" name=""/>
         <dsp:cNvSpPr/>
       </dsp:nvSpPr>
       <dsp:spPr>
@@ -10903,9 +10997,9 @@
         <a:ext cx="4351258" cy="1413108"/>
       </dsp:txXfrm>
     </dsp:sp>
-    <dsp:sp>
+    <dsp:sp modelId="{4DD91175-4CCB-4B91-93E1-FC6B107E8398}">
       <dsp:nvSpPr>
-        <dsp:cNvPr id="7" name="矩形 6"/>
+        <dsp:cNvPr id="0" name=""/>
         <dsp:cNvSpPr/>
       </dsp:nvSpPr>
       <dsp:spPr>
@@ -10952,7 +11046,7 @@
             <a:spcAft>
               <a:spcPct val="15000"/>
             </a:spcAft>
-            <a:buChar char="•"/>
+            <a:buChar char="••"/>
           </a:pPr>
           <a:r>
             <a:rPr lang="zh-CN" altLang="en-US" sz="2500" kern="1200" dirty="0" smtClean="0"/>
@@ -10966,9 +11060,9 @@
         <a:ext cx="4351258" cy="1413112"/>
       </dsp:txXfrm>
     </dsp:sp>
-    <dsp:sp>
+    <dsp:sp modelId="{B1EB3481-3F28-430E-A396-EF1C1AEDEB9F}">
       <dsp:nvSpPr>
-        <dsp:cNvPr id="8" name="矩形 7"/>
+        <dsp:cNvPr id="0" name=""/>
         <dsp:cNvSpPr/>
       </dsp:nvSpPr>
       <dsp:spPr>
@@ -11015,7 +11109,7 @@
             <a:spcAft>
               <a:spcPct val="15000"/>
             </a:spcAft>
-            <a:buChar char="•"/>
+            <a:buChar char="••"/>
           </a:pPr>
           <a:r>
             <a:rPr lang="zh-CN" altLang="en-US" sz="2500" kern="1200" dirty="0" smtClean="0"/>
@@ -11034,7 +11128,7 @@
             <a:spcAft>
               <a:spcPct val="15000"/>
             </a:spcAft>
-            <a:buChar char="•"/>
+            <a:buChar char="••"/>
           </a:pPr>
           <a:r>
             <a:rPr lang="zh-CN" altLang="en-US" sz="2500" kern="1200" dirty="0" smtClean="0"/>
@@ -11048,9 +11142,9 @@
         <a:ext cx="4351258" cy="1413108"/>
       </dsp:txXfrm>
     </dsp:sp>
-    <dsp:sp>
+    <dsp:sp modelId="{8507B361-43A4-4B00-8266-3A5DD9BAAA8A}">
       <dsp:nvSpPr>
-        <dsp:cNvPr id="9" name="矩形 8"/>
+        <dsp:cNvPr id="0" name=""/>
         <dsp:cNvSpPr/>
       </dsp:nvSpPr>
       <dsp:spPr>
@@ -11097,7 +11191,7 @@
             <a:spcAft>
               <a:spcPct val="15000"/>
             </a:spcAft>
-            <a:buChar char="•"/>
+            <a:buChar char="••"/>
           </a:pPr>
           <a:r>
             <a:rPr lang="zh-CN" altLang="en-US" sz="2500" kern="1200" dirty="0" smtClean="0"/>
@@ -11124,23 +11218,16 @@
 </file>
 
 <file path=ppt/diagrams/drawing5.xml><?xml version="1.0" encoding="utf-8"?>
-<dsp:drawing xmlns:dgm="http://schemas.openxmlformats.org/drawingml/2006/diagram" xmlns:dsp="http://schemas.microsoft.com/office/drawing/2008/diagram" xmlns:a="http://schemas.openxmlformats.org/drawingml/2006/main" xmlns:r="http://schemas.openxmlformats.org/officeDocument/2006/relationships">
+<dsp:drawing xmlns:dgm="http://schemas.openxmlformats.org/drawingml/2006/diagram" xmlns:dsp="http://schemas.microsoft.com/office/drawing/2008/diagram" xmlns:a="http://schemas.openxmlformats.org/drawingml/2006/main">
   <dsp:spTree>
     <dsp:nvGrpSpPr>
       <dsp:cNvPr id="0" name=""/>
       <dsp:cNvGrpSpPr/>
     </dsp:nvGrpSpPr>
-    <dsp:grpSpPr>
-      <a:xfrm>
-        <a:off x="0" y="0"/>
-        <a:ext cx="5408460" cy="2706201"/>
-        <a:chOff x="0" y="0"/>
-        <a:chExt cx="0" cy="0"/>
-      </a:xfrm>
-    </dsp:grpSpPr>
-    <dsp:sp>
+    <dsp:grpSpPr/>
+    <dsp:sp modelId="{2F5E6A9B-7A21-4785-BAF1-F9F1CFC684BB}">
       <dsp:nvSpPr>
-        <dsp:cNvPr id="1" name="圆角矩形 0"/>
+        <dsp:cNvPr id="0" name=""/>
         <dsp:cNvSpPr/>
       </dsp:nvSpPr>
       <dsp:spPr>
@@ -11215,9 +11302,9 @@
         <a:ext cx="5345634" cy="580674"/>
       </dsp:txXfrm>
     </dsp:sp>
-    <dsp:sp>
+    <dsp:sp modelId="{98BA2F7B-50FF-4082-A415-82158AD29035}">
       <dsp:nvSpPr>
-        <dsp:cNvPr id="2" name="矩形 1"/>
+        <dsp:cNvPr id="0" name=""/>
         <dsp:cNvSpPr/>
       </dsp:nvSpPr>
       <dsp:spPr>
@@ -11262,7 +11349,7 @@
             <a:spcAft>
               <a:spcPct val="20000"/>
             </a:spcAft>
-            <a:buChar char="•"/>
+            <a:buChar char="••"/>
           </a:pPr>
           <a:r>
             <a:rPr lang="zh-CN" altLang="en-US" sz="2000" kern="1200" dirty="0" smtClean="0"/>
@@ -11276,9 +11363,9 @@
         <a:ext cx="5408460" cy="672750"/>
       </dsp:txXfrm>
     </dsp:sp>
-    <dsp:sp>
+    <dsp:sp modelId="{A2C68BA3-B3EA-4021-8E3E-D52398495AFC}">
       <dsp:nvSpPr>
-        <dsp:cNvPr id="3" name="圆角矩形 2"/>
+        <dsp:cNvPr id="0" name=""/>
         <dsp:cNvSpPr/>
       </dsp:nvSpPr>
       <dsp:spPr>
@@ -11353,9 +11440,9 @@
         <a:ext cx="5345634" cy="580674"/>
       </dsp:txXfrm>
     </dsp:sp>
-    <dsp:sp>
+    <dsp:sp modelId="{BBA439B9-2D33-42AF-95A4-B87D4EA42CAB}">
       <dsp:nvSpPr>
-        <dsp:cNvPr id="4" name="矩形 3"/>
+        <dsp:cNvPr id="0" name=""/>
         <dsp:cNvSpPr/>
       </dsp:nvSpPr>
       <dsp:spPr>
@@ -11400,7 +11487,7 @@
             <a:spcAft>
               <a:spcPct val="20000"/>
             </a:spcAft>
-            <a:buChar char="•"/>
+            <a:buChar char="••"/>
           </a:pPr>
           <a:r>
             <a:rPr lang="zh-CN" altLang="en-US" sz="2000" kern="1200" dirty="0" smtClean="0"/>
@@ -11419,23 +11506,16 @@
 </file>
 
 <file path=ppt/diagrams/drawing6.xml><?xml version="1.0" encoding="utf-8"?>
-<dsp:drawing xmlns:dgm="http://schemas.openxmlformats.org/drawingml/2006/diagram" xmlns:dsp="http://schemas.microsoft.com/office/drawing/2008/diagram" xmlns:a="http://schemas.openxmlformats.org/drawingml/2006/main" xmlns:r="http://schemas.openxmlformats.org/officeDocument/2006/relationships">
+<dsp:drawing xmlns:dgm="http://schemas.openxmlformats.org/drawingml/2006/diagram" xmlns:dsp="http://schemas.microsoft.com/office/drawing/2008/diagram" xmlns:a="http://schemas.openxmlformats.org/drawingml/2006/main">
   <dsp:spTree>
     <dsp:nvGrpSpPr>
       <dsp:cNvPr id="0" name=""/>
       <dsp:cNvGrpSpPr/>
     </dsp:nvGrpSpPr>
-    <dsp:grpSpPr>
-      <a:xfrm>
-        <a:off x="0" y="0"/>
-        <a:ext cx="5408460" cy="2706201"/>
-        <a:chOff x="0" y="0"/>
-        <a:chExt cx="0" cy="0"/>
-      </a:xfrm>
-    </dsp:grpSpPr>
-    <dsp:sp>
+    <dsp:grpSpPr/>
+    <dsp:sp modelId="{2F5E6A9B-7A21-4785-BAF1-F9F1CFC684BB}">
       <dsp:nvSpPr>
-        <dsp:cNvPr id="1" name="圆角矩形 0"/>
+        <dsp:cNvPr id="0" name=""/>
         <dsp:cNvSpPr/>
       </dsp:nvSpPr>
       <dsp:spPr>
@@ -11510,9 +11590,9 @@
         <a:ext cx="5330556" cy="720036"/>
       </dsp:txXfrm>
     </dsp:sp>
-    <dsp:sp>
+    <dsp:sp modelId="{98BA2F7B-50FF-4082-A415-82158AD29035}">
       <dsp:nvSpPr>
-        <dsp:cNvPr id="2" name="矩形 1"/>
+        <dsp:cNvPr id="0" name=""/>
         <dsp:cNvSpPr/>
       </dsp:nvSpPr>
       <dsp:spPr>
@@ -11557,7 +11637,7 @@
             <a:spcAft>
               <a:spcPct val="20000"/>
             </a:spcAft>
-            <a:buChar char="•"/>
+            <a:buChar char="••"/>
           </a:pPr>
           <a:r>
             <a:rPr lang="zh-CN" altLang="en-US" sz="2400" kern="1200" dirty="0" smtClean="0"/>
@@ -11571,9 +11651,9 @@
         <a:ext cx="5408460" cy="513360"/>
       </dsp:txXfrm>
     </dsp:sp>
-    <dsp:sp>
+    <dsp:sp modelId="{A2C68BA3-B3EA-4021-8E3E-D52398495AFC}">
       <dsp:nvSpPr>
-        <dsp:cNvPr id="3" name="圆角矩形 2"/>
+        <dsp:cNvPr id="0" name=""/>
         <dsp:cNvSpPr/>
       </dsp:nvSpPr>
       <dsp:spPr>
@@ -11652,9 +11732,9 @@
         <a:ext cx="5330556" cy="720036"/>
       </dsp:txXfrm>
     </dsp:sp>
-    <dsp:sp>
+    <dsp:sp modelId="{BBA439B9-2D33-42AF-95A4-B87D4EA42CAB}">
       <dsp:nvSpPr>
-        <dsp:cNvPr id="4" name="矩形 3"/>
+        <dsp:cNvPr id="0" name=""/>
         <dsp:cNvSpPr/>
       </dsp:nvSpPr>
       <dsp:spPr>
@@ -11699,7 +11779,7 @@
             <a:spcAft>
               <a:spcPct val="20000"/>
             </a:spcAft>
-            <a:buChar char="•"/>
+            <a:buChar char="••"/>
           </a:pPr>
           <a:r>
             <a:rPr lang="zh-CN" altLang="en-US" sz="2400" kern="1200" dirty="0" smtClean="0"/>
@@ -22087,6 +22167,7 @@
           <a:p>
             <a:fld id="{2EF5AC47-1AC4-47CE-A93B-69BD784FE48A}" type="datetimeFigureOut">
               <a:rPr lang="en-US" altLang="zh-CN"/>
+              <a:t>3/10/2016</a:t>
             </a:fld>
             <a:endParaRPr lang="zh-CN"/>
           </a:p>
@@ -22151,13 +22232,19 @@
           </a:lstStyle>
           <a:p>
             <a:fld id="{4D43AAD8-78B0-4EF6-84C7-32A82E764FCB}" type="slidenum">
-              <a:rPr lang="zh-CN"/>
+              <a:rPr lang="en-US" altLang="zh-CN"/>
+              <a:t>‹#›</a:t>
             </a:fld>
             <a:endParaRPr lang="zh-CN"/>
           </a:p>
         </p:txBody>
       </p:sp>
     </p:spTree>
+    <p:extLst>
+      <p:ext uri="{BB962C8B-B14F-4D97-AF65-F5344CB8AC3E}">
+        <p14:creationId xmlns:p14="http://schemas.microsoft.com/office/powerpoint/2010/main" val="843223556"/>
+      </p:ext>
+    </p:extLst>
   </p:cSld>
   <p:clrMap bg1="lt1" tx1="dk1" bg2="lt2" tx2="dk2" accent1="accent1" accent2="accent2" accent3="accent3" accent4="accent4" accent5="accent5" accent6="accent6" hlink="hlink" folHlink="folHlink"/>
 </p:handoutMaster>
@@ -22244,7 +22331,8 @@
           </a:lstStyle>
           <a:p>
             <a:fld id="{4AD7794F-1BC9-4278-AE26-4DD2F6BD4056}" type="datetimeFigureOut">
-              <a:rPr/>
+              <a:rPr lang="zh-CN" altLang="en-US"/>
+              <a:t>2016/3/10</a:t>
             </a:fld>
             <a:endParaRPr lang="zh-CN"/>
           </a:p>
@@ -22311,7 +22399,6 @@
               <a:rPr lang="zh-CN"/>
               <a:t>单击此处编辑母版文本样式</a:t>
             </a:r>
-            <a:endParaRPr lang="zh-CN"/>
           </a:p>
           <a:p>
             <a:pPr lvl="1"/>
@@ -22319,7 +22406,6 @@
               <a:rPr lang="zh-CN"/>
               <a:t>第二级</a:t>
             </a:r>
-            <a:endParaRPr lang="zh-CN"/>
           </a:p>
           <a:p>
             <a:pPr lvl="2"/>
@@ -22327,7 +22413,6 @@
               <a:rPr lang="zh-CN"/>
               <a:t>第三级</a:t>
             </a:r>
-            <a:endParaRPr lang="zh-CN"/>
           </a:p>
           <a:p>
             <a:pPr lvl="3"/>
@@ -22335,7 +22420,6 @@
               <a:rPr lang="zh-CN"/>
               <a:t>第四级</a:t>
             </a:r>
-            <a:endParaRPr lang="zh-CN"/>
           </a:p>
           <a:p>
             <a:pPr lvl="4"/>
@@ -22343,7 +22427,6 @@
               <a:rPr lang="zh-CN"/>
               <a:t>第五级</a:t>
             </a:r>
-            <a:endParaRPr lang="zh-CN"/>
           </a:p>
         </p:txBody>
       </p:sp>
@@ -22407,12 +22490,18 @@
           <a:p>
             <a:fld id="{5E984417-8091-4A5A-B5F1-70C19F410C1B}" type="slidenum">
               <a:rPr/>
+              <a:t>‹#›</a:t>
             </a:fld>
             <a:endParaRPr lang="zh-CN"/>
           </a:p>
         </p:txBody>
       </p:sp>
     </p:spTree>
+    <p:extLst>
+      <p:ext uri="{BB962C8B-B14F-4D97-AF65-F5344CB8AC3E}">
+        <p14:creationId xmlns:p14="http://schemas.microsoft.com/office/powerpoint/2010/main" val="257048759"/>
+      </p:ext>
+    </p:extLst>
   </p:cSld>
   <p:clrMap bg1="lt1" tx1="dk1" bg2="lt2" tx2="dk2" accent1="accent1" accent2="accent2" accent3="accent3" accent4="accent4" accent5="accent5" accent6="accent6" hlink="hlink" folHlink="folHlink"/>
   <p:notesStyle>
@@ -22651,7 +22740,8 @@
           <a:lstStyle/>
           <a:p>
             <a:fld id="{A8224893-DBDA-4BFA-9CE1-4BFE7CD0F8CF}" type="datetime1">
-              <a:rPr/>
+              <a:rPr lang="zh-CN" altLang="en-US"/>
+              <a:t>2016/3/10</a:t>
             </a:fld>
             <a:endParaRPr lang="zh-CN"/>
           </a:p>
@@ -22693,6 +22783,7 @@
           <a:p>
             <a:fld id="{4FAB73BC-B049-4115-A692-8D63A059BFB8}" type="slidenum">
               <a:rPr/>
+              <a:t>‹#›</a:t>
             </a:fld>
             <a:endParaRPr lang="zh-CN"/>
           </a:p>
@@ -22766,7 +22857,6 @@
               <a:rPr lang="zh-CN" altLang="en-US" smtClean="0"/>
               <a:t>单击此处编辑母版文本样式</a:t>
             </a:r>
-            <a:endParaRPr lang="zh-CN" altLang="en-US" smtClean="0"/>
           </a:p>
           <a:p>
             <a:pPr lvl="1"/>
@@ -22774,7 +22864,6 @@
               <a:rPr lang="zh-CN" altLang="en-US" smtClean="0"/>
               <a:t>第二级</a:t>
             </a:r>
-            <a:endParaRPr lang="zh-CN" altLang="en-US" smtClean="0"/>
           </a:p>
           <a:p>
             <a:pPr lvl="2"/>
@@ -22782,7 +22871,6 @@
               <a:rPr lang="zh-CN" altLang="en-US" smtClean="0"/>
               <a:t>第三级</a:t>
             </a:r>
-            <a:endParaRPr lang="zh-CN" altLang="en-US" smtClean="0"/>
           </a:p>
           <a:p>
             <a:pPr lvl="3"/>
@@ -22790,7 +22878,6 @@
               <a:rPr lang="zh-CN" altLang="en-US" smtClean="0"/>
               <a:t>第四级</a:t>
             </a:r>
-            <a:endParaRPr lang="zh-CN" altLang="en-US" smtClean="0"/>
           </a:p>
           <a:p>
             <a:pPr lvl="4"/>
@@ -22818,7 +22905,8 @@
           <a:lstStyle/>
           <a:p>
             <a:fld id="{5F4E5243-F52A-4D37-9694-EB26C6C31910}" type="datetime1">
-              <a:rPr/>
+              <a:rPr lang="zh-CN" altLang="en-US"/>
+              <a:t>2016/3/10</a:t>
             </a:fld>
             <a:endParaRPr lang="zh-CN"/>
           </a:p>
@@ -22860,6 +22948,7 @@
           <a:p>
             <a:fld id="{4FAB73BC-B049-4115-A692-8D63A059BFB8}" type="slidenum">
               <a:rPr/>
+              <a:t>‹#›</a:t>
             </a:fld>
             <a:endParaRPr lang="zh-CN"/>
           </a:p>
@@ -22943,7 +23032,6 @@
               <a:rPr lang="zh-CN" altLang="en-US" smtClean="0"/>
               <a:t>单击此处编辑母版文本样式</a:t>
             </a:r>
-            <a:endParaRPr lang="zh-CN" altLang="en-US" smtClean="0"/>
           </a:p>
           <a:p>
             <a:pPr lvl="1"/>
@@ -22951,7 +23039,6 @@
               <a:rPr lang="zh-CN" altLang="en-US" smtClean="0"/>
               <a:t>第二级</a:t>
             </a:r>
-            <a:endParaRPr lang="zh-CN" altLang="en-US" smtClean="0"/>
           </a:p>
           <a:p>
             <a:pPr lvl="2"/>
@@ -22959,7 +23046,6 @@
               <a:rPr lang="zh-CN" altLang="en-US" smtClean="0"/>
               <a:t>第三级</a:t>
             </a:r>
-            <a:endParaRPr lang="zh-CN" altLang="en-US" smtClean="0"/>
           </a:p>
           <a:p>
             <a:pPr lvl="3"/>
@@ -22967,7 +23053,6 @@
               <a:rPr lang="zh-CN" altLang="en-US" smtClean="0"/>
               <a:t>第四级</a:t>
             </a:r>
-            <a:endParaRPr lang="zh-CN" altLang="en-US" smtClean="0"/>
           </a:p>
           <a:p>
             <a:pPr lvl="4"/>
@@ -22995,7 +23080,8 @@
           <a:lstStyle/>
           <a:p>
             <a:fld id="{3A77B6E1-634A-48DC-9E8B-D894023267EF}" type="datetime1">
-              <a:rPr/>
+              <a:rPr lang="zh-CN" altLang="en-US"/>
+              <a:t>2016/3/10</a:t>
             </a:fld>
             <a:endParaRPr lang="zh-CN"/>
           </a:p>
@@ -23037,6 +23123,7 @@
           <a:p>
             <a:fld id="{4FAB73BC-B049-4115-A692-8D63A059BFB8}" type="slidenum">
               <a:rPr/>
+              <a:t>‹#›</a:t>
             </a:fld>
             <a:endParaRPr lang="zh-CN"/>
           </a:p>
@@ -23051,7 +23138,7 @@
 </file>
 
 <file path=ppt/slideLayouts/slideLayout12.xml><?xml version="1.0" encoding="utf-8"?>
-<p:sldLayout xmlns:a="http://schemas.openxmlformats.org/drawingml/2006/main" xmlns:r="http://schemas.openxmlformats.org/officeDocument/2006/relationships" xmlns:p="http://schemas.openxmlformats.org/presentationml/2006/main" type="title" preserve="1" showMasterSp="0">
+<p:sldLayout xmlns:a="http://schemas.openxmlformats.org/drawingml/2006/main" xmlns:r="http://schemas.openxmlformats.org/officeDocument/2006/relationships" xmlns:p="http://schemas.openxmlformats.org/presentationml/2006/main" showMasterSp="0" type="title" preserve="1">
   <p:cSld name="标题幻灯片">
     <p:spTree>
       <p:nvGrpSpPr>
@@ -23772,6 +23859,7 @@
           <a:p>
             <a:fld id="{A8224893-DBDA-4BFA-9CE1-4BFE7CD0F8CF}" type="datetime1">
               <a:rPr lang="zh-CN" altLang="en-US" smtClean="0"/>
+              <a:t>2016/3/10</a:t>
             </a:fld>
             <a:endParaRPr lang="zh-CN"/>
           </a:p>
@@ -23813,6 +23901,7 @@
           <a:p>
             <a:fld id="{4FAB73BC-B049-4115-A692-8D63A059BFB8}" type="slidenum">
               <a:rPr lang="en-US" altLang="zh-CN" smtClean="0"/>
+              <a:t>‹#›</a:t>
             </a:fld>
             <a:endParaRPr lang="zh-CN" altLang="en-US"/>
           </a:p>
@@ -23892,7 +23981,6 @@
               <a:rPr lang="zh-CN" altLang="en-US" smtClean="0"/>
               <a:t>单击此处编辑母版文本样式</a:t>
             </a:r>
-            <a:endParaRPr lang="zh-CN" altLang="en-US" smtClean="0"/>
           </a:p>
           <a:p>
             <a:pPr lvl="1"/>
@@ -23900,7 +23988,6 @@
               <a:rPr lang="zh-CN" altLang="en-US" smtClean="0"/>
               <a:t>第二级</a:t>
             </a:r>
-            <a:endParaRPr lang="zh-CN" altLang="en-US" smtClean="0"/>
           </a:p>
           <a:p>
             <a:pPr lvl="2"/>
@@ -23908,7 +23995,6 @@
               <a:rPr lang="zh-CN" altLang="en-US" smtClean="0"/>
               <a:t>第三级</a:t>
             </a:r>
-            <a:endParaRPr lang="zh-CN" altLang="en-US" smtClean="0"/>
           </a:p>
           <a:p>
             <a:pPr lvl="3"/>
@@ -23916,7 +24002,6 @@
               <a:rPr lang="zh-CN" altLang="en-US" smtClean="0"/>
               <a:t>第四级</a:t>
             </a:r>
-            <a:endParaRPr lang="zh-CN" altLang="en-US" smtClean="0"/>
           </a:p>
           <a:p>
             <a:pPr lvl="4"/>
@@ -23945,6 +24030,7 @@
           <a:p>
             <a:fld id="{7B2D3E9E-A95C-48F2-B4BF-A71542E0BE9A}" type="datetime1">
               <a:rPr lang="zh-CN" altLang="en-US" smtClean="0"/>
+              <a:t>2016/3/10</a:t>
             </a:fld>
             <a:endParaRPr lang="zh-CN"/>
           </a:p>
@@ -23986,6 +24072,7 @@
           <a:p>
             <a:fld id="{4FAB73BC-B049-4115-A692-8D63A059BFB8}" type="slidenum">
               <a:rPr lang="en-US" altLang="zh-CN" smtClean="0"/>
+              <a:t>‹#›</a:t>
             </a:fld>
             <a:endParaRPr lang="zh-CN" altLang="en-US"/>
           </a:p>
@@ -24165,7 +24252,6 @@
               <a:rPr lang="zh-CN" altLang="en-US" smtClean="0"/>
               <a:t>单击此处编辑母版文本样式</a:t>
             </a:r>
-            <a:endParaRPr lang="zh-CN" altLang="en-US" smtClean="0"/>
           </a:p>
         </p:txBody>
       </p:sp>
@@ -24186,6 +24272,7 @@
           <a:p>
             <a:fld id="{A50F84E2-2D7A-43CF-AC90-352A289A783A}" type="datetime1">
               <a:rPr lang="zh-CN" altLang="en-US" smtClean="0"/>
+              <a:t>2016/3/10</a:t>
             </a:fld>
             <a:endParaRPr lang="zh-CN"/>
           </a:p>
@@ -24227,6 +24314,7 @@
           <a:p>
             <a:fld id="{4FAB73BC-B049-4115-A692-8D63A059BFB8}" type="slidenum">
               <a:rPr lang="en-US" altLang="zh-CN" smtClean="0"/>
+              <a:t>‹#›</a:t>
             </a:fld>
             <a:endParaRPr lang="zh-CN" altLang="en-US"/>
           </a:p>
@@ -24305,7 +24393,6 @@
               <a:rPr lang="zh-CN" altLang="en-US" smtClean="0"/>
               <a:t>单击此处编辑母版文本样式</a:t>
             </a:r>
-            <a:endParaRPr lang="zh-CN" altLang="en-US" smtClean="0"/>
           </a:p>
           <a:p>
             <a:pPr lvl="1"/>
@@ -24313,7 +24400,6 @@
               <a:rPr lang="zh-CN" altLang="en-US" smtClean="0"/>
               <a:t>第二级</a:t>
             </a:r>
-            <a:endParaRPr lang="zh-CN" altLang="en-US" smtClean="0"/>
           </a:p>
           <a:p>
             <a:pPr lvl="2"/>
@@ -24321,7 +24407,6 @@
               <a:rPr lang="zh-CN" altLang="en-US" smtClean="0"/>
               <a:t>第三级</a:t>
             </a:r>
-            <a:endParaRPr lang="zh-CN" altLang="en-US" smtClean="0"/>
           </a:p>
           <a:p>
             <a:pPr lvl="3"/>
@@ -24329,7 +24414,6 @@
               <a:rPr lang="zh-CN" altLang="en-US" smtClean="0"/>
               <a:t>第四级</a:t>
             </a:r>
-            <a:endParaRPr lang="zh-CN" altLang="en-US" smtClean="0"/>
           </a:p>
           <a:p>
             <a:pPr lvl="4"/>
@@ -24366,7 +24450,6 @@
               <a:rPr lang="zh-CN" altLang="en-US" smtClean="0"/>
               <a:t>单击此处编辑母版文本样式</a:t>
             </a:r>
-            <a:endParaRPr lang="zh-CN" altLang="en-US" smtClean="0"/>
           </a:p>
           <a:p>
             <a:pPr lvl="1"/>
@@ -24374,7 +24457,6 @@
               <a:rPr lang="zh-CN" altLang="en-US" smtClean="0"/>
               <a:t>第二级</a:t>
             </a:r>
-            <a:endParaRPr lang="zh-CN" altLang="en-US" smtClean="0"/>
           </a:p>
           <a:p>
             <a:pPr lvl="2"/>
@@ -24382,7 +24464,6 @@
               <a:rPr lang="zh-CN" altLang="en-US" smtClean="0"/>
               <a:t>第三级</a:t>
             </a:r>
-            <a:endParaRPr lang="zh-CN" altLang="en-US" smtClean="0"/>
           </a:p>
           <a:p>
             <a:pPr lvl="3"/>
@@ -24390,7 +24471,6 @@
               <a:rPr lang="zh-CN" altLang="en-US" smtClean="0"/>
               <a:t>第四级</a:t>
             </a:r>
-            <a:endParaRPr lang="zh-CN" altLang="en-US" smtClean="0"/>
           </a:p>
           <a:p>
             <a:pPr lvl="4"/>
@@ -24419,6 +24499,7 @@
           <a:p>
             <a:fld id="{F12952B5-7A2F-4CC8-B7CE-9234E21C2837}" type="datetime1">
               <a:rPr lang="zh-CN" altLang="en-US" smtClean="0"/>
+              <a:t>2016/3/10</a:t>
             </a:fld>
             <a:endParaRPr lang="zh-CN"/>
           </a:p>
@@ -24460,6 +24541,7 @@
           <a:p>
             <a:fld id="{4FAB73BC-B049-4115-A692-8D63A059BFB8}" type="slidenum">
               <a:rPr lang="en-US" altLang="zh-CN" smtClean="0"/>
+              <a:t>‹#›</a:t>
             </a:fld>
             <a:endParaRPr lang="zh-CN" altLang="en-US"/>
           </a:p>
@@ -24581,7 +24663,6 @@
               <a:rPr lang="zh-CN" altLang="en-US" smtClean="0"/>
               <a:t>单击此处编辑母版文本样式</a:t>
             </a:r>
-            <a:endParaRPr lang="zh-CN" altLang="en-US" smtClean="0"/>
           </a:p>
         </p:txBody>
       </p:sp>
@@ -24612,7 +24693,6 @@
               <a:rPr lang="zh-CN" altLang="en-US" smtClean="0"/>
               <a:t>单击此处编辑母版文本样式</a:t>
             </a:r>
-            <a:endParaRPr lang="zh-CN" altLang="en-US" smtClean="0"/>
           </a:p>
           <a:p>
             <a:pPr lvl="1"/>
@@ -24620,7 +24700,6 @@
               <a:rPr lang="zh-CN" altLang="en-US" smtClean="0"/>
               <a:t>第二级</a:t>
             </a:r>
-            <a:endParaRPr lang="zh-CN" altLang="en-US" smtClean="0"/>
           </a:p>
           <a:p>
             <a:pPr lvl="2"/>
@@ -24628,7 +24707,6 @@
               <a:rPr lang="zh-CN" altLang="en-US" smtClean="0"/>
               <a:t>第三级</a:t>
             </a:r>
-            <a:endParaRPr lang="zh-CN" altLang="en-US" smtClean="0"/>
           </a:p>
           <a:p>
             <a:pPr lvl="3"/>
@@ -24636,7 +24714,6 @@
               <a:rPr lang="zh-CN" altLang="en-US" smtClean="0"/>
               <a:t>第四级</a:t>
             </a:r>
-            <a:endParaRPr lang="zh-CN" altLang="en-US" smtClean="0"/>
           </a:p>
           <a:p>
             <a:pPr lvl="4"/>
@@ -24712,7 +24789,6 @@
               <a:rPr lang="zh-CN" altLang="en-US" smtClean="0"/>
               <a:t>单击此处编辑母版文本样式</a:t>
             </a:r>
-            <a:endParaRPr lang="zh-CN" altLang="en-US" smtClean="0"/>
           </a:p>
         </p:txBody>
       </p:sp>
@@ -24743,7 +24819,6 @@
               <a:rPr lang="zh-CN" altLang="en-US" smtClean="0"/>
               <a:t>单击此处编辑母版文本样式</a:t>
             </a:r>
-            <a:endParaRPr lang="zh-CN" altLang="en-US" smtClean="0"/>
           </a:p>
           <a:p>
             <a:pPr lvl="1"/>
@@ -24751,7 +24826,6 @@
               <a:rPr lang="zh-CN" altLang="en-US" smtClean="0"/>
               <a:t>第二级</a:t>
             </a:r>
-            <a:endParaRPr lang="zh-CN" altLang="en-US" smtClean="0"/>
           </a:p>
           <a:p>
             <a:pPr lvl="2"/>
@@ -24759,7 +24833,6 @@
               <a:rPr lang="zh-CN" altLang="en-US" smtClean="0"/>
               <a:t>第三级</a:t>
             </a:r>
-            <a:endParaRPr lang="zh-CN" altLang="en-US" smtClean="0"/>
           </a:p>
           <a:p>
             <a:pPr lvl="3"/>
@@ -24767,7 +24840,6 @@
               <a:rPr lang="zh-CN" altLang="en-US" smtClean="0"/>
               <a:t>第四级</a:t>
             </a:r>
-            <a:endParaRPr lang="zh-CN" altLang="en-US" smtClean="0"/>
           </a:p>
           <a:p>
             <a:pPr lvl="4"/>
@@ -24796,6 +24868,7 @@
           <a:p>
             <a:fld id="{CE1DA07A-9201-4B4B-BAF2-015AFA30F520}" type="datetime1">
               <a:rPr lang="zh-CN" altLang="en-US" smtClean="0"/>
+              <a:t>2016/3/10</a:t>
             </a:fld>
             <a:endParaRPr lang="zh-CN"/>
           </a:p>
@@ -24837,6 +24910,7 @@
           <a:p>
             <a:fld id="{4FAB73BC-B049-4115-A692-8D63A059BFB8}" type="slidenum">
               <a:rPr lang="en-US" altLang="zh-CN" smtClean="0"/>
+              <a:t>‹#›</a:t>
             </a:fld>
             <a:endParaRPr lang="zh-CN" altLang="en-US"/>
           </a:p>
@@ -24912,6 +24986,7 @@
           <a:p>
             <a:fld id="{73D7E00A-486F-4252-8B1D-E32645521F49}" type="datetime1">
               <a:rPr lang="zh-CN" altLang="en-US" smtClean="0"/>
+              <a:t>2016/3/10</a:t>
             </a:fld>
             <a:endParaRPr lang="zh-CN"/>
           </a:p>
@@ -24953,6 +25028,7 @@
           <a:p>
             <a:fld id="{4FAB73BC-B049-4115-A692-8D63A059BFB8}" type="slidenum">
               <a:rPr lang="en-US" altLang="zh-CN" smtClean="0"/>
+              <a:t>‹#›</a:t>
             </a:fld>
             <a:endParaRPr lang="zh-CN" altLang="en-US"/>
           </a:p>
@@ -25000,6 +25076,7 @@
           <a:p>
             <a:fld id="{8DDF5F92-E675-4B36-9A60-69A962A68675}" type="datetime1">
               <a:rPr lang="zh-CN" altLang="en-US" smtClean="0"/>
+              <a:t>2016/3/10</a:t>
             </a:fld>
             <a:endParaRPr lang="zh-CN"/>
           </a:p>
@@ -25041,6 +25118,7 @@
           <a:p>
             <a:fld id="{4FAB73BC-B049-4115-A692-8D63A059BFB8}" type="slidenum">
               <a:rPr lang="en-US" altLang="zh-CN" smtClean="0"/>
+              <a:t>‹#›</a:t>
             </a:fld>
             <a:endParaRPr lang="zh-CN" altLang="en-US"/>
           </a:p>
@@ -25132,7 +25210,6 @@
               <a:rPr lang="zh-CN" altLang="en-US" smtClean="0"/>
               <a:t>单击此处编辑母版文本样式</a:t>
             </a:r>
-            <a:endParaRPr lang="zh-CN" altLang="en-US" smtClean="0"/>
           </a:p>
           <a:p>
             <a:pPr lvl="1"/>
@@ -25140,7 +25217,6 @@
               <a:rPr lang="zh-CN" altLang="en-US" smtClean="0"/>
               <a:t>第二级</a:t>
             </a:r>
-            <a:endParaRPr lang="zh-CN" altLang="en-US" smtClean="0"/>
           </a:p>
           <a:p>
             <a:pPr lvl="2"/>
@@ -25148,7 +25224,6 @@
               <a:rPr lang="zh-CN" altLang="en-US" smtClean="0"/>
               <a:t>第三级</a:t>
             </a:r>
-            <a:endParaRPr lang="zh-CN" altLang="en-US" smtClean="0"/>
           </a:p>
           <a:p>
             <a:pPr lvl="3"/>
@@ -25156,7 +25231,6 @@
               <a:rPr lang="zh-CN" altLang="en-US" smtClean="0"/>
               <a:t>第四级</a:t>
             </a:r>
-            <a:endParaRPr lang="zh-CN" altLang="en-US" smtClean="0"/>
           </a:p>
           <a:p>
             <a:pPr lvl="4"/>
@@ -25232,7 +25306,6 @@
               <a:rPr lang="zh-CN" altLang="en-US" smtClean="0"/>
               <a:t>单击此处编辑母版文本样式</a:t>
             </a:r>
-            <a:endParaRPr lang="zh-CN" altLang="en-US" smtClean="0"/>
           </a:p>
         </p:txBody>
       </p:sp>
@@ -25253,6 +25326,7 @@
           <a:p>
             <a:fld id="{5586B75A-687E-405C-8A0B-8D00578BA2C3}" type="datetime1">
               <a:rPr lang="en-US" altLang="zh-CN" smtClean="0"/>
+              <a:t>3/10/2016</a:t>
             </a:fld>
             <a:endParaRPr lang="zh-CN" altLang="en-US"/>
           </a:p>
@@ -25294,6 +25368,7 @@
           <a:p>
             <a:fld id="{4FAB73BC-B049-4115-A692-8D63A059BFB8}" type="slidenum">
               <a:rPr lang="en-US" altLang="zh-CN" smtClean="0"/>
+              <a:t>‹#›</a:t>
             </a:fld>
             <a:endParaRPr lang="en-US" altLang="zh-CN"/>
           </a:p>
@@ -25368,7 +25443,6 @@
               <a:rPr lang="zh-CN" altLang="en-US" smtClean="0"/>
               <a:t>单击此处编辑母版文本样式</a:t>
             </a:r>
-            <a:endParaRPr lang="zh-CN" altLang="en-US" smtClean="0"/>
           </a:p>
           <a:p>
             <a:pPr lvl="1"/>
@@ -25376,7 +25450,6 @@
               <a:rPr lang="zh-CN" altLang="en-US" smtClean="0"/>
               <a:t>第二级</a:t>
             </a:r>
-            <a:endParaRPr lang="zh-CN" altLang="en-US" smtClean="0"/>
           </a:p>
           <a:p>
             <a:pPr lvl="2"/>
@@ -25384,7 +25457,6 @@
               <a:rPr lang="zh-CN" altLang="en-US" smtClean="0"/>
               <a:t>第三级</a:t>
             </a:r>
-            <a:endParaRPr lang="zh-CN" altLang="en-US" smtClean="0"/>
           </a:p>
           <a:p>
             <a:pPr lvl="3"/>
@@ -25392,7 +25464,6 @@
               <a:rPr lang="zh-CN" altLang="en-US" smtClean="0"/>
               <a:t>第四级</a:t>
             </a:r>
-            <a:endParaRPr lang="zh-CN" altLang="en-US" smtClean="0"/>
           </a:p>
           <a:p>
             <a:pPr lvl="4"/>
@@ -25420,7 +25491,8 @@
           <a:lstStyle/>
           <a:p>
             <a:fld id="{7B2D3E9E-A95C-48F2-B4BF-A71542E0BE9A}" type="datetime1">
-              <a:rPr/>
+              <a:rPr lang="zh-CN" altLang="en-US"/>
+              <a:t>2016/3/10</a:t>
             </a:fld>
             <a:endParaRPr lang="zh-CN"/>
           </a:p>
@@ -25462,6 +25534,7 @@
           <a:p>
             <a:fld id="{4FAB73BC-B049-4115-A692-8D63A059BFB8}" type="slidenum">
               <a:rPr/>
+              <a:t>‹#›</a:t>
             </a:fld>
             <a:endParaRPr lang="zh-CN"/>
           </a:p>
@@ -25657,7 +25730,6 @@
               <a:rPr lang="zh-CN" altLang="en-US" smtClean="0"/>
               <a:t>单击此处编辑母版文本样式</a:t>
             </a:r>
-            <a:endParaRPr lang="zh-CN" altLang="en-US" smtClean="0"/>
           </a:p>
         </p:txBody>
       </p:sp>
@@ -25678,6 +25750,7 @@
           <a:p>
             <a:fld id="{5586B75A-687E-405C-8A0B-8D00578BA2C3}" type="datetime1">
               <a:rPr lang="en-US" altLang="zh-CN" smtClean="0"/>
+              <a:t>3/10/2016</a:t>
             </a:fld>
             <a:endParaRPr lang="zh-CN" altLang="en-US"/>
           </a:p>
@@ -25719,6 +25792,7 @@
           <a:p>
             <a:fld id="{4FAB73BC-B049-4115-A692-8D63A059BFB8}" type="slidenum">
               <a:rPr lang="en-US" altLang="zh-CN" smtClean="0"/>
+              <a:t>‹#›</a:t>
             </a:fld>
             <a:endParaRPr lang="en-US" altLang="zh-CN"/>
           </a:p>
@@ -25903,7 +25977,6 @@
               <a:rPr lang="zh-CN" altLang="en-US" smtClean="0"/>
               <a:t>单击此处编辑母版文本样式</a:t>
             </a:r>
-            <a:endParaRPr lang="zh-CN" altLang="en-US" smtClean="0"/>
           </a:p>
         </p:txBody>
       </p:sp>
@@ -25924,6 +25997,7 @@
           <a:p>
             <a:fld id="{5586B75A-687E-405C-8A0B-8D00578BA2C3}" type="datetime1">
               <a:rPr lang="en-US" altLang="zh-CN" smtClean="0"/>
+              <a:t>3/10/2016</a:t>
             </a:fld>
             <a:endParaRPr lang="zh-CN" altLang="en-US"/>
           </a:p>
@@ -25965,6 +26039,7 @@
           <a:p>
             <a:fld id="{4FAB73BC-B049-4115-A692-8D63A059BFB8}" type="slidenum">
               <a:rPr lang="en-US" altLang="zh-CN" smtClean="0"/>
+              <a:t>‹#›</a:t>
             </a:fld>
             <a:endParaRPr lang="en-US" altLang="zh-CN"/>
           </a:p>
@@ -26090,7 +26165,6 @@
               <a:rPr lang="zh-CN" altLang="en-US" smtClean="0"/>
               <a:t>单击此处编辑母版文本样式</a:t>
             </a:r>
-            <a:endParaRPr lang="zh-CN" altLang="en-US" smtClean="0"/>
           </a:p>
         </p:txBody>
       </p:sp>
@@ -26213,7 +26287,6 @@
               <a:rPr lang="zh-CN" altLang="en-US" smtClean="0"/>
               <a:t>单击此处编辑母版文本样式</a:t>
             </a:r>
-            <a:endParaRPr lang="zh-CN" altLang="en-US" smtClean="0"/>
           </a:p>
         </p:txBody>
       </p:sp>
@@ -26234,6 +26307,7 @@
           <a:p>
             <a:fld id="{5586B75A-687E-405C-8A0B-8D00578BA2C3}" type="datetime1">
               <a:rPr lang="en-US" altLang="zh-CN" smtClean="0"/>
+              <a:t>3/10/2016</a:t>
             </a:fld>
             <a:endParaRPr lang="zh-CN" altLang="en-US"/>
           </a:p>
@@ -26275,6 +26349,7 @@
           <a:p>
             <a:fld id="{4FAB73BC-B049-4115-A692-8D63A059BFB8}" type="slidenum">
               <a:rPr lang="en-US" altLang="zh-CN" smtClean="0"/>
+              <a:t>‹#›</a:t>
             </a:fld>
             <a:endParaRPr lang="en-US" altLang="zh-CN"/>
           </a:p>
@@ -26318,19 +26393,6 @@
               </a:rPr>
               <a:t>“</a:t>
             </a:r>
-            <a:endParaRPr lang="en-US" sz="8000" baseline="0" dirty="0">
-              <a:ln w="3175" cmpd="sng">
-                <a:noFill/>
-              </a:ln>
-              <a:solidFill>
-                <a:schemeClr val="accent1">
-                  <a:lumMod val="60000"/>
-                  <a:lumOff val="40000"/>
-                </a:schemeClr>
-              </a:solidFill>
-              <a:effectLst/>
-              <a:latin typeface="Arial"/>
-            </a:endParaRPr>
           </a:p>
         </p:txBody>
       </p:sp>
@@ -26562,7 +26624,6 @@
               <a:rPr lang="zh-CN" altLang="en-US" smtClean="0"/>
               <a:t>单击此处编辑母版文本样式</a:t>
             </a:r>
-            <a:endParaRPr lang="zh-CN" altLang="en-US" smtClean="0"/>
           </a:p>
         </p:txBody>
       </p:sp>
@@ -26583,6 +26644,7 @@
           <a:p>
             <a:fld id="{5586B75A-687E-405C-8A0B-8D00578BA2C3}" type="datetime1">
               <a:rPr lang="en-US" altLang="zh-CN" smtClean="0"/>
+              <a:t>3/10/2016</a:t>
             </a:fld>
             <a:endParaRPr lang="zh-CN" altLang="en-US"/>
           </a:p>
@@ -26624,6 +26686,7 @@
           <a:p>
             <a:fld id="{4FAB73BC-B049-4115-A692-8D63A059BFB8}" type="slidenum">
               <a:rPr lang="en-US" altLang="zh-CN" smtClean="0"/>
+              <a:t>‹#›</a:t>
             </a:fld>
             <a:endParaRPr lang="en-US" altLang="zh-CN"/>
           </a:p>
@@ -26749,7 +26812,6 @@
               <a:rPr lang="zh-CN" altLang="en-US" smtClean="0"/>
               <a:t>单击此处编辑母版文本样式</a:t>
             </a:r>
-            <a:endParaRPr lang="zh-CN" altLang="en-US" smtClean="0"/>
           </a:p>
         </p:txBody>
       </p:sp>
@@ -26872,7 +26934,6 @@
               <a:rPr lang="zh-CN" altLang="en-US" smtClean="0"/>
               <a:t>单击此处编辑母版文本样式</a:t>
             </a:r>
-            <a:endParaRPr lang="zh-CN" altLang="en-US" smtClean="0"/>
           </a:p>
         </p:txBody>
       </p:sp>
@@ -26893,6 +26954,7 @@
           <a:p>
             <a:fld id="{5586B75A-687E-405C-8A0B-8D00578BA2C3}" type="datetime1">
               <a:rPr lang="en-US" altLang="zh-CN" smtClean="0"/>
+              <a:t>3/10/2016</a:t>
             </a:fld>
             <a:endParaRPr lang="zh-CN" altLang="en-US"/>
           </a:p>
@@ -26934,6 +26996,7 @@
           <a:p>
             <a:fld id="{4FAB73BC-B049-4115-A692-8D63A059BFB8}" type="slidenum">
               <a:rPr lang="en-US" altLang="zh-CN" smtClean="0"/>
+              <a:t>‹#›</a:t>
             </a:fld>
             <a:endParaRPr lang="en-US" altLang="zh-CN"/>
           </a:p>
@@ -26977,19 +27040,6 @@
               </a:rPr>
               <a:t>“</a:t>
             </a:r>
-            <a:endParaRPr lang="en-US" sz="8000" baseline="0" dirty="0">
-              <a:ln w="3175" cmpd="sng">
-                <a:noFill/>
-              </a:ln>
-              <a:solidFill>
-                <a:schemeClr val="accent1">
-                  <a:lumMod val="60000"/>
-                  <a:lumOff val="40000"/>
-                </a:schemeClr>
-              </a:solidFill>
-              <a:effectLst/>
-              <a:latin typeface="Arial"/>
-            </a:endParaRPr>
           </a:p>
         </p:txBody>
       </p:sp>
@@ -27031,19 +27081,6 @@
               </a:rPr>
               <a:t>”</a:t>
             </a:r>
-            <a:endParaRPr lang="en-US" sz="8000" baseline="0" dirty="0">
-              <a:ln w="3175" cmpd="sng">
-                <a:noFill/>
-              </a:ln>
-              <a:solidFill>
-                <a:schemeClr val="accent1">
-                  <a:lumMod val="60000"/>
-                  <a:lumOff val="40000"/>
-                </a:schemeClr>
-              </a:solidFill>
-              <a:effectLst/>
-              <a:latin typeface="Arial"/>
-            </a:endParaRPr>
           </a:p>
         </p:txBody>
       </p:sp>
@@ -27164,7 +27201,6 @@
               <a:rPr lang="zh-CN" altLang="en-US" smtClean="0"/>
               <a:t>单击此处编辑母版文本样式</a:t>
             </a:r>
-            <a:endParaRPr lang="zh-CN" altLang="en-US" smtClean="0"/>
           </a:p>
         </p:txBody>
       </p:sp>
@@ -27287,7 +27323,6 @@
               <a:rPr lang="zh-CN" altLang="en-US" smtClean="0"/>
               <a:t>单击此处编辑母版文本样式</a:t>
             </a:r>
-            <a:endParaRPr lang="zh-CN" altLang="en-US" smtClean="0"/>
           </a:p>
         </p:txBody>
       </p:sp>
@@ -27308,6 +27343,7 @@
           <a:p>
             <a:fld id="{5586B75A-687E-405C-8A0B-8D00578BA2C3}" type="datetime1">
               <a:rPr lang="en-US" altLang="zh-CN" smtClean="0"/>
+              <a:t>3/10/2016</a:t>
             </a:fld>
             <a:endParaRPr lang="zh-CN" altLang="en-US"/>
           </a:p>
@@ -27349,6 +27385,7 @@
           <a:p>
             <a:fld id="{4FAB73BC-B049-4115-A692-8D63A059BFB8}" type="slidenum">
               <a:rPr lang="en-US" altLang="zh-CN" smtClean="0"/>
+              <a:t>‹#›</a:t>
             </a:fld>
             <a:endParaRPr lang="en-US" altLang="zh-CN"/>
           </a:p>
@@ -27423,7 +27460,6 @@
               <a:rPr lang="zh-CN" altLang="en-US" smtClean="0"/>
               <a:t>单击此处编辑母版文本样式</a:t>
             </a:r>
-            <a:endParaRPr lang="zh-CN" altLang="en-US" smtClean="0"/>
           </a:p>
           <a:p>
             <a:pPr lvl="1"/>
@@ -27431,7 +27467,6 @@
               <a:rPr lang="zh-CN" altLang="en-US" smtClean="0"/>
               <a:t>第二级</a:t>
             </a:r>
-            <a:endParaRPr lang="zh-CN" altLang="en-US" smtClean="0"/>
           </a:p>
           <a:p>
             <a:pPr lvl="2"/>
@@ -27439,7 +27474,6 @@
               <a:rPr lang="zh-CN" altLang="en-US" smtClean="0"/>
               <a:t>第三级</a:t>
             </a:r>
-            <a:endParaRPr lang="zh-CN" altLang="en-US" smtClean="0"/>
           </a:p>
           <a:p>
             <a:pPr lvl="3"/>
@@ -27447,7 +27481,6 @@
               <a:rPr lang="zh-CN" altLang="en-US" smtClean="0"/>
               <a:t>第四级</a:t>
             </a:r>
-            <a:endParaRPr lang="zh-CN" altLang="en-US" smtClean="0"/>
           </a:p>
           <a:p>
             <a:pPr lvl="4"/>
@@ -27476,6 +27509,7 @@
           <a:p>
             <a:fld id="{5F4E5243-F52A-4D37-9694-EB26C6C31910}" type="datetime1">
               <a:rPr lang="zh-CN" altLang="en-US" smtClean="0"/>
+              <a:t>2016/3/10</a:t>
             </a:fld>
             <a:endParaRPr lang="zh-CN"/>
           </a:p>
@@ -27517,6 +27551,7 @@
           <a:p>
             <a:fld id="{4FAB73BC-B049-4115-A692-8D63A059BFB8}" type="slidenum">
               <a:rPr lang="en-US" altLang="zh-CN" smtClean="0"/>
+              <a:t>‹#›</a:t>
             </a:fld>
             <a:endParaRPr lang="zh-CN" altLang="en-US"/>
           </a:p>
@@ -27600,7 +27635,6 @@
               <a:rPr lang="zh-CN" altLang="en-US" smtClean="0"/>
               <a:t>单击此处编辑母版文本样式</a:t>
             </a:r>
-            <a:endParaRPr lang="zh-CN" altLang="en-US" smtClean="0"/>
           </a:p>
           <a:p>
             <a:pPr lvl="1"/>
@@ -27608,7 +27642,6 @@
               <a:rPr lang="zh-CN" altLang="en-US" smtClean="0"/>
               <a:t>第二级</a:t>
             </a:r>
-            <a:endParaRPr lang="zh-CN" altLang="en-US" smtClean="0"/>
           </a:p>
           <a:p>
             <a:pPr lvl="2"/>
@@ -27616,7 +27649,6 @@
               <a:rPr lang="zh-CN" altLang="en-US" smtClean="0"/>
               <a:t>第三级</a:t>
             </a:r>
-            <a:endParaRPr lang="zh-CN" altLang="en-US" smtClean="0"/>
           </a:p>
           <a:p>
             <a:pPr lvl="3"/>
@@ -27624,7 +27656,6 @@
               <a:rPr lang="zh-CN" altLang="en-US" smtClean="0"/>
               <a:t>第四级</a:t>
             </a:r>
-            <a:endParaRPr lang="zh-CN" altLang="en-US" smtClean="0"/>
           </a:p>
           <a:p>
             <a:pPr lvl="4"/>
@@ -27653,6 +27684,7 @@
           <a:p>
             <a:fld id="{5586B75A-687E-405C-8A0B-8D00578BA2C3}" type="datetime1">
               <a:rPr lang="en-US" altLang="zh-CN" smtClean="0"/>
+              <a:t>3/10/2016</a:t>
             </a:fld>
             <a:endParaRPr lang="zh-CN" altLang="en-US"/>
           </a:p>
@@ -27694,6 +27726,7 @@
           <a:p>
             <a:fld id="{4FAB73BC-B049-4115-A692-8D63A059BFB8}" type="slidenum">
               <a:rPr lang="en-US" altLang="zh-CN" smtClean="0"/>
+              <a:t>‹#›</a:t>
             </a:fld>
             <a:endParaRPr lang="en-US" altLang="zh-CN"/>
           </a:p>
@@ -27878,7 +27911,6 @@
               <a:rPr lang="zh-CN" altLang="en-US" smtClean="0"/>
               <a:t>单击此处编辑母版文本样式</a:t>
             </a:r>
-            <a:endParaRPr lang="zh-CN" altLang="en-US" smtClean="0"/>
           </a:p>
         </p:txBody>
       </p:sp>
@@ -27898,7 +27930,8 @@
           <a:lstStyle/>
           <a:p>
             <a:fld id="{A50F84E2-2D7A-43CF-AC90-352A289A783A}" type="datetime1">
-              <a:rPr/>
+              <a:rPr lang="zh-CN" altLang="en-US"/>
+              <a:t>2016/3/10</a:t>
             </a:fld>
             <a:endParaRPr lang="zh-CN"/>
           </a:p>
@@ -27940,6 +27973,7 @@
           <a:p>
             <a:fld id="{4FAB73BC-B049-4115-A692-8D63A059BFB8}" type="slidenum">
               <a:rPr/>
+              <a:t>‹#›</a:t>
             </a:fld>
             <a:endParaRPr lang="zh-CN"/>
           </a:p>
@@ -28046,7 +28080,6 @@
               <a:rPr lang="zh-CN" altLang="en-US" smtClean="0"/>
               <a:t>单击此处编辑母版文本样式</a:t>
             </a:r>
-            <a:endParaRPr lang="zh-CN" altLang="en-US" smtClean="0"/>
           </a:p>
           <a:p>
             <a:pPr lvl="1"/>
@@ -28054,7 +28087,6 @@
               <a:rPr lang="zh-CN" altLang="en-US" smtClean="0"/>
               <a:t>第二级</a:t>
             </a:r>
-            <a:endParaRPr lang="zh-CN" altLang="en-US" smtClean="0"/>
           </a:p>
           <a:p>
             <a:pPr lvl="2"/>
@@ -28062,7 +28094,6 @@
               <a:rPr lang="zh-CN" altLang="en-US" smtClean="0"/>
               <a:t>第三级</a:t>
             </a:r>
-            <a:endParaRPr lang="zh-CN" altLang="en-US" smtClean="0"/>
           </a:p>
           <a:p>
             <a:pPr lvl="3"/>
@@ -28070,7 +28101,6 @@
               <a:rPr lang="zh-CN" altLang="en-US" smtClean="0"/>
               <a:t>第四级</a:t>
             </a:r>
-            <a:endParaRPr lang="zh-CN" altLang="en-US" smtClean="0"/>
           </a:p>
           <a:p>
             <a:pPr lvl="4"/>
@@ -28135,7 +28165,6 @@
               <a:rPr lang="zh-CN" altLang="en-US" smtClean="0"/>
               <a:t>单击此处编辑母版文本样式</a:t>
             </a:r>
-            <a:endParaRPr lang="zh-CN" altLang="en-US" smtClean="0"/>
           </a:p>
           <a:p>
             <a:pPr lvl="1"/>
@@ -28143,7 +28172,6 @@
               <a:rPr lang="zh-CN" altLang="en-US" smtClean="0"/>
               <a:t>第二级</a:t>
             </a:r>
-            <a:endParaRPr lang="zh-CN" altLang="en-US" smtClean="0"/>
           </a:p>
           <a:p>
             <a:pPr lvl="2"/>
@@ -28151,7 +28179,6 @@
               <a:rPr lang="zh-CN" altLang="en-US" smtClean="0"/>
               <a:t>第三级</a:t>
             </a:r>
-            <a:endParaRPr lang="zh-CN" altLang="en-US" smtClean="0"/>
           </a:p>
           <a:p>
             <a:pPr lvl="3"/>
@@ -28159,7 +28186,6 @@
               <a:rPr lang="zh-CN" altLang="en-US" smtClean="0"/>
               <a:t>第四级</a:t>
             </a:r>
-            <a:endParaRPr lang="zh-CN" altLang="en-US" smtClean="0"/>
           </a:p>
           <a:p>
             <a:pPr lvl="4"/>
@@ -28187,7 +28213,8 @@
           <a:lstStyle/>
           <a:p>
             <a:fld id="{F12952B5-7A2F-4CC8-B7CE-9234E21C2837}" type="datetime1">
-              <a:rPr/>
+              <a:rPr lang="zh-CN" altLang="en-US"/>
+              <a:t>2016/3/10</a:t>
             </a:fld>
             <a:endParaRPr lang="zh-CN"/>
           </a:p>
@@ -28229,6 +28256,7 @@
           <a:p>
             <a:fld id="{4FAB73BC-B049-4115-A692-8D63A059BFB8}" type="slidenum">
               <a:rPr/>
+              <a:t>‹#›</a:t>
             </a:fld>
             <a:endParaRPr lang="zh-CN"/>
           </a:p>
@@ -28323,7 +28351,6 @@
               <a:rPr lang="zh-CN" altLang="en-US" smtClean="0"/>
               <a:t>单击此处编辑母版文本样式</a:t>
             </a:r>
-            <a:endParaRPr lang="zh-CN" altLang="en-US" smtClean="0"/>
           </a:p>
         </p:txBody>
       </p:sp>
@@ -28380,7 +28407,6 @@
               <a:rPr lang="zh-CN" altLang="en-US" smtClean="0"/>
               <a:t>单击此处编辑母版文本样式</a:t>
             </a:r>
-            <a:endParaRPr lang="zh-CN" altLang="en-US" smtClean="0"/>
           </a:p>
           <a:p>
             <a:pPr lvl="1"/>
@@ -28388,7 +28414,6 @@
               <a:rPr lang="zh-CN" altLang="en-US" smtClean="0"/>
               <a:t>第二级</a:t>
             </a:r>
-            <a:endParaRPr lang="zh-CN" altLang="en-US" smtClean="0"/>
           </a:p>
           <a:p>
             <a:pPr lvl="2"/>
@@ -28396,7 +28421,6 @@
               <a:rPr lang="zh-CN" altLang="en-US" smtClean="0"/>
               <a:t>第三级</a:t>
             </a:r>
-            <a:endParaRPr lang="zh-CN" altLang="en-US" smtClean="0"/>
           </a:p>
           <a:p>
             <a:pPr lvl="3"/>
@@ -28404,7 +28428,6 @@
               <a:rPr lang="zh-CN" altLang="en-US" smtClean="0"/>
               <a:t>第四级</a:t>
             </a:r>
-            <a:endParaRPr lang="zh-CN" altLang="en-US" smtClean="0"/>
           </a:p>
           <a:p>
             <a:pPr lvl="4"/>
@@ -28478,7 +28501,6 @@
               <a:rPr lang="zh-CN" altLang="en-US" smtClean="0"/>
               <a:t>单击此处编辑母版文本样式</a:t>
             </a:r>
-            <a:endParaRPr lang="zh-CN" altLang="en-US" smtClean="0"/>
           </a:p>
         </p:txBody>
       </p:sp>
@@ -28535,7 +28557,6 @@
               <a:rPr lang="zh-CN" altLang="en-US" smtClean="0"/>
               <a:t>单击此处编辑母版文本样式</a:t>
             </a:r>
-            <a:endParaRPr lang="zh-CN" altLang="en-US" smtClean="0"/>
           </a:p>
           <a:p>
             <a:pPr lvl="1"/>
@@ -28543,7 +28564,6 @@
               <a:rPr lang="zh-CN" altLang="en-US" smtClean="0"/>
               <a:t>第二级</a:t>
             </a:r>
-            <a:endParaRPr lang="zh-CN" altLang="en-US" smtClean="0"/>
           </a:p>
           <a:p>
             <a:pPr lvl="2"/>
@@ -28551,7 +28571,6 @@
               <a:rPr lang="zh-CN" altLang="en-US" smtClean="0"/>
               <a:t>第三级</a:t>
             </a:r>
-            <a:endParaRPr lang="zh-CN" altLang="en-US" smtClean="0"/>
           </a:p>
           <a:p>
             <a:pPr lvl="3"/>
@@ -28559,7 +28578,6 @@
               <a:rPr lang="zh-CN" altLang="en-US" smtClean="0"/>
               <a:t>第四级</a:t>
             </a:r>
-            <a:endParaRPr lang="zh-CN" altLang="en-US" smtClean="0"/>
           </a:p>
           <a:p>
             <a:pPr lvl="4"/>
@@ -28587,7 +28605,8 @@
           <a:lstStyle/>
           <a:p>
             <a:fld id="{CE1DA07A-9201-4B4B-BAF2-015AFA30F520}" type="datetime1">
-              <a:rPr/>
+              <a:rPr lang="zh-CN" altLang="en-US"/>
+              <a:t>2016/3/10</a:t>
             </a:fld>
             <a:endParaRPr lang="zh-CN"/>
           </a:p>
@@ -28629,6 +28648,7 @@
           <a:p>
             <a:fld id="{4FAB73BC-B049-4115-A692-8D63A059BFB8}" type="slidenum">
               <a:rPr/>
+              <a:t>‹#›</a:t>
             </a:fld>
             <a:endParaRPr lang="zh-CN"/>
           </a:p>
@@ -28698,7 +28718,8 @@
           <a:lstStyle/>
           <a:p>
             <a:fld id="{73D7E00A-486F-4252-8B1D-E32645521F49}" type="datetime1">
-              <a:rPr/>
+              <a:rPr lang="zh-CN" altLang="en-US"/>
+              <a:t>2016/3/10</a:t>
             </a:fld>
             <a:endParaRPr lang="zh-CN"/>
           </a:p>
@@ -28740,6 +28761,7 @@
           <a:p>
             <a:fld id="{4FAB73BC-B049-4115-A692-8D63A059BFB8}" type="slidenum">
               <a:rPr/>
+              <a:t>‹#›</a:t>
             </a:fld>
             <a:endParaRPr lang="zh-CN"/>
           </a:p>
@@ -28816,7 +28838,8 @@
           <a:lstStyle/>
           <a:p>
             <a:fld id="{8DDF5F92-E675-4B36-9A60-69A962A68675}" type="datetime1">
-              <a:rPr/>
+              <a:rPr lang="zh-CN" altLang="en-US"/>
+              <a:t>2016/3/10</a:t>
             </a:fld>
             <a:endParaRPr lang="zh-CN"/>
           </a:p>
@@ -28858,6 +28881,7 @@
           <a:p>
             <a:fld id="{4FAB73BC-B049-4115-A692-8D63A059BFB8}" type="slidenum">
               <a:rPr/>
+              <a:t>‹#›</a:t>
             </a:fld>
             <a:endParaRPr lang="zh-CN"/>
           </a:p>
@@ -28975,7 +28999,6 @@
               <a:rPr lang="zh-CN" altLang="en-US" smtClean="0"/>
               <a:t>单击此处编辑母版文本样式</a:t>
             </a:r>
-            <a:endParaRPr lang="zh-CN" altLang="en-US" smtClean="0"/>
           </a:p>
           <a:p>
             <a:pPr lvl="1"/>
@@ -28983,7 +29006,6 @@
               <a:rPr lang="zh-CN" altLang="en-US" smtClean="0"/>
               <a:t>第二级</a:t>
             </a:r>
-            <a:endParaRPr lang="zh-CN" altLang="en-US" smtClean="0"/>
           </a:p>
           <a:p>
             <a:pPr lvl="2"/>
@@ -28991,7 +29013,6 @@
               <a:rPr lang="zh-CN" altLang="en-US" smtClean="0"/>
               <a:t>第三级</a:t>
             </a:r>
-            <a:endParaRPr lang="zh-CN" altLang="en-US" smtClean="0"/>
           </a:p>
           <a:p>
             <a:pPr lvl="3"/>
@@ -28999,7 +29020,6 @@
               <a:rPr lang="zh-CN" altLang="en-US" smtClean="0"/>
               <a:t>第四级</a:t>
             </a:r>
-            <a:endParaRPr lang="zh-CN" altLang="en-US" smtClean="0"/>
           </a:p>
           <a:p>
             <a:pPr lvl="4"/>
@@ -29075,7 +29095,6 @@
               <a:rPr lang="zh-CN" altLang="en-US" smtClean="0"/>
               <a:t>单击此处编辑母版文本样式</a:t>
             </a:r>
-            <a:endParaRPr lang="zh-CN" altLang="en-US" smtClean="0"/>
           </a:p>
         </p:txBody>
       </p:sp>
@@ -29095,7 +29114,8 @@
           <a:lstStyle/>
           <a:p>
             <a:fld id="{AF6E2C9B-5FA2-460D-9BE7-B0812FC2A6FF}" type="datetime1">
-              <a:rPr/>
+              <a:rPr lang="zh-CN" altLang="en-US"/>
+              <a:t>2016/3/10</a:t>
             </a:fld>
             <a:endParaRPr lang="zh-CN"/>
           </a:p>
@@ -29137,6 +29157,7 @@
           <a:p>
             <a:fld id="{4FAB73BC-B049-4115-A692-8D63A059BFB8}" type="slidenum">
               <a:rPr/>
+              <a:t>‹#›</a:t>
             </a:fld>
             <a:endParaRPr lang="zh-CN"/>
           </a:p>
@@ -29330,7 +29351,6 @@
               <a:rPr lang="zh-CN" altLang="en-US" smtClean="0"/>
               <a:t>单击此处编辑母版文本样式</a:t>
             </a:r>
-            <a:endParaRPr lang="zh-CN" altLang="en-US" smtClean="0"/>
           </a:p>
         </p:txBody>
       </p:sp>
@@ -29350,7 +29370,8 @@
           <a:lstStyle/>
           <a:p>
             <a:fld id="{1D374940-A916-4C8B-9648-02A2D3898F9E}" type="datetime1">
-              <a:rPr/>
+              <a:rPr lang="zh-CN" altLang="en-US"/>
+              <a:t>2016/3/10</a:t>
             </a:fld>
             <a:endParaRPr lang="zh-CN"/>
           </a:p>
@@ -29392,6 +29413,7 @@
           <a:p>
             <a:fld id="{4FAB73BC-B049-4115-A692-8D63A059BFB8}" type="slidenum">
               <a:rPr/>
+              <a:t>‹#›</a:t>
             </a:fld>
             <a:endParaRPr lang="zh-CN"/>
           </a:p>
@@ -29456,7 +29478,6 @@
               <a:rPr lang="zh-CN"/>
               <a:t>单击此处编辑母版标题样式</a:t>
             </a:r>
-            <a:endParaRPr lang="zh-CN"/>
           </a:p>
         </p:txBody>
       </p:sp>
@@ -29490,7 +29511,6 @@
               <a:rPr lang="zh-CN"/>
               <a:t>单击此处编辑母版文本样式</a:t>
             </a:r>
-            <a:endParaRPr lang="zh-CN"/>
           </a:p>
           <a:p>
             <a:pPr lvl="1"/>
@@ -29498,7 +29518,6 @@
               <a:rPr lang="zh-CN"/>
               <a:t>第二级</a:t>
             </a:r>
-            <a:endParaRPr lang="zh-CN"/>
           </a:p>
           <a:p>
             <a:pPr lvl="2"/>
@@ -29506,7 +29525,6 @@
               <a:rPr lang="zh-CN"/>
               <a:t>第三级</a:t>
             </a:r>
-            <a:endParaRPr lang="zh-CN"/>
           </a:p>
           <a:p>
             <a:pPr lvl="3"/>
@@ -29514,7 +29532,6 @@
               <a:rPr lang="zh-CN"/>
               <a:t>第四级</a:t>
             </a:r>
-            <a:endParaRPr lang="zh-CN"/>
           </a:p>
           <a:p>
             <a:pPr lvl="4"/>
@@ -29522,7 +29539,6 @@
               <a:rPr lang="zh-CN"/>
               <a:t>第五级</a:t>
             </a:r>
-            <a:endParaRPr lang="zh-CN"/>
           </a:p>
         </p:txBody>
       </p:sp>
@@ -29564,6 +29580,7 @@
           <a:p>
             <a:fld id="{5586B75A-687E-405C-8A0B-8D00578BA2C3}" type="datetime1">
               <a:rPr lang="en-US" altLang="zh-CN" smtClean="0"/>
+              <a:t>3/10/2016</a:t>
             </a:fld>
             <a:endParaRPr lang="zh-CN" altLang="en-US"/>
           </a:p>
@@ -29646,6 +29663,7 @@
           <a:p>
             <a:fld id="{4FAB73BC-B049-4115-A692-8D63A059BFB8}" type="slidenum">
               <a:rPr lang="en-US" altLang="zh-CN" smtClean="0"/>
+              <a:t>‹#›</a:t>
             </a:fld>
             <a:endParaRPr lang="en-US" altLang="zh-CN"/>
           </a:p>
@@ -30566,7 +30584,6 @@
               <a:rPr lang="zh-CN" altLang="en-US" smtClean="0"/>
               <a:t>单击此处编辑母版文本样式</a:t>
             </a:r>
-            <a:endParaRPr lang="zh-CN" altLang="en-US" smtClean="0"/>
           </a:p>
           <a:p>
             <a:pPr lvl="1"/>
@@ -30574,7 +30591,6 @@
               <a:rPr lang="zh-CN" altLang="en-US" smtClean="0"/>
               <a:t>第二级</a:t>
             </a:r>
-            <a:endParaRPr lang="zh-CN" altLang="en-US" smtClean="0"/>
           </a:p>
           <a:p>
             <a:pPr lvl="2"/>
@@ -30582,7 +30598,6 @@
               <a:rPr lang="zh-CN" altLang="en-US" smtClean="0"/>
               <a:t>第三级</a:t>
             </a:r>
-            <a:endParaRPr lang="zh-CN" altLang="en-US" smtClean="0"/>
           </a:p>
           <a:p>
             <a:pPr lvl="3"/>
@@ -30590,7 +30605,6 @@
               <a:rPr lang="zh-CN" altLang="en-US" smtClean="0"/>
               <a:t>第四级</a:t>
             </a:r>
-            <a:endParaRPr lang="zh-CN" altLang="en-US" smtClean="0"/>
           </a:p>
           <a:p>
             <a:pPr lvl="4"/>
@@ -30637,6 +30651,7 @@
           <a:p>
             <a:fld id="{5586B75A-687E-405C-8A0B-8D00578BA2C3}" type="datetime1">
               <a:rPr lang="en-US" altLang="zh-CN" smtClean="0"/>
+              <a:t>3/10/2016</a:t>
             </a:fld>
             <a:endParaRPr lang="zh-CN" altLang="en-US"/>
           </a:p>
@@ -30712,6 +30727,7 @@
           <a:p>
             <a:fld id="{4FAB73BC-B049-4115-A692-8D63A059BFB8}" type="slidenum">
               <a:rPr lang="en-US" altLang="zh-CN" smtClean="0"/>
+              <a:t>‹#›</a:t>
             </a:fld>
             <a:endParaRPr lang="en-US" altLang="zh-CN"/>
           </a:p>
@@ -31298,7 +31314,7 @@
           <p:nvPr/>
         </p:nvPicPr>
         <p:blipFill>
-          <a:blip r:embed="rId1">
+          <a:blip r:embed="rId2">
             <a:extLst>
               <a:ext uri="{28A0092B-C50C-407E-A947-70E740481C1C}">
                 <a14:useLocalDpi xmlns:a14="http://schemas.microsoft.com/office/drawing/2010/main" val="0"/>
@@ -31383,7 +31399,6 @@
               <a:rPr lang="zh-CN" altLang="en-US"/>
               <a:t>接口</a:t>
             </a:r>
-            <a:endParaRPr lang="zh-CN" altLang="en-US"/>
           </a:p>
         </p:txBody>
       </p:sp>
@@ -31396,7 +31411,7 @@
           <p:nvPr/>
         </p:nvPicPr>
         <p:blipFill>
-          <a:blip r:embed="rId1"/>
+          <a:blip r:embed="rId2"/>
           <a:stretch>
             <a:fillRect/>
           </a:stretch>
@@ -31444,6 +31459,7 @@
           <a:bodyPr wrap="square" rtlCol="0">
             <a:spAutoFit/>
           </a:bodyPr>
+          <a:lstStyle/>
           <a:p>
             <a:r>
               <a:rPr lang="zh-CN" altLang="en-US" sz="2800"/>
@@ -31457,7 +31473,6 @@
               <a:rPr lang="zh-CN" altLang="en-US" sz="2800"/>
               <a:t>参数配置与网络流读取</a:t>
             </a:r>
-            <a:endParaRPr lang="zh-CN" altLang="en-US" sz="2800"/>
           </a:p>
         </p:txBody>
       </p:sp>
@@ -31494,6 +31509,7 @@
           <a:bodyPr wrap="square" rtlCol="0">
             <a:spAutoFit/>
           </a:bodyPr>
+          <a:lstStyle/>
           <a:p>
             <a:r>
               <a:rPr lang="zh-CN" altLang="en-US"/>
@@ -31507,7 +31523,6 @@
               <a:rPr lang="zh-CN" altLang="en-US"/>
               <a:t>的两种属性读取方式</a:t>
             </a:r>
-            <a:endParaRPr lang="zh-CN" altLang="en-US"/>
           </a:p>
           <a:p>
             <a:r>
@@ -31520,11 +31535,7 @@
             </a:r>
             <a:r>
               <a:rPr lang="zh-CN" altLang="en-US"/>
-              <a:t>提供了多种</a:t>
-            </a:r>
-            <a:r>
-              <a:rPr lang="zh-CN" altLang="en-US"/>
-              <a:t>种类型的</a:t>
+              <a:t>提供了多种种类型的</a:t>
             </a:r>
             <a:r>
               <a:rPr lang="en-US" altLang="zh-CN"/>
@@ -31534,7 +31545,6 @@
               <a:rPr lang="zh-CN" altLang="en-US"/>
               <a:t>）</a:t>
             </a:r>
-            <a:endParaRPr lang="zh-CN" altLang="en-US"/>
           </a:p>
         </p:txBody>
       </p:sp>
@@ -31558,12 +31568,12 @@
           <a:bodyPr wrap="square" rtlCol="0">
             <a:spAutoFit/>
           </a:bodyPr>
+          <a:lstStyle/>
           <a:p>
             <a:r>
               <a:rPr lang="zh-CN" altLang="en-US"/>
               <a:t>更加灵活的选择属性获取方式</a:t>
             </a:r>
-            <a:endParaRPr lang="zh-CN" altLang="en-US"/>
           </a:p>
         </p:txBody>
       </p:sp>
@@ -31759,7 +31769,6 @@
               <a:rPr lang="zh-CN" altLang="en-US" dirty="0"/>
               <a:t>设计</a:t>
             </a:r>
-            <a:endParaRPr lang="zh-CN" altLang="en-US" dirty="0"/>
           </a:p>
         </p:txBody>
       </p:sp>
@@ -31827,6 +31836,172 @@
           </a:p>
         </p:txBody>
       </p:sp>
+      <p:sp>
+        <p:nvSpPr>
+          <p:cNvPr id="4" name="文本框 3"/>
+          <p:cNvSpPr txBox="1"/>
+          <p:nvPr/>
+        </p:nvSpPr>
+        <p:spPr>
+          <a:xfrm>
+            <a:off x="892934" y="1189076"/>
+            <a:ext cx="6542468" cy="477054"/>
+          </a:xfrm>
+          <a:prstGeom prst="rect">
+            <a:avLst/>
+          </a:prstGeom>
+          <a:noFill/>
+        </p:spPr>
+        <p:txBody>
+          <a:bodyPr wrap="square" rtlCol="0">
+            <a:spAutoFit/>
+          </a:bodyPr>
+          <a:lstStyle/>
+          <a:p>
+            <a:r>
+              <a:rPr lang="en-US" altLang="zh-CN" sz="2500" dirty="0" smtClean="0"/>
+              <a:t>xml</a:t>
+            </a:r>
+            <a:r>
+              <a:rPr lang="zh-CN" altLang="en-US" sz="2500" dirty="0" smtClean="0"/>
+              <a:t>配置文件设置界面参数</a:t>
+            </a:r>
+            <a:endParaRPr lang="zh-CN" altLang="en-US" sz="2500" dirty="0"/>
+          </a:p>
+        </p:txBody>
+      </p:sp>
+      <p:pic>
+        <p:nvPicPr>
+          <p:cNvPr id="7" name="图片 6"/>
+          <p:cNvPicPr>
+            <a:picLocks noChangeAspect="1"/>
+          </p:cNvPicPr>
+          <p:nvPr/>
+        </p:nvPicPr>
+        <p:blipFill>
+          <a:blip r:embed="rId2"/>
+          <a:stretch>
+            <a:fillRect/>
+          </a:stretch>
+        </p:blipFill>
+        <p:spPr>
+          <a:xfrm>
+            <a:off x="780365" y="1666130"/>
+            <a:ext cx="10458450" cy="1057275"/>
+          </a:xfrm>
+          <a:prstGeom prst="rect">
+            <a:avLst/>
+          </a:prstGeom>
+        </p:spPr>
+      </p:pic>
+      <p:sp>
+        <p:nvSpPr>
+          <p:cNvPr id="8" name="文本框 7"/>
+          <p:cNvSpPr txBox="1"/>
+          <p:nvPr/>
+        </p:nvSpPr>
+        <p:spPr>
+          <a:xfrm>
+            <a:off x="892934" y="2723405"/>
+            <a:ext cx="4649273" cy="477054"/>
+          </a:xfrm>
+          <a:prstGeom prst="rect">
+            <a:avLst/>
+          </a:prstGeom>
+          <a:noFill/>
+        </p:spPr>
+        <p:txBody>
+          <a:bodyPr wrap="square" rtlCol="0">
+            <a:spAutoFit/>
+          </a:bodyPr>
+          <a:lstStyle/>
+          <a:p>
+            <a:r>
+              <a:rPr lang="zh-CN" altLang="en-US" sz="2500" dirty="0" smtClean="0"/>
+              <a:t>重制界面组件</a:t>
+            </a:r>
+            <a:endParaRPr lang="en-US" altLang="zh-CN" sz="2500" dirty="0" smtClean="0"/>
+          </a:p>
+        </p:txBody>
+      </p:sp>
+      <p:pic>
+        <p:nvPicPr>
+          <p:cNvPr id="9" name="图片 8"/>
+          <p:cNvPicPr>
+            <a:picLocks noChangeAspect="1"/>
+          </p:cNvPicPr>
+          <p:nvPr/>
+        </p:nvPicPr>
+        <p:blipFill>
+          <a:blip r:embed="rId3"/>
+          <a:stretch>
+            <a:fillRect/>
+          </a:stretch>
+        </p:blipFill>
+        <p:spPr>
+          <a:xfrm>
+            <a:off x="1010823" y="3200458"/>
+            <a:ext cx="2200275" cy="3290493"/>
+          </a:xfrm>
+          <a:prstGeom prst="rect">
+            <a:avLst/>
+          </a:prstGeom>
+        </p:spPr>
+      </p:pic>
+      <p:sp>
+        <p:nvSpPr>
+          <p:cNvPr id="12" name="文本框 11"/>
+          <p:cNvSpPr txBox="1"/>
+          <p:nvPr/>
+        </p:nvSpPr>
+        <p:spPr>
+          <a:xfrm>
+            <a:off x="3584620" y="2707517"/>
+            <a:ext cx="3348507" cy="477054"/>
+          </a:xfrm>
+          <a:prstGeom prst="rect">
+            <a:avLst/>
+          </a:prstGeom>
+          <a:noFill/>
+        </p:spPr>
+        <p:txBody>
+          <a:bodyPr wrap="square" rtlCol="0">
+            <a:spAutoFit/>
+          </a:bodyPr>
+          <a:lstStyle/>
+          <a:p>
+            <a:r>
+              <a:rPr lang="zh-CN" altLang="en-US" sz="2500" dirty="0" smtClean="0"/>
+              <a:t>反射运用</a:t>
+            </a:r>
+            <a:endParaRPr lang="zh-CN" altLang="en-US" sz="2500" dirty="0"/>
+          </a:p>
+        </p:txBody>
+      </p:sp>
+      <p:pic>
+        <p:nvPicPr>
+          <p:cNvPr id="13" name="图片 12"/>
+          <p:cNvPicPr>
+            <a:picLocks noChangeAspect="1"/>
+          </p:cNvPicPr>
+          <p:nvPr/>
+        </p:nvPicPr>
+        <p:blipFill>
+          <a:blip r:embed="rId4"/>
+          <a:stretch>
+            <a:fillRect/>
+          </a:stretch>
+        </p:blipFill>
+        <p:spPr>
+          <a:xfrm>
+            <a:off x="3328987" y="3184571"/>
+            <a:ext cx="7972425" cy="3562350"/>
+          </a:xfrm>
+          <a:prstGeom prst="rect">
+            <a:avLst/>
+          </a:prstGeom>
+        </p:spPr>
+      </p:pic>
     </p:spTree>
   </p:cSld>
   <p:clrMapOvr>
@@ -31957,7 +32132,7 @@
           <p:nvPr/>
         </p:nvPicPr>
         <p:blipFill>
-          <a:blip r:embed="rId1">
+          <a:blip r:embed="rId2">
             <a:extLst>
               <a:ext uri="{28A0092B-C50C-407E-A947-70E740481C1C}">
                 <a14:useLocalDpi xmlns:a14="http://schemas.microsoft.com/office/drawing/2010/main" val="0"/>
@@ -32039,7 +32214,7 @@
           <p:nvPr/>
         </p:nvPicPr>
         <p:blipFill>
-          <a:blip r:embed="rId1">
+          <a:blip r:embed="rId2">
             <a:extLst>
               <a:ext uri="{28A0092B-C50C-407E-A947-70E740481C1C}">
                 <a14:useLocalDpi xmlns:a14="http://schemas.microsoft.com/office/drawing/2010/main" val="0"/>
@@ -32145,7 +32320,7 @@
           <p:nvPr/>
         </p:nvPicPr>
         <p:blipFill>
-          <a:blip r:embed="rId1">
+          <a:blip r:embed="rId2">
             <a:extLst>
               <a:ext uri="{28A0092B-C50C-407E-A947-70E740481C1C}">
                 <a14:useLocalDpi xmlns:a14="http://schemas.microsoft.com/office/drawing/2010/main" val="0"/>

</xml_diff>

<commit_message>
Revert "Other: do something with the show ppt"
This reverts commit bb20cb08ebfaf8028b6339fd2ac5ef739f64318f.
</commit_message>
<xml_diff>
--- a/Doc/迭代一/Gitmining迭代一项目演示.pptx
+++ b/Doc/迭代一/Gitmining迭代一项目演示.pptx
@@ -3,26 +3,26 @@
 <p:presentation xmlns:a="http://schemas.openxmlformats.org/drawingml/2006/main" xmlns:r="http://schemas.openxmlformats.org/officeDocument/2006/relationships" xmlns:p="http://schemas.openxmlformats.org/presentationml/2006/main" removePersonalInfoOnSave="1" saveSubsetFonts="1">
   <p:sldMasterIdLst>
     <p:sldMasterId id="2147483648" r:id="rId1"/>
-    <p:sldMasterId id="2147483660" r:id="rId2"/>
+    <p:sldMasterId id="2147483660" r:id="rId3"/>
   </p:sldMasterIdLst>
   <p:notesMasterIdLst>
-    <p:notesMasterId r:id="rId14"/>
+    <p:notesMasterId r:id="rId15"/>
   </p:notesMasterIdLst>
   <p:handoutMasterIdLst>
-    <p:handoutMasterId r:id="rId15"/>
+    <p:handoutMasterId r:id="rId16"/>
   </p:handoutMasterIdLst>
   <p:sldIdLst>
-    <p:sldId id="267" r:id="rId3"/>
-    <p:sldId id="257" r:id="rId4"/>
-    <p:sldId id="258" r:id="rId5"/>
-    <p:sldId id="259" r:id="rId6"/>
-    <p:sldId id="260" r:id="rId7"/>
-    <p:sldId id="261" r:id="rId8"/>
-    <p:sldId id="264" r:id="rId9"/>
-    <p:sldId id="262" r:id="rId10"/>
-    <p:sldId id="263" r:id="rId11"/>
-    <p:sldId id="265" r:id="rId12"/>
-    <p:sldId id="266" r:id="rId13"/>
+    <p:sldId id="267" r:id="rId4"/>
+    <p:sldId id="257" r:id="rId5"/>
+    <p:sldId id="258" r:id="rId6"/>
+    <p:sldId id="259" r:id="rId7"/>
+    <p:sldId id="260" r:id="rId8"/>
+    <p:sldId id="261" r:id="rId9"/>
+    <p:sldId id="264" r:id="rId10"/>
+    <p:sldId id="262" r:id="rId11"/>
+    <p:sldId id="263" r:id="rId12"/>
+    <p:sldId id="265" r:id="rId13"/>
+    <p:sldId id="266" r:id="rId14"/>
   </p:sldIdLst>
   <p:sldSz cx="12192000" cy="6858000"/>
   <p:notesSz cx="6858000" cy="9144000"/>
@@ -121,25 +121,6 @@
       </a:defRPr>
     </a:lvl9pPr>
   </p:defaultTextStyle>
-  <p:extLst>
-    <p:ext uri="{EFAFB233-063F-42B5-8137-9DF3F51BA10A}">
-      <p15:sldGuideLst xmlns:p15="http://schemas.microsoft.com/office/powerpoint/2012/main">
-        <p15:guide id="1" orient="horz" pos="2160">
-          <p15:clr>
-            <a:srgbClr val="A4A3A4"/>
-          </p15:clr>
-        </p15:guide>
-        <p15:guide id="2" pos="3840">
-          <p15:clr>
-            <a:srgbClr val="A4A3A4"/>
-          </p15:clr>
-        </p15:guide>
-      </p15:sldGuideLst>
-    </p:ext>
-    <p:ext uri="{2D200454-40CA-4A62-9FC3-DE9A4176ACB9}">
-      <p15:notesGuideLst xmlns:p15="http://schemas.microsoft.com/office/powerpoint/2012/main"/>
-    </p:ext>
-  </p:extLst>
 </p:presentation>
 </file>
 
@@ -5650,13 +5631,6 @@
     <dgm:pt modelId="{29EADAFA-A450-43D7-B01E-E9E5E8FE7373}" type="pres">
       <dgm:prSet presAssocID="{802306BC-46CC-4081-A261-E7EEFCA13485}" presName="Name13" presStyleLbl="parChTrans1D2" presStyleIdx="1" presStyleCnt="4"/>
       <dgm:spPr/>
-      <dgm:t>
-        <a:bodyPr/>
-        <a:lstStyle/>
-        <a:p>
-          <a:endParaRPr lang="zh-CN" altLang="en-US"/>
-        </a:p>
-      </dgm:t>
     </dgm:pt>
     <dgm:pt modelId="{DB910009-D45F-4D57-B10A-934EC3E5E24F}" type="pres">
       <dgm:prSet presAssocID="{67671F9F-603C-4FE3-BD46-B3A2CD2E4619}" presName="childText" presStyleLbl="bgAcc1" presStyleIdx="1" presStyleCnt="4">
@@ -5736,13 +5710,6 @@
     <dgm:pt modelId="{EA8D7378-E222-4C55-A033-43249730ED27}" type="pres">
       <dgm:prSet presAssocID="{5A8BE835-1C72-4A7E-9115-089F248EF402}" presName="Name13" presStyleLbl="parChTrans1D2" presStyleIdx="3" presStyleCnt="4"/>
       <dgm:spPr/>
-      <dgm:t>
-        <a:bodyPr/>
-        <a:lstStyle/>
-        <a:p>
-          <a:endParaRPr lang="zh-CN" altLang="en-US"/>
-        </a:p>
-      </dgm:t>
     </dgm:pt>
     <dgm:pt modelId="{6D8E477D-924C-473C-91AC-6D2B9553E33C}" type="pres">
       <dgm:prSet presAssocID="{F26FB52D-33DC-4D46-BD76-AD8685C51DC5}" presName="childText" presStyleLbl="bgAcc1" presStyleIdx="3" presStyleCnt="4">
@@ -5761,25 +5728,25 @@
     </dgm:pt>
   </dgm:ptLst>
   <dgm:cxnLst>
+    <dgm:cxn modelId="{03772AAD-C9E5-4645-B88C-E278AD1163DF}" type="presOf" srcId="{839ACD05-9C12-412F-A2D5-CF1591CAE56C}" destId="{3FA6329C-A2A8-46C6-B223-4CD29890A57A}" srcOrd="1" destOrd="0" presId="urn:microsoft.com/office/officeart/2005/8/layout/hierarchy3"/>
+    <dgm:cxn modelId="{777DC5C0-1206-40DF-BE44-749C11A74B8D}" type="presOf" srcId="{D34E00D3-ECBA-46A5-8A33-7A57246CEA95}" destId="{F52D0DAB-881A-4D0F-8B43-D55C8E2431B0}" srcOrd="1" destOrd="0" presId="urn:microsoft.com/office/officeart/2005/8/layout/hierarchy3"/>
+    <dgm:cxn modelId="{355DFBEA-F543-4849-B4E9-513216B7A28B}" type="presOf" srcId="{1E87AF89-1015-45BB-B7EE-D8931EB740BF}" destId="{50E8D4B1-746A-4046-A8DB-25F9F3B04F5A}" srcOrd="0" destOrd="0" presId="urn:microsoft.com/office/officeart/2005/8/layout/hierarchy3"/>
+    <dgm:cxn modelId="{E8756D59-BF13-4415-B0BA-BB10818E41CF}" type="presOf" srcId="{67671F9F-603C-4FE3-BD46-B3A2CD2E4619}" destId="{DB910009-D45F-4D57-B10A-934EC3E5E24F}" srcOrd="0" destOrd="0" presId="urn:microsoft.com/office/officeart/2005/8/layout/hierarchy3"/>
+    <dgm:cxn modelId="{0F37DD3B-F0D5-498C-A56E-758683C4C476}" type="presOf" srcId="{F26FB52D-33DC-4D46-BD76-AD8685C51DC5}" destId="{6D8E477D-924C-473C-91AC-6D2B9553E33C}" srcOrd="0" destOrd="0" presId="urn:microsoft.com/office/officeart/2005/8/layout/hierarchy3"/>
+    <dgm:cxn modelId="{02AEFA28-4ADD-4B06-8EB6-EC2E45AC6D31}" srcId="{839ACD05-9C12-412F-A2D5-CF1591CAE56C}" destId="{F26FB52D-33DC-4D46-BD76-AD8685C51DC5}" srcOrd="1" destOrd="0" parTransId="{5A8BE835-1C72-4A7E-9115-089F248EF402}" sibTransId="{15CBF95D-F2AC-4F0F-9A94-49A56BB6C0D8}"/>
+    <dgm:cxn modelId="{F56CAF26-70D1-4D5E-B35B-7DC89A0C6B2D}" srcId="{D34E00D3-ECBA-46A5-8A33-7A57246CEA95}" destId="{8C6798E6-3F36-4315-B879-415E9C4A9983}" srcOrd="0" destOrd="0" parTransId="{0E383264-623F-4952-B60D-5FC424EB6CA7}" sibTransId="{8FA0E11E-7DF8-48EA-8138-24C0E7732B76}"/>
+    <dgm:cxn modelId="{625F567D-E947-4479-AE1D-D8E1CCCF6343}" type="presOf" srcId="{8C6798E6-3F36-4315-B879-415E9C4A9983}" destId="{946B726D-8ECD-4AA5-A32C-F8DDEA344C30}" srcOrd="0" destOrd="0" presId="urn:microsoft.com/office/officeart/2005/8/layout/hierarchy3"/>
     <dgm:cxn modelId="{1397DD4C-51BF-45EF-B2A5-6D661495470E}" type="presOf" srcId="{0E383264-623F-4952-B60D-5FC424EB6CA7}" destId="{3C188B19-A77B-44CF-B678-8A70AEC38B1D}" srcOrd="0" destOrd="0" presId="urn:microsoft.com/office/officeart/2005/8/layout/hierarchy3"/>
-    <dgm:cxn modelId="{DA7B02E0-E5A6-4645-A0C6-A0EAEB325C22}" srcId="{C6F8BADE-A621-4E19-8423-5F344DEED120}" destId="{839ACD05-9C12-412F-A2D5-CF1591CAE56C}" srcOrd="1" destOrd="0" parTransId="{90515C67-D541-4EE7-9AD3-9361CE4CE5E6}" sibTransId="{3E965261-66F8-4955-974C-C648540D9A5B}"/>
+    <dgm:cxn modelId="{BA33BEDF-EAD6-4515-8ED1-2F08781AD162}" type="presOf" srcId="{5A8BE835-1C72-4A7E-9115-089F248EF402}" destId="{EA8D7378-E222-4C55-A033-43249730ED27}" srcOrd="0" destOrd="0" presId="urn:microsoft.com/office/officeart/2005/8/layout/hierarchy3"/>
+    <dgm:cxn modelId="{649EBD5C-8601-466A-9E9A-2C79FD4CE0D3}" type="presOf" srcId="{839ACD05-9C12-412F-A2D5-CF1591CAE56C}" destId="{85CF7BFC-8460-4C1E-9911-E5A9544357DB}" srcOrd="0" destOrd="0" presId="urn:microsoft.com/office/officeart/2005/8/layout/hierarchy3"/>
+    <dgm:cxn modelId="{2C5A9AC8-603D-4000-B446-CCE41E76C5A3}" type="presOf" srcId="{D34E00D3-ECBA-46A5-8A33-7A57246CEA95}" destId="{EEA4795B-68FF-49EA-BCED-5D1412A26292}" srcOrd="0" destOrd="0" presId="urn:microsoft.com/office/officeart/2005/8/layout/hierarchy3"/>
+    <dgm:cxn modelId="{D72D476F-E314-471A-ABED-F6A86C821FF5}" type="presOf" srcId="{802306BC-46CC-4081-A261-E7EEFCA13485}" destId="{29EADAFA-A450-43D7-B01E-E9E5E8FE7373}" srcOrd="0" destOrd="0" presId="urn:microsoft.com/office/officeart/2005/8/layout/hierarchy3"/>
+    <dgm:cxn modelId="{236CF7A3-078A-4B89-94F1-F24C051CF58E}" srcId="{C6F8BADE-A621-4E19-8423-5F344DEED120}" destId="{D34E00D3-ECBA-46A5-8A33-7A57246CEA95}" srcOrd="0" destOrd="0" parTransId="{2DA7A531-80B1-4010-AF98-E0E0DD023027}" sibTransId="{73343882-CF80-42E6-B48E-01FB4D953BC2}"/>
+    <dgm:cxn modelId="{45DA777D-DD40-4649-BE27-AF4492946135}" srcId="{D34E00D3-ECBA-46A5-8A33-7A57246CEA95}" destId="{67671F9F-603C-4FE3-BD46-B3A2CD2E4619}" srcOrd="1" destOrd="0" parTransId="{802306BC-46CC-4081-A261-E7EEFCA13485}" sibTransId="{0149F9B4-91FB-4386-8BBF-B28A8CFF2AA2}"/>
     <dgm:cxn modelId="{E964962E-7034-4B54-AB2B-023F93CC43E2}" srcId="{839ACD05-9C12-412F-A2D5-CF1591CAE56C}" destId="{CAB7B91D-86E4-4CC4-9BF8-263F9E3FD77E}" srcOrd="0" destOrd="0" parTransId="{1E87AF89-1015-45BB-B7EE-D8931EB740BF}" sibTransId="{B7C01FD1-E648-48FD-882D-F6F52848FB7F}"/>
     <dgm:cxn modelId="{A5DC85C1-6335-4555-B6E8-C37FC3EA38BF}" type="presOf" srcId="{CAB7B91D-86E4-4CC4-9BF8-263F9E3FD77E}" destId="{C1EC1154-0E49-4B37-B380-D6FF7D72E727}" srcOrd="0" destOrd="0" presId="urn:microsoft.com/office/officeart/2005/8/layout/hierarchy3"/>
-    <dgm:cxn modelId="{02AEFA28-4ADD-4B06-8EB6-EC2E45AC6D31}" srcId="{839ACD05-9C12-412F-A2D5-CF1591CAE56C}" destId="{F26FB52D-33DC-4D46-BD76-AD8685C51DC5}" srcOrd="1" destOrd="0" parTransId="{5A8BE835-1C72-4A7E-9115-089F248EF402}" sibTransId="{15CBF95D-F2AC-4F0F-9A94-49A56BB6C0D8}"/>
-    <dgm:cxn modelId="{F56CAF26-70D1-4D5E-B35B-7DC89A0C6B2D}" srcId="{D34E00D3-ECBA-46A5-8A33-7A57246CEA95}" destId="{8C6798E6-3F36-4315-B879-415E9C4A9983}" srcOrd="0" destOrd="0" parTransId="{0E383264-623F-4952-B60D-5FC424EB6CA7}" sibTransId="{8FA0E11E-7DF8-48EA-8138-24C0E7732B76}"/>
-    <dgm:cxn modelId="{0F37DD3B-F0D5-498C-A56E-758683C4C476}" type="presOf" srcId="{F26FB52D-33DC-4D46-BD76-AD8685C51DC5}" destId="{6D8E477D-924C-473C-91AC-6D2B9553E33C}" srcOrd="0" destOrd="0" presId="urn:microsoft.com/office/officeart/2005/8/layout/hierarchy3"/>
-    <dgm:cxn modelId="{649EBD5C-8601-466A-9E9A-2C79FD4CE0D3}" type="presOf" srcId="{839ACD05-9C12-412F-A2D5-CF1591CAE56C}" destId="{85CF7BFC-8460-4C1E-9911-E5A9544357DB}" srcOrd="0" destOrd="0" presId="urn:microsoft.com/office/officeart/2005/8/layout/hierarchy3"/>
-    <dgm:cxn modelId="{D72D476F-E314-471A-ABED-F6A86C821FF5}" type="presOf" srcId="{802306BC-46CC-4081-A261-E7EEFCA13485}" destId="{29EADAFA-A450-43D7-B01E-E9E5E8FE7373}" srcOrd="0" destOrd="0" presId="urn:microsoft.com/office/officeart/2005/8/layout/hierarchy3"/>
-    <dgm:cxn modelId="{BA33BEDF-EAD6-4515-8ED1-2F08781AD162}" type="presOf" srcId="{5A8BE835-1C72-4A7E-9115-089F248EF402}" destId="{EA8D7378-E222-4C55-A033-43249730ED27}" srcOrd="0" destOrd="0" presId="urn:microsoft.com/office/officeart/2005/8/layout/hierarchy3"/>
-    <dgm:cxn modelId="{625F567D-E947-4479-AE1D-D8E1CCCF6343}" type="presOf" srcId="{8C6798E6-3F36-4315-B879-415E9C4A9983}" destId="{946B726D-8ECD-4AA5-A32C-F8DDEA344C30}" srcOrd="0" destOrd="0" presId="urn:microsoft.com/office/officeart/2005/8/layout/hierarchy3"/>
-    <dgm:cxn modelId="{355DFBEA-F543-4849-B4E9-513216B7A28B}" type="presOf" srcId="{1E87AF89-1015-45BB-B7EE-D8931EB740BF}" destId="{50E8D4B1-746A-4046-A8DB-25F9F3B04F5A}" srcOrd="0" destOrd="0" presId="urn:microsoft.com/office/officeart/2005/8/layout/hierarchy3"/>
+    <dgm:cxn modelId="{DA7B02E0-E5A6-4645-A0C6-A0EAEB325C22}" srcId="{C6F8BADE-A621-4E19-8423-5F344DEED120}" destId="{839ACD05-9C12-412F-A2D5-CF1591CAE56C}" srcOrd="1" destOrd="0" parTransId="{90515C67-D541-4EE7-9AD3-9361CE4CE5E6}" sibTransId="{3E965261-66F8-4955-974C-C648540D9A5B}"/>
     <dgm:cxn modelId="{419F8E14-F2EB-42E9-BD1C-E5DB8163E109}" type="presOf" srcId="{C6F8BADE-A621-4E19-8423-5F344DEED120}" destId="{13803739-73CE-435F-A5A2-E509FD44435D}" srcOrd="0" destOrd="0" presId="urn:microsoft.com/office/officeart/2005/8/layout/hierarchy3"/>
-    <dgm:cxn modelId="{03772AAD-C9E5-4645-B88C-E278AD1163DF}" type="presOf" srcId="{839ACD05-9C12-412F-A2D5-CF1591CAE56C}" destId="{3FA6329C-A2A8-46C6-B223-4CD29890A57A}" srcOrd="1" destOrd="0" presId="urn:microsoft.com/office/officeart/2005/8/layout/hierarchy3"/>
-    <dgm:cxn modelId="{2C5A9AC8-603D-4000-B446-CCE41E76C5A3}" type="presOf" srcId="{D34E00D3-ECBA-46A5-8A33-7A57246CEA95}" destId="{EEA4795B-68FF-49EA-BCED-5D1412A26292}" srcOrd="0" destOrd="0" presId="urn:microsoft.com/office/officeart/2005/8/layout/hierarchy3"/>
-    <dgm:cxn modelId="{E8756D59-BF13-4415-B0BA-BB10818E41CF}" type="presOf" srcId="{67671F9F-603C-4FE3-BD46-B3A2CD2E4619}" destId="{DB910009-D45F-4D57-B10A-934EC3E5E24F}" srcOrd="0" destOrd="0" presId="urn:microsoft.com/office/officeart/2005/8/layout/hierarchy3"/>
-    <dgm:cxn modelId="{777DC5C0-1206-40DF-BE44-749C11A74B8D}" type="presOf" srcId="{D34E00D3-ECBA-46A5-8A33-7A57246CEA95}" destId="{F52D0DAB-881A-4D0F-8B43-D55C8E2431B0}" srcOrd="1" destOrd="0" presId="urn:microsoft.com/office/officeart/2005/8/layout/hierarchy3"/>
-    <dgm:cxn modelId="{45DA777D-DD40-4649-BE27-AF4492946135}" srcId="{D34E00D3-ECBA-46A5-8A33-7A57246CEA95}" destId="{67671F9F-603C-4FE3-BD46-B3A2CD2E4619}" srcOrd="1" destOrd="0" parTransId="{802306BC-46CC-4081-A261-E7EEFCA13485}" sibTransId="{0149F9B4-91FB-4386-8BBF-B28A8CFF2AA2}"/>
-    <dgm:cxn modelId="{236CF7A3-078A-4B89-94F1-F24C051CF58E}" srcId="{C6F8BADE-A621-4E19-8423-5F344DEED120}" destId="{D34E00D3-ECBA-46A5-8A33-7A57246CEA95}" srcOrd="0" destOrd="0" parTransId="{2DA7A531-80B1-4010-AF98-E0E0DD023027}" sibTransId="{73343882-CF80-42E6-B48E-01FB4D953BC2}"/>
     <dgm:cxn modelId="{30CB999D-0B76-4122-BFE1-0DAE67781804}" type="presParOf" srcId="{13803739-73CE-435F-A5A2-E509FD44435D}" destId="{1F00E9D8-0D7B-49EC-A09A-205CF5D86DFE}" srcOrd="0" destOrd="0" presId="urn:microsoft.com/office/officeart/2005/8/layout/hierarchy3"/>
     <dgm:cxn modelId="{C4BDC73A-7C40-46B7-90F9-C61B175830C7}" type="presParOf" srcId="{1F00E9D8-0D7B-49EC-A09A-205CF5D86DFE}" destId="{A62FBD41-69A6-46AE-9B69-DDEAE8694E1C}" srcOrd="0" destOrd="0" presId="urn:microsoft.com/office/officeart/2005/8/layout/hierarchy3"/>
     <dgm:cxn modelId="{B8CD4D72-76F2-41B4-B489-CE640A70EE29}" type="presParOf" srcId="{A62FBD41-69A6-46AE-9B69-DDEAE8694E1C}" destId="{EEA4795B-68FF-49EA-BCED-5D1412A26292}" srcOrd="0" destOrd="0" presId="urn:microsoft.com/office/officeart/2005/8/layout/hierarchy3"/>
@@ -6189,13 +6156,6 @@
         </dgm:presLayoutVars>
       </dgm:prSet>
       <dgm:spPr/>
-      <dgm:t>
-        <a:bodyPr/>
-        <a:lstStyle/>
-        <a:p>
-          <a:endParaRPr lang="zh-CN" altLang="en-US"/>
-        </a:p>
-      </dgm:t>
     </dgm:pt>
     <dgm:pt modelId="{78867893-85E0-4E6F-A3D8-B121D9E28AD4}" type="pres">
       <dgm:prSet presAssocID="{C1D198DF-77D6-48B0-BDE3-5CC72D9CF8D9}" presName="linNode" presStyleCnt="0"/>
@@ -6209,13 +6169,6 @@
         </dgm:presLayoutVars>
       </dgm:prSet>
       <dgm:spPr/>
-      <dgm:t>
-        <a:bodyPr/>
-        <a:lstStyle/>
-        <a:p>
-          <a:endParaRPr lang="zh-CN" altLang="en-US"/>
-        </a:p>
-      </dgm:t>
     </dgm:pt>
     <dgm:pt modelId="{001E576D-89BD-4763-9AC5-31DE0BF1A2B0}" type="pres">
       <dgm:prSet presAssocID="{C1D198DF-77D6-48B0-BDE3-5CC72D9CF8D9}" presName="descendantText" presStyleLbl="alignAccFollowNode1" presStyleIdx="0" presStyleCnt="3">
@@ -6248,13 +6201,6 @@
         </dgm:presLayoutVars>
       </dgm:prSet>
       <dgm:spPr/>
-      <dgm:t>
-        <a:bodyPr/>
-        <a:lstStyle/>
-        <a:p>
-          <a:endParaRPr lang="zh-CN" altLang="en-US"/>
-        </a:p>
-      </dgm:t>
     </dgm:pt>
     <dgm:pt modelId="{399F7127-3C1C-4E31-823E-71ADC3A6F5C0}" type="pres">
       <dgm:prSet presAssocID="{A9255373-6B2B-4354-A72B-20BAA9579A07}" presName="descendantText" presStyleLbl="alignAccFollowNode1" presStyleIdx="1" presStyleCnt="3">
@@ -6287,13 +6233,6 @@
         </dgm:presLayoutVars>
       </dgm:prSet>
       <dgm:spPr/>
-      <dgm:t>
-        <a:bodyPr/>
-        <a:lstStyle/>
-        <a:p>
-          <a:endParaRPr lang="zh-CN" altLang="en-US"/>
-        </a:p>
-      </dgm:t>
     </dgm:pt>
     <dgm:pt modelId="{9268D53B-2568-42FC-AB01-1D13BD7AB530}" type="pres">
       <dgm:prSet presAssocID="{F4D35594-A8E5-40CE-B87F-4AD0B9351291}" presName="descendantText" presStyleLbl="alignAccFollowNode1" presStyleIdx="2" presStyleCnt="3">
@@ -6302,35 +6241,28 @@
         </dgm:presLayoutVars>
       </dgm:prSet>
       <dgm:spPr/>
-      <dgm:t>
-        <a:bodyPr/>
-        <a:lstStyle/>
-        <a:p>
-          <a:endParaRPr lang="zh-CN" altLang="en-US"/>
-        </a:p>
-      </dgm:t>
     </dgm:pt>
   </dgm:ptLst>
   <dgm:cxnLst>
-    <dgm:cxn modelId="{9BE7A485-36B8-4DE7-A024-68EBDEEA4007}" type="presOf" srcId="{DB36D4FF-548F-402F-A2B8-2D6E4DEC62E7}" destId="{9268D53B-2568-42FC-AB01-1D13BD7AB530}" srcOrd="0" destOrd="1" presId="urn:microsoft.com/office/officeart/2005/8/layout/vList5"/>
-    <dgm:cxn modelId="{0D84FAD5-59E3-4D33-A065-3F9AED3D6A7F}" srcId="{A9255373-6B2B-4354-A72B-20BAA9579A07}" destId="{80BEC002-AD4A-4B12-878B-3F9005A75BD3}" srcOrd="1" destOrd="0" parTransId="{B7DDC856-9D48-4781-A90F-3061062F6B44}" sibTransId="{2FB3131D-3099-417F-A521-E4D0646D7F82}"/>
-    <dgm:cxn modelId="{26BF464E-6E17-4B2D-8248-32B9A4603C52}" type="presOf" srcId="{3BF2B84D-7DDD-4420-AC6F-088BE6106255}" destId="{9268D53B-2568-42FC-AB01-1D13BD7AB530}" srcOrd="0" destOrd="0" presId="urn:microsoft.com/office/officeart/2005/8/layout/vList5"/>
+    <dgm:cxn modelId="{19B6108A-80FA-41A1-8883-E51A9599AE9F}" srcId="{A9255373-6B2B-4354-A72B-20BAA9579A07}" destId="{2DA01002-C980-4A22-82F8-B7217EC2A1C1}" srcOrd="2" destOrd="0" parTransId="{E9F4067C-F94E-443B-A8A8-A794A6E90E50}" sibTransId="{A111CC83-EF37-46B4-A03D-24547221FAE8}"/>
+    <dgm:cxn modelId="{5263FF42-E268-4DB7-9087-9AFE9DEB3F2F}" srcId="{A9255373-6B2B-4354-A72B-20BAA9579A07}" destId="{9DD5910B-D53F-44E2-9A4A-06B08B28BB8C}" srcOrd="0" destOrd="0" parTransId="{528A44A4-BEC5-4271-B9D5-7C57BB5BB0AA}" sibTransId="{F56CFF0F-1DD0-4F20-B424-1AFC9A4C60CC}"/>
+    <dgm:cxn modelId="{755B4ECD-BCA0-43E9-8BB2-626C496043B7}" type="presOf" srcId="{9DD5910B-D53F-44E2-9A4A-06B08B28BB8C}" destId="{399F7127-3C1C-4E31-823E-71ADC3A6F5C0}" srcOrd="0" destOrd="0" presId="urn:microsoft.com/office/officeart/2005/8/layout/vList5"/>
     <dgm:cxn modelId="{6BFC10C7-8252-4DDD-BB2E-7ECF6EB162EB}" type="presOf" srcId="{C1D198DF-77D6-48B0-BDE3-5CC72D9CF8D9}" destId="{F3D316E4-43BE-49A9-ACEA-CBE477344977}" srcOrd="0" destOrd="0" presId="urn:microsoft.com/office/officeart/2005/8/layout/vList5"/>
     <dgm:cxn modelId="{10CBAF9E-FF04-4F59-B516-CE93E816A7E6}" srcId="{3238AFC2-8CED-4682-859F-F9667E119FD8}" destId="{C1D198DF-77D6-48B0-BDE3-5CC72D9CF8D9}" srcOrd="0" destOrd="0" parTransId="{8A754082-79E7-4223-98B7-EB18343B7A7E}" sibTransId="{94DCD1D4-1D59-4DAA-89A4-89085DFCDB22}"/>
+    <dgm:cxn modelId="{127A9141-7A12-422E-A79A-603B0AA8DE68}" srcId="{F4D35594-A8E5-40CE-B87F-4AD0B9351291}" destId="{3BF2B84D-7DDD-4420-AC6F-088BE6106255}" srcOrd="0" destOrd="0" parTransId="{C71395F0-0EB1-4E1E-945F-A072D07A609C}" sibTransId="{5EBDC0E7-E86F-4530-A379-C603EFE54D64}"/>
+    <dgm:cxn modelId="{0D84FAD5-59E3-4D33-A065-3F9AED3D6A7F}" srcId="{A9255373-6B2B-4354-A72B-20BAA9579A07}" destId="{80BEC002-AD4A-4B12-878B-3F9005A75BD3}" srcOrd="1" destOrd="0" parTransId="{B7DDC856-9D48-4781-A90F-3061062F6B44}" sibTransId="{2FB3131D-3099-417F-A521-E4D0646D7F82}"/>
     <dgm:cxn modelId="{DC75BE3C-F614-4FB8-84B8-DC0737C895DB}" srcId="{F4D35594-A8E5-40CE-B87F-4AD0B9351291}" destId="{DB36D4FF-548F-402F-A2B8-2D6E4DEC62E7}" srcOrd="1" destOrd="0" parTransId="{0F24B493-E4DE-47CE-A309-6607F4860098}" sibTransId="{3CE8A036-34BA-40F1-8ED2-625624F7C87E}"/>
+    <dgm:cxn modelId="{4A1ABB53-D9B6-468E-AB77-CCF17EC3D04D}" type="presOf" srcId="{A9255373-6B2B-4354-A72B-20BAA9579A07}" destId="{A962D324-CBAD-449F-A474-863543A6CA86}" srcOrd="0" destOrd="0" presId="urn:microsoft.com/office/officeart/2005/8/layout/vList5"/>
+    <dgm:cxn modelId="{9BE7A485-36B8-4DE7-A024-68EBDEEA4007}" type="presOf" srcId="{DB36D4FF-548F-402F-A2B8-2D6E4DEC62E7}" destId="{9268D53B-2568-42FC-AB01-1D13BD7AB530}" srcOrd="0" destOrd="1" presId="urn:microsoft.com/office/officeart/2005/8/layout/vList5"/>
+    <dgm:cxn modelId="{2D5EF703-C216-43D5-8411-D2F37BBD6B5C}" type="presOf" srcId="{F4D35594-A8E5-40CE-B87F-4AD0B9351291}" destId="{3D578473-AF45-4D0F-9D9A-A1B12A5CEC77}" srcOrd="0" destOrd="0" presId="urn:microsoft.com/office/officeart/2005/8/layout/vList5"/>
+    <dgm:cxn modelId="{26BF464E-6E17-4B2D-8248-32B9A4603C52}" type="presOf" srcId="{3BF2B84D-7DDD-4420-AC6F-088BE6106255}" destId="{9268D53B-2568-42FC-AB01-1D13BD7AB530}" srcOrd="0" destOrd="0" presId="urn:microsoft.com/office/officeart/2005/8/layout/vList5"/>
     <dgm:cxn modelId="{D17539B7-30E9-4148-82CA-6ADF3EFFB6E2}" srcId="{3238AFC2-8CED-4682-859F-F9667E119FD8}" destId="{F4D35594-A8E5-40CE-B87F-4AD0B9351291}" srcOrd="2" destOrd="0" parTransId="{F6A62355-8D78-411A-9C19-B17FEDDA843A}" sibTransId="{638138AF-DA3E-4D93-9E50-B96F3E88DF13}"/>
+    <dgm:cxn modelId="{3E727E96-5C56-4804-97A2-DEDDE3C7C555}" srcId="{C1D198DF-77D6-48B0-BDE3-5CC72D9CF8D9}" destId="{23A3C19C-1379-4BBC-8A0F-6D8BFC455397}" srcOrd="0" destOrd="0" parTransId="{E3F97128-08BE-42A4-B84F-7AE77DBD21FC}" sibTransId="{4EB3CB00-EA66-4BA5-86A4-0855ADD34E5C}"/>
+    <dgm:cxn modelId="{0BD15C49-8623-4A21-9B98-C3300CA2A48A}" type="presOf" srcId="{80BEC002-AD4A-4B12-878B-3F9005A75BD3}" destId="{399F7127-3C1C-4E31-823E-71ADC3A6F5C0}" srcOrd="0" destOrd="1" presId="urn:microsoft.com/office/officeart/2005/8/layout/vList5"/>
+    <dgm:cxn modelId="{DBF02700-5FF3-49C5-A253-38CE06A0B7CC}" type="presOf" srcId="{3238AFC2-8CED-4682-859F-F9667E119FD8}" destId="{1B417161-983C-490F-8BE4-F09CE311FA69}" srcOrd="0" destOrd="0" presId="urn:microsoft.com/office/officeart/2005/8/layout/vList5"/>
+    <dgm:cxn modelId="{213E63CF-BEAF-4A98-B31E-E05D981D76DC}" type="presOf" srcId="{23A3C19C-1379-4BBC-8A0F-6D8BFC455397}" destId="{001E576D-89BD-4763-9AC5-31DE0BF1A2B0}" srcOrd="0" destOrd="0" presId="urn:microsoft.com/office/officeart/2005/8/layout/vList5"/>
     <dgm:cxn modelId="{60FEB1AF-BC31-401D-A91C-EDF39ECA8D37}" srcId="{3238AFC2-8CED-4682-859F-F9667E119FD8}" destId="{A9255373-6B2B-4354-A72B-20BAA9579A07}" srcOrd="1" destOrd="0" parTransId="{F657B7A5-99A7-41D5-B478-7BC5E31F9DFA}" sibTransId="{D3FFEDA0-5D94-495F-AFDF-751233D6D7EE}"/>
-    <dgm:cxn modelId="{5263FF42-E268-4DB7-9087-9AFE9DEB3F2F}" srcId="{A9255373-6B2B-4354-A72B-20BAA9579A07}" destId="{9DD5910B-D53F-44E2-9A4A-06B08B28BB8C}" srcOrd="0" destOrd="0" parTransId="{528A44A4-BEC5-4271-B9D5-7C57BB5BB0AA}" sibTransId="{F56CFF0F-1DD0-4F20-B424-1AFC9A4C60CC}"/>
-    <dgm:cxn modelId="{3E727E96-5C56-4804-97A2-DEDDE3C7C555}" srcId="{C1D198DF-77D6-48B0-BDE3-5CC72D9CF8D9}" destId="{23A3C19C-1379-4BBC-8A0F-6D8BFC455397}" srcOrd="0" destOrd="0" parTransId="{E3F97128-08BE-42A4-B84F-7AE77DBD21FC}" sibTransId="{4EB3CB00-EA66-4BA5-86A4-0855ADD34E5C}"/>
-    <dgm:cxn modelId="{19B6108A-80FA-41A1-8883-E51A9599AE9F}" srcId="{A9255373-6B2B-4354-A72B-20BAA9579A07}" destId="{2DA01002-C980-4A22-82F8-B7217EC2A1C1}" srcOrd="2" destOrd="0" parTransId="{E9F4067C-F94E-443B-A8A8-A794A6E90E50}" sibTransId="{A111CC83-EF37-46B4-A03D-24547221FAE8}"/>
-    <dgm:cxn modelId="{127A9141-7A12-422E-A79A-603B0AA8DE68}" srcId="{F4D35594-A8E5-40CE-B87F-4AD0B9351291}" destId="{3BF2B84D-7DDD-4420-AC6F-088BE6106255}" srcOrd="0" destOrd="0" parTransId="{C71395F0-0EB1-4E1E-945F-A072D07A609C}" sibTransId="{5EBDC0E7-E86F-4530-A379-C603EFE54D64}"/>
-    <dgm:cxn modelId="{DBF02700-5FF3-49C5-A253-38CE06A0B7CC}" type="presOf" srcId="{3238AFC2-8CED-4682-859F-F9667E119FD8}" destId="{1B417161-983C-490F-8BE4-F09CE311FA69}" srcOrd="0" destOrd="0" presId="urn:microsoft.com/office/officeart/2005/8/layout/vList5"/>
-    <dgm:cxn modelId="{0BD15C49-8623-4A21-9B98-C3300CA2A48A}" type="presOf" srcId="{80BEC002-AD4A-4B12-878B-3F9005A75BD3}" destId="{399F7127-3C1C-4E31-823E-71ADC3A6F5C0}" srcOrd="0" destOrd="1" presId="urn:microsoft.com/office/officeart/2005/8/layout/vList5"/>
     <dgm:cxn modelId="{1D9B1FE1-8548-4D01-988C-FFF75FD6AD59}" type="presOf" srcId="{2DA01002-C980-4A22-82F8-B7217EC2A1C1}" destId="{399F7127-3C1C-4E31-823E-71ADC3A6F5C0}" srcOrd="0" destOrd="2" presId="urn:microsoft.com/office/officeart/2005/8/layout/vList5"/>
-    <dgm:cxn modelId="{755B4ECD-BCA0-43E9-8BB2-626C496043B7}" type="presOf" srcId="{9DD5910B-D53F-44E2-9A4A-06B08B28BB8C}" destId="{399F7127-3C1C-4E31-823E-71ADC3A6F5C0}" srcOrd="0" destOrd="0" presId="urn:microsoft.com/office/officeart/2005/8/layout/vList5"/>
-    <dgm:cxn modelId="{213E63CF-BEAF-4A98-B31E-E05D981D76DC}" type="presOf" srcId="{23A3C19C-1379-4BBC-8A0F-6D8BFC455397}" destId="{001E576D-89BD-4763-9AC5-31DE0BF1A2B0}" srcOrd="0" destOrd="0" presId="urn:microsoft.com/office/officeart/2005/8/layout/vList5"/>
-    <dgm:cxn modelId="{4A1ABB53-D9B6-468E-AB77-CCF17EC3D04D}" type="presOf" srcId="{A9255373-6B2B-4354-A72B-20BAA9579A07}" destId="{A962D324-CBAD-449F-A474-863543A6CA86}" srcOrd="0" destOrd="0" presId="urn:microsoft.com/office/officeart/2005/8/layout/vList5"/>
-    <dgm:cxn modelId="{2D5EF703-C216-43D5-8411-D2F37BBD6B5C}" type="presOf" srcId="{F4D35594-A8E5-40CE-B87F-4AD0B9351291}" destId="{3D578473-AF45-4D0F-9D9A-A1B12A5CEC77}" srcOrd="0" destOrd="0" presId="urn:microsoft.com/office/officeart/2005/8/layout/vList5"/>
     <dgm:cxn modelId="{6807CFC8-C285-4EDD-B3AD-E893868F6C9E}" type="presParOf" srcId="{1B417161-983C-490F-8BE4-F09CE311FA69}" destId="{78867893-85E0-4E6F-A3D8-B121D9E28AD4}" srcOrd="0" destOrd="0" presId="urn:microsoft.com/office/officeart/2005/8/layout/vList5"/>
     <dgm:cxn modelId="{68074FA9-AB9E-4299-8275-E1D73617F131}" type="presParOf" srcId="{78867893-85E0-4E6F-A3D8-B121D9E28AD4}" destId="{F3D316E4-43BE-49A9-ACEA-CBE477344977}" srcOrd="0" destOrd="0" presId="urn:microsoft.com/office/officeart/2005/8/layout/vList5"/>
     <dgm:cxn modelId="{89EBC1E6-0A9E-45C6-B2DB-E2E7A53F8D49}" type="presParOf" srcId="{78867893-85E0-4E6F-A3D8-B121D9E28AD4}" destId="{001E576D-89BD-4763-9AC5-31DE0BF1A2B0}" srcOrd="1" destOrd="0" presId="urn:microsoft.com/office/officeart/2005/8/layout/vList5"/>
@@ -6630,13 +6562,6 @@
         </dgm:presLayoutVars>
       </dgm:prSet>
       <dgm:spPr/>
-      <dgm:t>
-        <a:bodyPr/>
-        <a:lstStyle/>
-        <a:p>
-          <a:endParaRPr lang="zh-CN" altLang="en-US"/>
-        </a:p>
-      </dgm:t>
     </dgm:pt>
     <dgm:pt modelId="{7E201614-3B3B-4AD4-B787-DE920A9F4080}" type="pres">
       <dgm:prSet presAssocID="{04D601AB-1671-42C0-BD81-F9C778CA0DA0}" presName="circle1" presStyleLbl="node1" presStyleIdx="0" presStyleCnt="3"/>
@@ -6649,13 +6574,6 @@
     <dgm:pt modelId="{8F274263-1CE7-4EC0-9F0C-8D05A7046E40}" type="pres">
       <dgm:prSet presAssocID="{04D601AB-1671-42C0-BD81-F9C778CA0DA0}" presName="rect1" presStyleLbl="alignAcc1" presStyleIdx="0" presStyleCnt="3"/>
       <dgm:spPr/>
-      <dgm:t>
-        <a:bodyPr/>
-        <a:lstStyle/>
-        <a:p>
-          <a:endParaRPr lang="zh-CN" altLang="en-US"/>
-        </a:p>
-      </dgm:t>
     </dgm:pt>
     <dgm:pt modelId="{F0DF4888-07C4-4F74-8D98-DE8AE4DE7015}" type="pres">
       <dgm:prSet presAssocID="{DCD6DD5F-5758-4A9F-B71C-97DD1DDF6805}" presName="vertSpace2" presStyleLbl="node1" presStyleIdx="0" presStyleCnt="3"/>
@@ -6687,13 +6605,6 @@
     <dgm:pt modelId="{70D09977-887B-4AE9-87DC-B5E1DC2C8618}" type="pres">
       <dgm:prSet presAssocID="{11AEACFE-09CF-4712-A676-5800B492C24E}" presName="rect3" presStyleLbl="alignAcc1" presStyleIdx="2" presStyleCnt="3"/>
       <dgm:spPr/>
-      <dgm:t>
-        <a:bodyPr/>
-        <a:lstStyle/>
-        <a:p>
-          <a:endParaRPr lang="zh-CN" altLang="en-US"/>
-        </a:p>
-      </dgm:t>
     </dgm:pt>
     <dgm:pt modelId="{DDDEA78A-E646-414B-A887-3F286A7CC228}" type="pres">
       <dgm:prSet presAssocID="{04D601AB-1671-42C0-BD81-F9C778CA0DA0}" presName="rect1ParTx" presStyleLbl="alignAcc1" presStyleIdx="2" presStyleCnt="3">
@@ -6703,13 +6614,6 @@
         </dgm:presLayoutVars>
       </dgm:prSet>
       <dgm:spPr/>
-      <dgm:t>
-        <a:bodyPr/>
-        <a:lstStyle/>
-        <a:p>
-          <a:endParaRPr lang="zh-CN" altLang="en-US"/>
-        </a:p>
-      </dgm:t>
     </dgm:pt>
     <dgm:pt modelId="{4DD91175-4CCB-4B91-93E1-FC6B107E8398}" type="pres">
       <dgm:prSet presAssocID="{04D601AB-1671-42C0-BD81-F9C778CA0DA0}" presName="rect1ChTx" presStyleLbl="alignAcc1" presStyleIdx="2" presStyleCnt="3">
@@ -6765,13 +6669,6 @@
         </dgm:presLayoutVars>
       </dgm:prSet>
       <dgm:spPr/>
-      <dgm:t>
-        <a:bodyPr/>
-        <a:lstStyle/>
-        <a:p>
-          <a:endParaRPr lang="zh-CN" altLang="en-US"/>
-        </a:p>
-      </dgm:t>
     </dgm:pt>
     <dgm:pt modelId="{8507B361-43A4-4B00-8266-3A5DD9BAAA8A}" type="pres">
       <dgm:prSet presAssocID="{11AEACFE-09CF-4712-A676-5800B492C24E}" presName="rect3ChTx" presStyleLbl="alignAcc1" presStyleIdx="2" presStyleCnt="3">
@@ -6780,13 +6677,6 @@
         </dgm:presLayoutVars>
       </dgm:prSet>
       <dgm:spPr/>
-      <dgm:t>
-        <a:bodyPr/>
-        <a:lstStyle/>
-        <a:p>
-          <a:endParaRPr lang="zh-CN" altLang="en-US"/>
-        </a:p>
-      </dgm:t>
     </dgm:pt>
   </dgm:ptLst>
   <dgm:cxnLst>
@@ -6798,8 +6688,8 @@
     <dgm:cxn modelId="{CDD6773C-A7D3-4FD7-AC10-7F218126141D}" type="presOf" srcId="{2FA1F0B2-F756-4CD9-8DD2-79D582FAD795}" destId="{DC4C6E81-988D-4E64-BD8B-9EE3FDD7DE63}" srcOrd="0" destOrd="0" presId="urn:microsoft.com/office/officeart/2005/8/layout/target3"/>
     <dgm:cxn modelId="{C4FF76A7-5299-439B-A611-9F358E2AA0CD}" type="presOf" srcId="{11AEACFE-09CF-4712-A676-5800B492C24E}" destId="{70D09977-887B-4AE9-87DC-B5E1DC2C8618}" srcOrd="0" destOrd="0" presId="urn:microsoft.com/office/officeart/2005/8/layout/target3"/>
     <dgm:cxn modelId="{B2149DB6-2F55-47F9-B046-0E394398898F}" type="presOf" srcId="{5145F6BE-25C1-4D6F-8A5E-FD84B61F119A}" destId="{4DD91175-4CCB-4B91-93E1-FC6B107E8398}" srcOrd="0" destOrd="0" presId="urn:microsoft.com/office/officeart/2005/8/layout/target3"/>
+    <dgm:cxn modelId="{4447E796-44AF-445C-A372-2C7CC97AA7C2}" type="presOf" srcId="{BB355B1D-7028-4058-A794-08DFB54A0B34}" destId="{B1EB3481-3F28-430E-A396-EF1C1AEDEB9F}" srcOrd="0" destOrd="1" presId="urn:microsoft.com/office/officeart/2005/8/layout/target3"/>
     <dgm:cxn modelId="{973523C1-C2AA-450C-B081-7B9D5AC98FB7}" type="presOf" srcId="{2789A4CD-B086-483A-AA46-F82C59CAD686}" destId="{B1EB3481-3F28-430E-A396-EF1C1AEDEB9F}" srcOrd="0" destOrd="0" presId="urn:microsoft.com/office/officeart/2005/8/layout/target3"/>
-    <dgm:cxn modelId="{4447E796-44AF-445C-A372-2C7CC97AA7C2}" type="presOf" srcId="{BB355B1D-7028-4058-A794-08DFB54A0B34}" destId="{B1EB3481-3F28-430E-A396-EF1C1AEDEB9F}" srcOrd="0" destOrd="1" presId="urn:microsoft.com/office/officeart/2005/8/layout/target3"/>
     <dgm:cxn modelId="{2F137B12-8FC2-4A05-AFB4-F01E9DF73820}" srcId="{DCD6DD5F-5758-4A9F-B71C-97DD1DDF6805}" destId="{2789A4CD-B086-483A-AA46-F82C59CAD686}" srcOrd="0" destOrd="0" parTransId="{AC92C280-7AFB-4047-BE26-74F867293267}" sibTransId="{706D6C95-FD58-43F5-9158-082081752DCF}"/>
     <dgm:cxn modelId="{018C2112-FEB4-4E8F-8BF6-A2025249B05A}" type="presOf" srcId="{04D601AB-1671-42C0-BD81-F9C778CA0DA0}" destId="{DDDEA78A-E646-414B-A887-3F286A7CC228}" srcOrd="1" destOrd="0" presId="urn:microsoft.com/office/officeart/2005/8/layout/target3"/>
     <dgm:cxn modelId="{AEF2ED9C-0F58-4A9B-9D1A-F58832AA3284}" type="presOf" srcId="{DCD6DD5F-5758-4A9F-B71C-97DD1DDF6805}" destId="{8FDDA5B3-BE75-4E64-B81C-59B2F5BAC128}" srcOrd="1" destOrd="0" presId="urn:microsoft.com/office/officeart/2005/8/layout/target3"/>
@@ -7004,13 +6894,6 @@
         </dgm:presLayoutVars>
       </dgm:prSet>
       <dgm:spPr/>
-      <dgm:t>
-        <a:bodyPr/>
-        <a:lstStyle/>
-        <a:p>
-          <a:endParaRPr lang="zh-CN" altLang="en-US"/>
-        </a:p>
-      </dgm:t>
     </dgm:pt>
     <dgm:pt modelId="{2F5E6A9B-7A21-4785-BAF1-F9F1CFC684BB}" type="pres">
       <dgm:prSet presAssocID="{D543274F-93B6-4E67-BC89-C4D93EE9CF0E}" presName="parentText" presStyleLbl="node1" presStyleIdx="0" presStyleCnt="2">
@@ -7020,13 +6903,6 @@
         </dgm:presLayoutVars>
       </dgm:prSet>
       <dgm:spPr/>
-      <dgm:t>
-        <a:bodyPr/>
-        <a:lstStyle/>
-        <a:p>
-          <a:endParaRPr lang="zh-CN" altLang="en-US"/>
-        </a:p>
-      </dgm:t>
     </dgm:pt>
     <dgm:pt modelId="{98BA2F7B-50FF-4082-A415-82158AD29035}" type="pres">
       <dgm:prSet presAssocID="{D543274F-93B6-4E67-BC89-C4D93EE9CF0E}" presName="childText" presStyleLbl="revTx" presStyleIdx="0" presStyleCnt="2">
@@ -7051,13 +6927,6 @@
         </dgm:presLayoutVars>
       </dgm:prSet>
       <dgm:spPr/>
-      <dgm:t>
-        <a:bodyPr/>
-        <a:lstStyle/>
-        <a:p>
-          <a:endParaRPr lang="zh-CN" altLang="en-US"/>
-        </a:p>
-      </dgm:t>
     </dgm:pt>
     <dgm:pt modelId="{BBA439B9-2D33-42AF-95A4-B87D4EA42CAB}" type="pres">
       <dgm:prSet presAssocID="{3363C1B8-5813-4CB4-B022-184CF33D1F19}" presName="childText" presStyleLbl="revTx" presStyleIdx="1" presStyleCnt="2">
@@ -7274,13 +7143,6 @@
         </dgm:presLayoutVars>
       </dgm:prSet>
       <dgm:spPr/>
-      <dgm:t>
-        <a:bodyPr/>
-        <a:lstStyle/>
-        <a:p>
-          <a:endParaRPr lang="zh-CN" altLang="en-US"/>
-        </a:p>
-      </dgm:t>
     </dgm:pt>
     <dgm:pt modelId="{2F5E6A9B-7A21-4785-BAF1-F9F1CFC684BB}" type="pres">
       <dgm:prSet presAssocID="{D543274F-93B6-4E67-BC89-C4D93EE9CF0E}" presName="parentText" presStyleLbl="node1" presStyleIdx="0" presStyleCnt="2" custLinFactNeighborY="1862">
@@ -7371,16 +7233,23 @@
 </file>
 
 <file path=ppt/diagrams/drawing1.xml><?xml version="1.0" encoding="utf-8"?>
-<dsp:drawing xmlns:dgm="http://schemas.openxmlformats.org/drawingml/2006/diagram" xmlns:dsp="http://schemas.microsoft.com/office/drawing/2008/diagram" xmlns:a="http://schemas.openxmlformats.org/drawingml/2006/main">
+<dsp:drawing xmlns:dgm="http://schemas.openxmlformats.org/drawingml/2006/diagram" xmlns:dsp="http://schemas.microsoft.com/office/drawing/2008/diagram" xmlns:a="http://schemas.openxmlformats.org/drawingml/2006/main" xmlns:r="http://schemas.openxmlformats.org/officeDocument/2006/relationships">
   <dsp:spTree>
     <dsp:nvGrpSpPr>
       <dsp:cNvPr id="0" name=""/>
       <dsp:cNvGrpSpPr/>
     </dsp:nvGrpSpPr>
-    <dsp:grpSpPr/>
-    <dsp:sp modelId="{02BD8CC7-75C5-4007-B516-3F3CB528DACF}">
+    <dsp:grpSpPr>
+      <a:xfrm>
+        <a:off x="0" y="0"/>
+        <a:ext cx="10131552" cy="4114800"/>
+        <a:chOff x="0" y="0"/>
+        <a:chExt cx="0" cy="0"/>
+      </a:xfrm>
+    </dsp:grpSpPr>
+    <dsp:sp>
       <dsp:nvSpPr>
-        <dsp:cNvPr id="0" name=""/>
+        <dsp:cNvPr id="1" name="矩形 0"/>
         <dsp:cNvSpPr/>
       </dsp:nvSpPr>
       <dsp:spPr>
@@ -7428,14 +7297,14 @@
           </a:pPr>
           <a:r>
             <a:rPr lang="zh-CN" altLang="en-US" sz="2900" kern="1200" dirty="0" smtClean="0">
-              <a:latin typeface="Microsoft YaHei UI" panose="020B0503020204020204" pitchFamily="34" charset="-122"/>
-              <a:ea typeface="Microsoft YaHei UI" panose="020B0503020204020204" pitchFamily="34" charset="-122"/>
+              <a:latin typeface="Microsoft YaHei UI" pitchFamily="34" charset="-122"/>
+              <a:ea typeface="Microsoft YaHei UI" pitchFamily="34" charset="-122"/>
             </a:rPr>
             <a:t>项目开始</a:t>
           </a:r>
           <a:endParaRPr lang="zh-CN" sz="2900" kern="1200" dirty="0">
-            <a:latin typeface="Microsoft YaHei UI" panose="020B0503020204020204" pitchFamily="34" charset="-122"/>
-            <a:ea typeface="Microsoft YaHei UI" panose="020B0503020204020204" pitchFamily="34" charset="-122"/>
+            <a:latin typeface="Microsoft YaHei UI" pitchFamily="34" charset="-122"/>
+            <a:ea typeface="Microsoft YaHei UI" pitchFamily="34" charset="-122"/>
           </a:endParaRPr>
         </a:p>
       </dsp:txBody>
@@ -7444,9 +7313,9 @@
         <a:ext cx="1940946" cy="639630"/>
       </dsp:txXfrm>
     </dsp:sp>
-    <dsp:sp modelId="{A775BD15-F6A2-4C85-B5A6-F2B8DBF4784F}">
+    <dsp:sp>
       <dsp:nvSpPr>
-        <dsp:cNvPr id="0" name=""/>
+        <dsp:cNvPr id="2" name="矩形 1"/>
         <dsp:cNvSpPr/>
       </dsp:nvSpPr>
       <dsp:spPr>
@@ -7494,11 +7363,15 @@
           </a:pPr>
           <a:r>
             <a:rPr lang="zh-CN" sz="3600" kern="1200" dirty="0">
-              <a:latin typeface="Microsoft YaHei UI" panose="020B0503020204020204" pitchFamily="34" charset="-122"/>
-              <a:ea typeface="Microsoft YaHei UI" panose="020B0503020204020204" pitchFamily="34" charset="-122"/>
+              <a:latin typeface="Microsoft YaHei UI" pitchFamily="34" charset="-122"/>
+              <a:ea typeface="Microsoft YaHei UI" pitchFamily="34" charset="-122"/>
             </a:rPr>
             <a:t>任务说明</a:t>
           </a:r>
+          <a:endParaRPr lang="zh-CN" sz="3600" kern="1200" dirty="0">
+            <a:latin typeface="Microsoft YaHei UI" pitchFamily="34" charset="-122"/>
+            <a:ea typeface="Microsoft YaHei UI" pitchFamily="34" charset="-122"/>
+          </a:endParaRPr>
         </a:p>
       </dsp:txBody>
       <dsp:txXfrm>
@@ -7506,9 +7379,9 @@
         <a:ext cx="1940946" cy="1198355"/>
       </dsp:txXfrm>
     </dsp:sp>
-    <dsp:sp modelId="{1710FDBB-7EB9-4E4A-A75B-3A542F876BE1}">
+    <dsp:sp>
       <dsp:nvSpPr>
-        <dsp:cNvPr id="0" name=""/>
+        <dsp:cNvPr id="3" name="椭圆 2"/>
         <dsp:cNvSpPr/>
       </dsp:nvSpPr>
       <dsp:spPr>
@@ -7570,9 +7443,9 @@
         </a:fontRef>
       </dsp:style>
     </dsp:sp>
-    <dsp:sp modelId="{0493D973-D617-43F6-A9FC-EC07F463C01C}">
+    <dsp:sp>
       <dsp:nvSpPr>
-        <dsp:cNvPr id="0" name=""/>
+        <dsp:cNvPr id="4" name="椭圆 3"/>
         <dsp:cNvSpPr/>
       </dsp:nvSpPr>
       <dsp:spPr>
@@ -7634,9 +7507,9 @@
         </a:fontRef>
       </dsp:style>
     </dsp:sp>
-    <dsp:sp modelId="{8D260052-C17B-4CB4-9DF0-A0D8F7651349}">
+    <dsp:sp>
       <dsp:nvSpPr>
-        <dsp:cNvPr id="0" name=""/>
+        <dsp:cNvPr id="5" name="椭圆 4"/>
         <dsp:cNvSpPr/>
       </dsp:nvSpPr>
       <dsp:spPr>
@@ -7698,9 +7571,9 @@
         </a:fontRef>
       </dsp:style>
     </dsp:sp>
-    <dsp:sp modelId="{7DFA09A5-4CAF-43E4-9B7D-A4989815C95F}">
+    <dsp:sp>
       <dsp:nvSpPr>
-        <dsp:cNvPr id="0" name=""/>
+        <dsp:cNvPr id="6" name="椭圆 5"/>
         <dsp:cNvSpPr/>
       </dsp:nvSpPr>
       <dsp:spPr>
@@ -7762,9 +7635,9 @@
         </a:fontRef>
       </dsp:style>
     </dsp:sp>
-    <dsp:sp modelId="{A9CA1880-65F3-4813-B6F5-C6F2E2644340}">
+    <dsp:sp>
       <dsp:nvSpPr>
-        <dsp:cNvPr id="0" name=""/>
+        <dsp:cNvPr id="7" name="椭圆 6"/>
         <dsp:cNvSpPr/>
       </dsp:nvSpPr>
       <dsp:spPr>
@@ -7826,9 +7699,9 @@
         </a:fontRef>
       </dsp:style>
     </dsp:sp>
-    <dsp:sp modelId="{E79035E2-2FFD-41B2-BD4D-3F1C92B0F99F}">
+    <dsp:sp>
       <dsp:nvSpPr>
-        <dsp:cNvPr id="0" name=""/>
+        <dsp:cNvPr id="8" name="椭圆 7"/>
         <dsp:cNvSpPr/>
       </dsp:nvSpPr>
       <dsp:spPr>
@@ -7890,9 +7763,9 @@
         </a:fontRef>
       </dsp:style>
     </dsp:sp>
-    <dsp:sp modelId="{416A5933-FAE9-471C-B105-BE9A5A3650F1}">
+    <dsp:sp>
       <dsp:nvSpPr>
-        <dsp:cNvPr id="0" name=""/>
+        <dsp:cNvPr id="9" name="椭圆 8"/>
         <dsp:cNvSpPr/>
       </dsp:nvSpPr>
       <dsp:spPr>
@@ -7954,9 +7827,9 @@
         </a:fontRef>
       </dsp:style>
     </dsp:sp>
-    <dsp:sp modelId="{F3A49FC3-9EAE-4AC4-8047-462346D1D05C}">
+    <dsp:sp>
       <dsp:nvSpPr>
-        <dsp:cNvPr id="0" name=""/>
+        <dsp:cNvPr id="10" name="椭圆 9"/>
         <dsp:cNvSpPr/>
       </dsp:nvSpPr>
       <dsp:spPr>
@@ -8018,9 +7891,9 @@
         </a:fontRef>
       </dsp:style>
     </dsp:sp>
-    <dsp:sp modelId="{821370CB-735A-46D2-AFB5-DB7DC7F819DE}">
+    <dsp:sp>
       <dsp:nvSpPr>
-        <dsp:cNvPr id="0" name=""/>
+        <dsp:cNvPr id="11" name="椭圆 10"/>
         <dsp:cNvSpPr/>
       </dsp:nvSpPr>
       <dsp:spPr>
@@ -8082,9 +7955,9 @@
         </a:fontRef>
       </dsp:style>
     </dsp:sp>
-    <dsp:sp modelId="{05A41983-091B-4CE6-8055-03099A9D617B}">
+    <dsp:sp>
       <dsp:nvSpPr>
-        <dsp:cNvPr id="0" name=""/>
+        <dsp:cNvPr id="12" name="椭圆 11"/>
         <dsp:cNvSpPr/>
       </dsp:nvSpPr>
       <dsp:spPr>
@@ -8146,9 +8019,9 @@
         </a:fontRef>
       </dsp:style>
     </dsp:sp>
-    <dsp:sp modelId="{9B685A17-6B02-432C-B5F2-66B2500DAF94}">
+    <dsp:sp>
       <dsp:nvSpPr>
-        <dsp:cNvPr id="0" name=""/>
+        <dsp:cNvPr id="13" name="椭圆 12"/>
         <dsp:cNvSpPr/>
       </dsp:nvSpPr>
       <dsp:spPr>
@@ -8210,9 +8083,9 @@
         </a:fontRef>
       </dsp:style>
     </dsp:sp>
-    <dsp:sp modelId="{491B9DAD-4C2E-4E77-8D9E-21C4E3F394A7}">
+    <dsp:sp>
       <dsp:nvSpPr>
-        <dsp:cNvPr id="0" name=""/>
+        <dsp:cNvPr id="14" name="椭圆 13"/>
         <dsp:cNvSpPr/>
       </dsp:nvSpPr>
       <dsp:spPr>
@@ -8274,9 +8147,9 @@
         </a:fontRef>
       </dsp:style>
     </dsp:sp>
-    <dsp:sp modelId="{BAB21EFA-E85A-4C12-AD6F-FFBC8D74172F}">
+    <dsp:sp>
       <dsp:nvSpPr>
-        <dsp:cNvPr id="0" name=""/>
+        <dsp:cNvPr id="15" name="椭圆 14"/>
         <dsp:cNvSpPr/>
       </dsp:nvSpPr>
       <dsp:spPr>
@@ -8338,9 +8211,9 @@
         </a:fontRef>
       </dsp:style>
     </dsp:sp>
-    <dsp:sp modelId="{6FBB6BA5-1B27-4F83-B953-55857E2664C1}">
+    <dsp:sp>
       <dsp:nvSpPr>
-        <dsp:cNvPr id="0" name=""/>
+        <dsp:cNvPr id="16" name="椭圆 15"/>
         <dsp:cNvSpPr/>
       </dsp:nvSpPr>
       <dsp:spPr>
@@ -8402,9 +8275,9 @@
         </a:fontRef>
       </dsp:style>
     </dsp:sp>
-    <dsp:sp modelId="{84DC4750-EE53-40E5-9757-E2CD63C3CA50}">
+    <dsp:sp>
       <dsp:nvSpPr>
-        <dsp:cNvPr id="0" name=""/>
+        <dsp:cNvPr id="17" name="椭圆 16"/>
         <dsp:cNvSpPr/>
       </dsp:nvSpPr>
       <dsp:spPr>
@@ -8466,9 +8339,9 @@
         </a:fontRef>
       </dsp:style>
     </dsp:sp>
-    <dsp:sp modelId="{D1E30AF7-7767-4361-AFD5-8C5372C4FFED}">
+    <dsp:sp>
       <dsp:nvSpPr>
-        <dsp:cNvPr id="0" name=""/>
+        <dsp:cNvPr id="18" name="椭圆 17"/>
         <dsp:cNvSpPr/>
       </dsp:nvSpPr>
       <dsp:spPr>
@@ -8530,9 +8403,9 @@
         </a:fontRef>
       </dsp:style>
     </dsp:sp>
-    <dsp:sp modelId="{2895621B-2570-47B0-8689-B2ABCEF5EC9B}">
+    <dsp:sp>
       <dsp:nvSpPr>
-        <dsp:cNvPr id="0" name=""/>
+        <dsp:cNvPr id="19" name="椭圆 18"/>
         <dsp:cNvSpPr/>
       </dsp:nvSpPr>
       <dsp:spPr>
@@ -8594,9 +8467,9 @@
         </a:fontRef>
       </dsp:style>
     </dsp:sp>
-    <dsp:sp modelId="{926193B1-4EDA-4B42-B710-2E17F8B7CB86}">
+    <dsp:sp>
       <dsp:nvSpPr>
-        <dsp:cNvPr id="0" name=""/>
+        <dsp:cNvPr id="20" name="椭圆 19"/>
         <dsp:cNvSpPr/>
       </dsp:nvSpPr>
       <dsp:spPr>
@@ -8658,9 +8531,9 @@
         </a:fontRef>
       </dsp:style>
     </dsp:sp>
-    <dsp:sp modelId="{3B1A8840-8537-4C95-9D33-B0A0776641C0}">
+    <dsp:sp>
       <dsp:nvSpPr>
-        <dsp:cNvPr id="0" name=""/>
+        <dsp:cNvPr id="21" name="燕尾形 20"/>
         <dsp:cNvSpPr/>
       </dsp:nvSpPr>
       <dsp:spPr>
@@ -8719,9 +8592,9 @@
         </a:fontRef>
       </dsp:style>
     </dsp:sp>
-    <dsp:sp modelId="{1A3F70FD-275E-4E5C-A460-AE604F66D6BB}">
+    <dsp:sp>
       <dsp:nvSpPr>
-        <dsp:cNvPr id="0" name=""/>
+        <dsp:cNvPr id="22" name="矩形 21"/>
         <dsp:cNvSpPr/>
       </dsp:nvSpPr>
       <dsp:spPr>
@@ -8769,14 +8642,14 @@
           </a:pPr>
           <a:r>
             <a:rPr lang="zh-CN" altLang="en-US" sz="2900" kern="1200" dirty="0" smtClean="0">
-              <a:latin typeface="Microsoft YaHei UI" panose="020B0503020204020204" pitchFamily="34" charset="-122"/>
-              <a:ea typeface="Microsoft YaHei UI" panose="020B0503020204020204" pitchFamily="34" charset="-122"/>
+              <a:latin typeface="Microsoft YaHei UI" pitchFamily="34" charset="-122"/>
+              <a:ea typeface="Microsoft YaHei UI" pitchFamily="34" charset="-122"/>
             </a:rPr>
             <a:t>需求分析</a:t>
           </a:r>
           <a:endParaRPr lang="zh-CN" sz="2900" kern="1200" dirty="0">
-            <a:latin typeface="Microsoft YaHei UI" panose="020B0503020204020204" pitchFamily="34" charset="-122"/>
-            <a:ea typeface="Microsoft YaHei UI" panose="020B0503020204020204" pitchFamily="34" charset="-122"/>
+            <a:latin typeface="Microsoft YaHei UI" pitchFamily="34" charset="-122"/>
+            <a:ea typeface="Microsoft YaHei UI" pitchFamily="34" charset="-122"/>
           </a:endParaRPr>
         </a:p>
       </dsp:txBody>
@@ -8785,9 +8658,9 @@
         <a:ext cx="1943278" cy="1360295"/>
       </dsp:txXfrm>
     </dsp:sp>
-    <dsp:sp modelId="{FB31292E-6F27-45E0-92E2-A34D97F89EC9}">
+    <dsp:sp>
       <dsp:nvSpPr>
-        <dsp:cNvPr id="0" name=""/>
+        <dsp:cNvPr id="23" name="矩形 22"/>
         <dsp:cNvSpPr/>
       </dsp:nvSpPr>
       <dsp:spPr>
@@ -8835,11 +8708,15 @@
           </a:pPr>
           <a:r>
             <a:rPr lang="zh-CN" sz="3600" kern="1200">
-              <a:latin typeface="Microsoft YaHei UI" panose="020B0503020204020204" pitchFamily="34" charset="-122"/>
-              <a:ea typeface="Microsoft YaHei UI" panose="020B0503020204020204" pitchFamily="34" charset="-122"/>
+              <a:latin typeface="Microsoft YaHei UI" pitchFamily="34" charset="-122"/>
+              <a:ea typeface="Microsoft YaHei UI" pitchFamily="34" charset="-122"/>
             </a:rPr>
             <a:t>任务说明</a:t>
           </a:r>
+          <a:endParaRPr lang="zh-CN" sz="3600" kern="1200">
+            <a:latin typeface="Microsoft YaHei UI" pitchFamily="34" charset="-122"/>
+            <a:ea typeface="Microsoft YaHei UI" pitchFamily="34" charset="-122"/>
+          </a:endParaRPr>
         </a:p>
       </dsp:txBody>
       <dsp:txXfrm>
@@ -8847,9 +8724,9 @@
         <a:ext cx="1943278" cy="1198355"/>
       </dsp:txXfrm>
     </dsp:sp>
-    <dsp:sp modelId="{73C978A2-A371-4B30-B564-60B4CA481519}">
+    <dsp:sp>
       <dsp:nvSpPr>
-        <dsp:cNvPr id="0" name=""/>
+        <dsp:cNvPr id="24" name="燕尾形 23"/>
         <dsp:cNvSpPr/>
       </dsp:nvSpPr>
       <dsp:spPr>
@@ -8908,9 +8785,9 @@
         </a:fontRef>
       </dsp:style>
     </dsp:sp>
-    <dsp:sp modelId="{43CBD4FA-CCDE-48FA-8455-CBD4DF6D2801}">
+    <dsp:sp>
       <dsp:nvSpPr>
-        <dsp:cNvPr id="0" name=""/>
+        <dsp:cNvPr id="25" name="矩形 24"/>
         <dsp:cNvSpPr/>
       </dsp:nvSpPr>
       <dsp:spPr>
@@ -8958,14 +8835,14 @@
           </a:pPr>
           <a:r>
             <a:rPr lang="zh-CN" altLang="en-US" sz="2900" kern="1200" dirty="0" smtClean="0">
-              <a:latin typeface="Microsoft YaHei UI" panose="020B0503020204020204" pitchFamily="34" charset="-122"/>
-              <a:ea typeface="Microsoft YaHei UI" panose="020B0503020204020204" pitchFamily="34" charset="-122"/>
+              <a:latin typeface="Microsoft YaHei UI" pitchFamily="34" charset="-122"/>
+              <a:ea typeface="Microsoft YaHei UI" pitchFamily="34" charset="-122"/>
             </a:rPr>
             <a:t>项目设计</a:t>
           </a:r>
           <a:endParaRPr lang="zh-CN" sz="2900" kern="1200" dirty="0">
-            <a:latin typeface="Microsoft YaHei UI" panose="020B0503020204020204" pitchFamily="34" charset="-122"/>
-            <a:ea typeface="Microsoft YaHei UI" panose="020B0503020204020204" pitchFamily="34" charset="-122"/>
+            <a:latin typeface="Microsoft YaHei UI" pitchFamily="34" charset="-122"/>
+            <a:ea typeface="Microsoft YaHei UI" pitchFamily="34" charset="-122"/>
           </a:endParaRPr>
         </a:p>
       </dsp:txBody>
@@ -8974,9 +8851,9 @@
         <a:ext cx="1943278" cy="1360295"/>
       </dsp:txXfrm>
     </dsp:sp>
-    <dsp:sp modelId="{42546970-C3AB-4C04-AFA4-FA17D8EAB40F}">
+    <dsp:sp>
       <dsp:nvSpPr>
-        <dsp:cNvPr id="0" name=""/>
+        <dsp:cNvPr id="26" name="矩形 25"/>
         <dsp:cNvSpPr/>
       </dsp:nvSpPr>
       <dsp:spPr>
@@ -9024,11 +8901,15 @@
           </a:pPr>
           <a:r>
             <a:rPr lang="zh-CN" sz="3600" kern="1200">
-              <a:latin typeface="Microsoft YaHei UI" panose="020B0503020204020204" pitchFamily="34" charset="-122"/>
-              <a:ea typeface="Microsoft YaHei UI" panose="020B0503020204020204" pitchFamily="34" charset="-122"/>
+              <a:latin typeface="Microsoft YaHei UI" pitchFamily="34" charset="-122"/>
+              <a:ea typeface="Microsoft YaHei UI" pitchFamily="34" charset="-122"/>
             </a:rPr>
             <a:t>任务说明</a:t>
           </a:r>
+          <a:endParaRPr lang="zh-CN" sz="3600" kern="1200">
+            <a:latin typeface="Microsoft YaHei UI" pitchFamily="34" charset="-122"/>
+            <a:ea typeface="Microsoft YaHei UI" pitchFamily="34" charset="-122"/>
+          </a:endParaRPr>
         </a:p>
       </dsp:txBody>
       <dsp:txXfrm>
@@ -9036,9 +8917,9 @@
         <a:ext cx="1943278" cy="1198355"/>
       </dsp:txXfrm>
     </dsp:sp>
-    <dsp:sp modelId="{AFB19B90-CD9D-46ED-9B5E-96A29D3E2873}">
+    <dsp:sp>
       <dsp:nvSpPr>
-        <dsp:cNvPr id="0" name=""/>
+        <dsp:cNvPr id="27" name="燕尾形 26"/>
         <dsp:cNvSpPr/>
       </dsp:nvSpPr>
       <dsp:spPr>
@@ -9097,9 +8978,9 @@
         </a:fontRef>
       </dsp:style>
     </dsp:sp>
-    <dsp:sp modelId="{2C81D19C-5783-4597-A013-78093E3FD4AA}">
+    <dsp:sp>
       <dsp:nvSpPr>
-        <dsp:cNvPr id="0" name=""/>
+        <dsp:cNvPr id="28" name="椭圆 27"/>
         <dsp:cNvSpPr/>
       </dsp:nvSpPr>
       <dsp:spPr>
@@ -9179,14 +9060,14 @@
           </a:pPr>
           <a:r>
             <a:rPr lang="zh-CN" altLang="en-US" sz="2900" kern="1200" dirty="0" smtClean="0">
-              <a:latin typeface="Microsoft YaHei UI" panose="020B0503020204020204" pitchFamily="34" charset="-122"/>
-              <a:ea typeface="Microsoft YaHei UI" panose="020B0503020204020204" pitchFamily="34" charset="-122"/>
+              <a:latin typeface="Microsoft YaHei UI" pitchFamily="34" charset="-122"/>
+              <a:ea typeface="Microsoft YaHei UI" pitchFamily="34" charset="-122"/>
             </a:rPr>
             <a:t>编码</a:t>
           </a:r>
           <a:endParaRPr lang="zh-CN" sz="2900" kern="1200" dirty="0">
-            <a:latin typeface="Microsoft YaHei UI" panose="020B0503020204020204" pitchFamily="34" charset="-122"/>
-            <a:ea typeface="Microsoft YaHei UI" panose="020B0503020204020204" pitchFamily="34" charset="-122"/>
+            <a:latin typeface="Microsoft YaHei UI" pitchFamily="34" charset="-122"/>
+            <a:ea typeface="Microsoft YaHei UI" pitchFamily="34" charset="-122"/>
           </a:endParaRPr>
         </a:p>
       </dsp:txBody>
@@ -9195,9 +9076,9 @@
         <a:ext cx="1167990" cy="1167990"/>
       </dsp:txXfrm>
     </dsp:sp>
-    <dsp:sp modelId="{68A8D6FA-10EB-41B7-9487-79077C0C09C4}">
+    <dsp:sp>
       <dsp:nvSpPr>
-        <dsp:cNvPr id="0" name=""/>
+        <dsp:cNvPr id="29" name="矩形 28"/>
         <dsp:cNvSpPr/>
       </dsp:nvSpPr>
       <dsp:spPr>
@@ -9245,11 +9126,15 @@
           </a:pPr>
           <a:r>
             <a:rPr lang="zh-CN" sz="3600" kern="1200">
-              <a:latin typeface="Microsoft YaHei UI" panose="020B0503020204020204" pitchFamily="34" charset="-122"/>
-              <a:ea typeface="Microsoft YaHei UI" panose="020B0503020204020204" pitchFamily="34" charset="-122"/>
+              <a:latin typeface="Microsoft YaHei UI" pitchFamily="34" charset="-122"/>
+              <a:ea typeface="Microsoft YaHei UI" pitchFamily="34" charset="-122"/>
             </a:rPr>
             <a:t>任务说明</a:t>
           </a:r>
+          <a:endParaRPr lang="zh-CN" sz="3600" kern="1200">
+            <a:latin typeface="Microsoft YaHei UI" pitchFamily="34" charset="-122"/>
+            <a:ea typeface="Microsoft YaHei UI" pitchFamily="34" charset="-122"/>
+          </a:endParaRPr>
         </a:p>
       </dsp:txBody>
       <dsp:txXfrm>
@@ -9262,16 +9147,23 @@
 </file>
 
 <file path=ppt/diagrams/drawing2.xml><?xml version="1.0" encoding="utf-8"?>
-<dsp:drawing xmlns:dgm="http://schemas.openxmlformats.org/drawingml/2006/diagram" xmlns:dsp="http://schemas.microsoft.com/office/drawing/2008/diagram" xmlns:a="http://schemas.openxmlformats.org/drawingml/2006/main">
+<dsp:drawing xmlns:dgm="http://schemas.openxmlformats.org/drawingml/2006/diagram" xmlns:dsp="http://schemas.microsoft.com/office/drawing/2008/diagram" xmlns:a="http://schemas.openxmlformats.org/drawingml/2006/main" xmlns:r="http://schemas.openxmlformats.org/officeDocument/2006/relationships">
   <dsp:spTree>
     <dsp:nvGrpSpPr>
       <dsp:cNvPr id="0" name=""/>
       <dsp:cNvGrpSpPr/>
     </dsp:nvGrpSpPr>
-    <dsp:grpSpPr/>
-    <dsp:sp modelId="{EEA4795B-68FF-49EA-BCED-5D1412A26292}">
+    <dsp:grpSpPr>
+      <a:xfrm>
+        <a:off x="0" y="0"/>
+        <a:ext cx="10131552" cy="4114800"/>
+        <a:chOff x="0" y="0"/>
+        <a:chExt cx="0" cy="0"/>
+      </a:xfrm>
+    </dsp:grpSpPr>
+    <dsp:sp>
       <dsp:nvSpPr>
-        <dsp:cNvPr id="0" name=""/>
+        <dsp:cNvPr id="1" name="圆角矩形 0"/>
         <dsp:cNvSpPr/>
       </dsp:nvSpPr>
       <dsp:spPr>
@@ -9353,14 +9245,14 @@
           </a:pPr>
           <a:r>
             <a:rPr lang="en-US" altLang="zh-CN" sz="5000" kern="1200" dirty="0" smtClean="0">
-              <a:latin typeface="Microsoft YaHei UI" panose="020B0503020204020204" pitchFamily="34" charset="-122"/>
-              <a:ea typeface="Microsoft YaHei UI" panose="020B0503020204020204" pitchFamily="34" charset="-122"/>
+              <a:latin typeface="Microsoft YaHei UI" pitchFamily="34" charset="-122"/>
+              <a:ea typeface="Microsoft YaHei UI" pitchFamily="34" charset="-122"/>
             </a:rPr>
             <a:t>User</a:t>
           </a:r>
           <a:endParaRPr lang="zh-CN" sz="5000" kern="1200" dirty="0">
-            <a:latin typeface="Microsoft YaHei UI" panose="020B0503020204020204" pitchFamily="34" charset="-122"/>
-            <a:ea typeface="Microsoft YaHei UI" panose="020B0503020204020204" pitchFamily="34" charset="-122"/>
+            <a:latin typeface="Microsoft YaHei UI" pitchFamily="34" charset="-122"/>
+            <a:ea typeface="Microsoft YaHei UI" pitchFamily="34" charset="-122"/>
           </a:endParaRPr>
         </a:p>
       </dsp:txBody>
@@ -9369,9 +9261,9 @@
         <a:ext cx="2281023" cy="1106099"/>
       </dsp:txXfrm>
     </dsp:sp>
-    <dsp:sp modelId="{3C188B19-A77B-44CF-B678-8A70AEC38B1D}">
+    <dsp:sp>
       <dsp:nvSpPr>
-        <dsp:cNvPr id="0" name=""/>
+        <dsp:cNvPr id="2" name="任意多边形 1"/>
         <dsp:cNvSpPr/>
       </dsp:nvSpPr>
       <dsp:spPr>
@@ -9427,9 +9319,9 @@
         <a:fontRef idx="minor"/>
       </dsp:style>
     </dsp:sp>
-    <dsp:sp modelId="{946B726D-8ECD-4AA5-A32C-F8DDEA344C30}">
+    <dsp:sp>
       <dsp:nvSpPr>
-        <dsp:cNvPr id="0" name=""/>
+        <dsp:cNvPr id="3" name="圆角矩形 2"/>
         <dsp:cNvSpPr/>
       </dsp:nvSpPr>
       <dsp:spPr>
@@ -9495,14 +9387,14 @@
           </a:pPr>
           <a:r>
             <a:rPr lang="en-US" altLang="zh-CN" sz="3700" kern="1200" dirty="0" smtClean="0">
-              <a:latin typeface="Microsoft YaHei UI" panose="020B0503020204020204" pitchFamily="34" charset="-122"/>
-              <a:ea typeface="Microsoft YaHei UI" panose="020B0503020204020204" pitchFamily="34" charset="-122"/>
+              <a:latin typeface="Microsoft YaHei UI" pitchFamily="34" charset="-122"/>
+              <a:ea typeface="Microsoft YaHei UI" pitchFamily="34" charset="-122"/>
             </a:rPr>
             <a:t>search</a:t>
           </a:r>
           <a:endParaRPr lang="zh-CN" sz="3700" kern="1200" dirty="0">
-            <a:latin typeface="Microsoft YaHei UI" panose="020B0503020204020204" pitchFamily="34" charset="-122"/>
-            <a:ea typeface="Microsoft YaHei UI" panose="020B0503020204020204" pitchFamily="34" charset="-122"/>
+            <a:latin typeface="Microsoft YaHei UI" pitchFamily="34" charset="-122"/>
+            <a:ea typeface="Microsoft YaHei UI" pitchFamily="34" charset="-122"/>
           </a:endParaRPr>
         </a:p>
       </dsp:txBody>
@@ -9511,9 +9403,9 @@
         <a:ext cx="1811053" cy="1106099"/>
       </dsp:txXfrm>
     </dsp:sp>
-    <dsp:sp modelId="{29EADAFA-A450-43D7-B01E-E9E5E8FE7373}">
+    <dsp:sp>
       <dsp:nvSpPr>
-        <dsp:cNvPr id="0" name=""/>
+        <dsp:cNvPr id="4" name="任意多边形 3"/>
         <dsp:cNvSpPr/>
       </dsp:nvSpPr>
       <dsp:spPr>
@@ -9569,9 +9461,9 @@
         <a:fontRef idx="minor"/>
       </dsp:style>
     </dsp:sp>
-    <dsp:sp modelId="{DB910009-D45F-4D57-B10A-934EC3E5E24F}">
+    <dsp:sp>
       <dsp:nvSpPr>
-        <dsp:cNvPr id="0" name=""/>
+        <dsp:cNvPr id="5" name="圆角矩形 4"/>
         <dsp:cNvSpPr/>
       </dsp:nvSpPr>
       <dsp:spPr>
@@ -9637,14 +9529,14 @@
           </a:pPr>
           <a:r>
             <a:rPr lang="en-US" altLang="zh-CN" sz="3700" kern="1200" dirty="0" smtClean="0">
-              <a:latin typeface="Microsoft YaHei UI" panose="020B0503020204020204" pitchFamily="34" charset="-122"/>
-              <a:ea typeface="Microsoft YaHei UI" panose="020B0503020204020204" pitchFamily="34" charset="-122"/>
+              <a:latin typeface="Microsoft YaHei UI" pitchFamily="34" charset="-122"/>
+              <a:ea typeface="Microsoft YaHei UI" pitchFamily="34" charset="-122"/>
             </a:rPr>
             <a:t>browse</a:t>
           </a:r>
           <a:endParaRPr lang="zh-CN" sz="3700" kern="1200" dirty="0">
-            <a:latin typeface="Microsoft YaHei UI" panose="020B0503020204020204" pitchFamily="34" charset="-122"/>
-            <a:ea typeface="Microsoft YaHei UI" panose="020B0503020204020204" pitchFamily="34" charset="-122"/>
+            <a:latin typeface="Microsoft YaHei UI" pitchFamily="34" charset="-122"/>
+            <a:ea typeface="Microsoft YaHei UI" pitchFamily="34" charset="-122"/>
           </a:endParaRPr>
         </a:p>
       </dsp:txBody>
@@ -9653,9 +9545,9 @@
         <a:ext cx="1811053" cy="1106099"/>
       </dsp:txXfrm>
     </dsp:sp>
-    <dsp:sp modelId="{85CF7BFC-8460-4C1E-9911-E5A9544357DB}">
+    <dsp:sp>
       <dsp:nvSpPr>
-        <dsp:cNvPr id="0" name=""/>
+        <dsp:cNvPr id="6" name="圆角矩形 5"/>
         <dsp:cNvSpPr/>
       </dsp:nvSpPr>
       <dsp:spPr>
@@ -9737,14 +9629,14 @@
           </a:pPr>
           <a:r>
             <a:rPr lang="en-US" altLang="zh-CN" sz="5000" kern="1200" dirty="0" smtClean="0">
-              <a:latin typeface="Microsoft YaHei UI" panose="020B0503020204020204" pitchFamily="34" charset="-122"/>
-              <a:ea typeface="Microsoft YaHei UI" panose="020B0503020204020204" pitchFamily="34" charset="-122"/>
+              <a:latin typeface="Microsoft YaHei UI" pitchFamily="34" charset="-122"/>
+              <a:ea typeface="Microsoft YaHei UI" pitchFamily="34" charset="-122"/>
             </a:rPr>
             <a:t>Repo</a:t>
           </a:r>
           <a:endParaRPr lang="zh-CN" sz="5000" kern="1200" dirty="0">
-            <a:latin typeface="Microsoft YaHei UI" panose="020B0503020204020204" pitchFamily="34" charset="-122"/>
-            <a:ea typeface="Microsoft YaHei UI" panose="020B0503020204020204" pitchFamily="34" charset="-122"/>
+            <a:latin typeface="Microsoft YaHei UI" pitchFamily="34" charset="-122"/>
+            <a:ea typeface="Microsoft YaHei UI" pitchFamily="34" charset="-122"/>
           </a:endParaRPr>
         </a:p>
       </dsp:txBody>
@@ -9753,9 +9645,9 @@
         <a:ext cx="2281023" cy="1106099"/>
       </dsp:txXfrm>
     </dsp:sp>
-    <dsp:sp modelId="{50E8D4B1-746A-4046-A8DB-25F9F3B04F5A}">
+    <dsp:sp>
       <dsp:nvSpPr>
-        <dsp:cNvPr id="0" name=""/>
+        <dsp:cNvPr id="7" name="任意多边形 6"/>
         <dsp:cNvSpPr/>
       </dsp:nvSpPr>
       <dsp:spPr>
@@ -9811,9 +9703,9 @@
         <a:fontRef idx="minor"/>
       </dsp:style>
     </dsp:sp>
-    <dsp:sp modelId="{C1EC1154-0E49-4B37-B380-D6FF7D72E727}">
+    <dsp:sp>
       <dsp:nvSpPr>
-        <dsp:cNvPr id="0" name=""/>
+        <dsp:cNvPr id="8" name="圆角矩形 7"/>
         <dsp:cNvSpPr/>
       </dsp:nvSpPr>
       <dsp:spPr>
@@ -9879,14 +9771,14 @@
           </a:pPr>
           <a:r>
             <a:rPr lang="en-US" altLang="zh-CN" sz="3700" kern="1200" dirty="0" smtClean="0">
-              <a:latin typeface="Microsoft YaHei UI" panose="020B0503020204020204" pitchFamily="34" charset="-122"/>
-              <a:ea typeface="Microsoft YaHei UI" panose="020B0503020204020204" pitchFamily="34" charset="-122"/>
+              <a:latin typeface="Microsoft YaHei UI" pitchFamily="34" charset="-122"/>
+              <a:ea typeface="Microsoft YaHei UI" pitchFamily="34" charset="-122"/>
             </a:rPr>
             <a:t>search</a:t>
           </a:r>
           <a:endParaRPr lang="zh-CN" sz="3700" kern="1200" dirty="0">
-            <a:latin typeface="Microsoft YaHei UI" panose="020B0503020204020204" pitchFamily="34" charset="-122"/>
-            <a:ea typeface="Microsoft YaHei UI" panose="020B0503020204020204" pitchFamily="34" charset="-122"/>
+            <a:latin typeface="Microsoft YaHei UI" pitchFamily="34" charset="-122"/>
+            <a:ea typeface="Microsoft YaHei UI" pitchFamily="34" charset="-122"/>
           </a:endParaRPr>
         </a:p>
       </dsp:txBody>
@@ -9895,9 +9787,9 @@
         <a:ext cx="1811053" cy="1106099"/>
       </dsp:txXfrm>
     </dsp:sp>
-    <dsp:sp modelId="{EA8D7378-E222-4C55-A033-43249730ED27}">
+    <dsp:sp>
       <dsp:nvSpPr>
-        <dsp:cNvPr id="0" name=""/>
+        <dsp:cNvPr id="9" name="任意多边形 8"/>
         <dsp:cNvSpPr/>
       </dsp:nvSpPr>
       <dsp:spPr>
@@ -9953,9 +9845,9 @@
         <a:fontRef idx="minor"/>
       </dsp:style>
     </dsp:sp>
-    <dsp:sp modelId="{6D8E477D-924C-473C-91AC-6D2B9553E33C}">
+    <dsp:sp>
       <dsp:nvSpPr>
-        <dsp:cNvPr id="0" name=""/>
+        <dsp:cNvPr id="10" name="圆角矩形 9"/>
         <dsp:cNvSpPr/>
       </dsp:nvSpPr>
       <dsp:spPr>
@@ -10021,14 +9913,14 @@
           </a:pPr>
           <a:r>
             <a:rPr lang="en-US" altLang="zh-CN" sz="3700" kern="1200" dirty="0" smtClean="0">
-              <a:latin typeface="Microsoft YaHei UI" panose="020B0503020204020204" pitchFamily="34" charset="-122"/>
-              <a:ea typeface="Microsoft YaHei UI" panose="020B0503020204020204" pitchFamily="34" charset="-122"/>
+              <a:latin typeface="Microsoft YaHei UI" pitchFamily="34" charset="-122"/>
+              <a:ea typeface="Microsoft YaHei UI" pitchFamily="34" charset="-122"/>
             </a:rPr>
             <a:t>browse</a:t>
           </a:r>
           <a:endParaRPr lang="zh-CN" sz="3700" kern="1200" dirty="0">
-            <a:latin typeface="Microsoft YaHei UI" panose="020B0503020204020204" pitchFamily="34" charset="-122"/>
-            <a:ea typeface="Microsoft YaHei UI" panose="020B0503020204020204" pitchFamily="34" charset="-122"/>
+            <a:latin typeface="Microsoft YaHei UI" pitchFamily="34" charset="-122"/>
+            <a:ea typeface="Microsoft YaHei UI" pitchFamily="34" charset="-122"/>
           </a:endParaRPr>
         </a:p>
       </dsp:txBody>
@@ -10042,16 +9934,23 @@
 </file>
 
 <file path=ppt/diagrams/drawing3.xml><?xml version="1.0" encoding="utf-8"?>
-<dsp:drawing xmlns:dgm="http://schemas.openxmlformats.org/drawingml/2006/diagram" xmlns:dsp="http://schemas.microsoft.com/office/drawing/2008/diagram" xmlns:a="http://schemas.openxmlformats.org/drawingml/2006/main">
+<dsp:drawing xmlns:dgm="http://schemas.openxmlformats.org/drawingml/2006/diagram" xmlns:dsp="http://schemas.microsoft.com/office/drawing/2008/diagram" xmlns:a="http://schemas.openxmlformats.org/drawingml/2006/main" xmlns:r="http://schemas.openxmlformats.org/officeDocument/2006/relationships">
   <dsp:spTree>
     <dsp:nvGrpSpPr>
       <dsp:cNvPr id="0" name=""/>
       <dsp:cNvGrpSpPr/>
     </dsp:nvGrpSpPr>
-    <dsp:grpSpPr/>
-    <dsp:sp modelId="{001E576D-89BD-4763-9AC5-31DE0BF1A2B0}">
+    <dsp:grpSpPr>
+      <a:xfrm>
+        <a:off x="0" y="0"/>
+        <a:ext cx="8968635" cy="5273457"/>
+        <a:chOff x="0" y="0"/>
+        <a:chExt cx="0" cy="0"/>
+      </a:xfrm>
+    </dsp:grpSpPr>
+    <dsp:sp>
       <dsp:nvSpPr>
-        <dsp:cNvPr id="0" name=""/>
+        <dsp:cNvPr id="1" name="同侧圆角矩形 0"/>
         <dsp:cNvSpPr/>
       </dsp:nvSpPr>
       <dsp:spPr>
@@ -10115,7 +10014,7 @@
             <a:spcAft>
               <a:spcPct val="15000"/>
             </a:spcAft>
-            <a:buChar char="••"/>
+            <a:buChar char="•"/>
           </a:pPr>
           <a:r>
             <a:rPr lang="zh-CN" altLang="en-US" sz="2300" kern="1200" dirty="0" smtClean="0"/>
@@ -10145,9 +10044,9 @@
         <a:ext cx="5673558" cy="1226827"/>
       </dsp:txXfrm>
     </dsp:sp>
-    <dsp:sp modelId="{F3D316E4-43BE-49A9-ACEA-CBE477344977}">
+    <dsp:sp>
       <dsp:nvSpPr>
-        <dsp:cNvPr id="0" name=""/>
+        <dsp:cNvPr id="2" name="圆角矩形 1"/>
         <dsp:cNvSpPr/>
       </dsp:nvSpPr>
       <dsp:spPr>
@@ -10222,9 +10121,9 @@
         <a:ext cx="3062788" cy="1533533"/>
       </dsp:txXfrm>
     </dsp:sp>
-    <dsp:sp modelId="{399F7127-3C1C-4E31-823E-71ADC3A6F5C0}">
+    <dsp:sp>
       <dsp:nvSpPr>
-        <dsp:cNvPr id="0" name=""/>
+        <dsp:cNvPr id="3" name="同侧圆角矩形 2"/>
         <dsp:cNvSpPr/>
       </dsp:nvSpPr>
       <dsp:spPr>
@@ -10288,7 +10187,7 @@
             <a:spcAft>
               <a:spcPct val="15000"/>
             </a:spcAft>
-            <a:buChar char="••"/>
+            <a:buChar char="•"/>
           </a:pPr>
           <a:r>
             <a:rPr lang="en-US" altLang="zh-CN" sz="2300" kern="1200" dirty="0" smtClean="0"/>
@@ -10311,7 +10210,7 @@
             <a:spcAft>
               <a:spcPct val="15000"/>
             </a:spcAft>
-            <a:buChar char="••"/>
+            <a:buChar char="•"/>
           </a:pPr>
           <a:r>
             <a:rPr lang="en-US" altLang="zh-CN" sz="2300" kern="1200" dirty="0" smtClean="0"/>
@@ -10334,7 +10233,7 @@
             <a:spcAft>
               <a:spcPct val="15000"/>
             </a:spcAft>
-            <a:buChar char="••"/>
+            <a:buChar char="•"/>
           </a:pPr>
           <a:endParaRPr lang="zh-CN" altLang="en-US" sz="2300" kern="1200" dirty="0"/>
         </a:p>
@@ -10344,9 +10243,9 @@
         <a:ext cx="5673558" cy="1226827"/>
       </dsp:txXfrm>
     </dsp:sp>
-    <dsp:sp modelId="{A962D324-CBAD-449F-A474-863543A6CA86}">
+    <dsp:sp>
       <dsp:nvSpPr>
-        <dsp:cNvPr id="0" name=""/>
+        <dsp:cNvPr id="4" name="圆角矩形 3"/>
         <dsp:cNvSpPr/>
       </dsp:nvSpPr>
       <dsp:spPr>
@@ -10421,9 +10320,9 @@
         <a:ext cx="3062788" cy="1533533"/>
       </dsp:txXfrm>
     </dsp:sp>
-    <dsp:sp modelId="{9268D53B-2568-42FC-AB01-1D13BD7AB530}">
+    <dsp:sp>
       <dsp:nvSpPr>
-        <dsp:cNvPr id="0" name=""/>
+        <dsp:cNvPr id="5" name="同侧圆角矩形 4"/>
         <dsp:cNvSpPr/>
       </dsp:nvSpPr>
       <dsp:spPr>
@@ -10487,7 +10386,7 @@
             <a:spcAft>
               <a:spcPct val="15000"/>
             </a:spcAft>
-            <a:buChar char="••"/>
+            <a:buChar char="•"/>
           </a:pPr>
           <a:r>
             <a:rPr lang="en-US" altLang="zh-CN" sz="2300" kern="1200" dirty="0" smtClean="0"/>
@@ -10510,7 +10409,7 @@
             <a:spcAft>
               <a:spcPct val="15000"/>
             </a:spcAft>
-            <a:buChar char="••"/>
+            <a:buChar char="•"/>
           </a:pPr>
           <a:r>
             <a:rPr lang="zh-CN" altLang="en-US" sz="2300" kern="1200" dirty="0" smtClean="0"/>
@@ -10524,9 +10423,9 @@
         <a:ext cx="5673558" cy="1226827"/>
       </dsp:txXfrm>
     </dsp:sp>
-    <dsp:sp modelId="{3D578473-AF45-4D0F-9D9A-A1B12A5CEC77}">
+    <dsp:sp>
       <dsp:nvSpPr>
-        <dsp:cNvPr id="0" name=""/>
+        <dsp:cNvPr id="6" name="圆角矩形 5"/>
         <dsp:cNvSpPr/>
       </dsp:nvSpPr>
       <dsp:spPr>
@@ -10606,16 +10505,23 @@
 </file>
 
 <file path=ppt/diagrams/drawing4.xml><?xml version="1.0" encoding="utf-8"?>
-<dsp:drawing xmlns:dgm="http://schemas.openxmlformats.org/drawingml/2006/diagram" xmlns:dsp="http://schemas.microsoft.com/office/drawing/2008/diagram" xmlns:a="http://schemas.openxmlformats.org/drawingml/2006/main">
+<dsp:drawing xmlns:dgm="http://schemas.openxmlformats.org/drawingml/2006/diagram" xmlns:dsp="http://schemas.microsoft.com/office/drawing/2008/diagram" xmlns:a="http://schemas.openxmlformats.org/drawingml/2006/main" xmlns:r="http://schemas.openxmlformats.org/officeDocument/2006/relationships">
   <dsp:spTree>
     <dsp:nvGrpSpPr>
       <dsp:cNvPr id="0" name=""/>
       <dsp:cNvGrpSpPr/>
     </dsp:nvGrpSpPr>
-    <dsp:grpSpPr/>
-    <dsp:sp modelId="{7E201614-3B3B-4AD4-B787-DE920A9F4080}">
+    <dsp:grpSpPr>
+      <a:xfrm>
+        <a:off x="0" y="0"/>
+        <a:ext cx="11057699" cy="4710366"/>
+        <a:chOff x="0" y="0"/>
+        <a:chExt cx="0" cy="0"/>
+      </a:xfrm>
+    </dsp:grpSpPr>
+    <dsp:sp>
       <dsp:nvSpPr>
-        <dsp:cNvPr id="0" name=""/>
+        <dsp:cNvPr id="1" name="饼形 0"/>
         <dsp:cNvSpPr/>
       </dsp:nvSpPr>
       <dsp:spPr>
@@ -10665,9 +10571,9 @@
         </a:fontRef>
       </dsp:style>
     </dsp:sp>
-    <dsp:sp modelId="{8F274263-1CE7-4EC0-9F0C-8D05A7046E40}">
+    <dsp:sp>
       <dsp:nvSpPr>
-        <dsp:cNvPr id="0" name=""/>
+        <dsp:cNvPr id="2" name="矩形 1"/>
         <dsp:cNvSpPr/>
       </dsp:nvSpPr>
       <dsp:spPr>
@@ -10741,9 +10647,9 @@
         <a:ext cx="4351258" cy="1413112"/>
       </dsp:txXfrm>
     </dsp:sp>
-    <dsp:sp modelId="{14A4C7EB-374A-4AFD-A1C9-A60E2498A86C}">
+    <dsp:sp>
       <dsp:nvSpPr>
-        <dsp:cNvPr id="0" name=""/>
+        <dsp:cNvPr id="3" name="饼形 2"/>
         <dsp:cNvSpPr/>
       </dsp:nvSpPr>
       <dsp:spPr>
@@ -10793,9 +10699,9 @@
         </a:fontRef>
       </dsp:style>
     </dsp:sp>
-    <dsp:sp modelId="{779B205E-6874-4646-960C-F4B856B5ABE8}">
+    <dsp:sp>
       <dsp:nvSpPr>
-        <dsp:cNvPr id="0" name=""/>
+        <dsp:cNvPr id="4" name="矩形 3"/>
         <dsp:cNvSpPr/>
       </dsp:nvSpPr>
       <dsp:spPr>
@@ -10869,9 +10775,9 @@
         <a:ext cx="4351258" cy="1413108"/>
       </dsp:txXfrm>
     </dsp:sp>
-    <dsp:sp modelId="{E51B650D-ED35-4F8B-9962-409F17C2FE3F}">
+    <dsp:sp>
       <dsp:nvSpPr>
-        <dsp:cNvPr id="0" name=""/>
+        <dsp:cNvPr id="5" name="饼形 4"/>
         <dsp:cNvSpPr/>
       </dsp:nvSpPr>
       <dsp:spPr>
@@ -10921,9 +10827,9 @@
         </a:fontRef>
       </dsp:style>
     </dsp:sp>
-    <dsp:sp modelId="{70D09977-887B-4AE9-87DC-B5E1DC2C8618}">
+    <dsp:sp>
       <dsp:nvSpPr>
-        <dsp:cNvPr id="0" name=""/>
+        <dsp:cNvPr id="6" name="矩形 5"/>
         <dsp:cNvSpPr/>
       </dsp:nvSpPr>
       <dsp:spPr>
@@ -10997,9 +10903,9 @@
         <a:ext cx="4351258" cy="1413108"/>
       </dsp:txXfrm>
     </dsp:sp>
-    <dsp:sp modelId="{4DD91175-4CCB-4B91-93E1-FC6B107E8398}">
+    <dsp:sp>
       <dsp:nvSpPr>
-        <dsp:cNvPr id="0" name=""/>
+        <dsp:cNvPr id="7" name="矩形 6"/>
         <dsp:cNvSpPr/>
       </dsp:nvSpPr>
       <dsp:spPr>
@@ -11046,7 +10952,7 @@
             <a:spcAft>
               <a:spcPct val="15000"/>
             </a:spcAft>
-            <a:buChar char="••"/>
+            <a:buChar char="•"/>
           </a:pPr>
           <a:r>
             <a:rPr lang="zh-CN" altLang="en-US" sz="2500" kern="1200" dirty="0" smtClean="0"/>
@@ -11060,9 +10966,9 @@
         <a:ext cx="4351258" cy="1413112"/>
       </dsp:txXfrm>
     </dsp:sp>
-    <dsp:sp modelId="{B1EB3481-3F28-430E-A396-EF1C1AEDEB9F}">
+    <dsp:sp>
       <dsp:nvSpPr>
-        <dsp:cNvPr id="0" name=""/>
+        <dsp:cNvPr id="8" name="矩形 7"/>
         <dsp:cNvSpPr/>
       </dsp:nvSpPr>
       <dsp:spPr>
@@ -11109,7 +11015,7 @@
             <a:spcAft>
               <a:spcPct val="15000"/>
             </a:spcAft>
-            <a:buChar char="••"/>
+            <a:buChar char="•"/>
           </a:pPr>
           <a:r>
             <a:rPr lang="zh-CN" altLang="en-US" sz="2500" kern="1200" dirty="0" smtClean="0"/>
@@ -11128,7 +11034,7 @@
             <a:spcAft>
               <a:spcPct val="15000"/>
             </a:spcAft>
-            <a:buChar char="••"/>
+            <a:buChar char="•"/>
           </a:pPr>
           <a:r>
             <a:rPr lang="zh-CN" altLang="en-US" sz="2500" kern="1200" dirty="0" smtClean="0"/>
@@ -11142,9 +11048,9 @@
         <a:ext cx="4351258" cy="1413108"/>
       </dsp:txXfrm>
     </dsp:sp>
-    <dsp:sp modelId="{8507B361-43A4-4B00-8266-3A5DD9BAAA8A}">
+    <dsp:sp>
       <dsp:nvSpPr>
-        <dsp:cNvPr id="0" name=""/>
+        <dsp:cNvPr id="9" name="矩形 8"/>
         <dsp:cNvSpPr/>
       </dsp:nvSpPr>
       <dsp:spPr>
@@ -11191,7 +11097,7 @@
             <a:spcAft>
               <a:spcPct val="15000"/>
             </a:spcAft>
-            <a:buChar char="••"/>
+            <a:buChar char="•"/>
           </a:pPr>
           <a:r>
             <a:rPr lang="zh-CN" altLang="en-US" sz="2500" kern="1200" dirty="0" smtClean="0"/>
@@ -11218,16 +11124,23 @@
 </file>
 
 <file path=ppt/diagrams/drawing5.xml><?xml version="1.0" encoding="utf-8"?>
-<dsp:drawing xmlns:dgm="http://schemas.openxmlformats.org/drawingml/2006/diagram" xmlns:dsp="http://schemas.microsoft.com/office/drawing/2008/diagram" xmlns:a="http://schemas.openxmlformats.org/drawingml/2006/main">
+<dsp:drawing xmlns:dgm="http://schemas.openxmlformats.org/drawingml/2006/diagram" xmlns:dsp="http://schemas.microsoft.com/office/drawing/2008/diagram" xmlns:a="http://schemas.openxmlformats.org/drawingml/2006/main" xmlns:r="http://schemas.openxmlformats.org/officeDocument/2006/relationships">
   <dsp:spTree>
     <dsp:nvGrpSpPr>
       <dsp:cNvPr id="0" name=""/>
       <dsp:cNvGrpSpPr/>
     </dsp:nvGrpSpPr>
-    <dsp:grpSpPr/>
-    <dsp:sp modelId="{2F5E6A9B-7A21-4785-BAF1-F9F1CFC684BB}">
+    <dsp:grpSpPr>
+      <a:xfrm>
+        <a:off x="0" y="0"/>
+        <a:ext cx="5408460" cy="2706201"/>
+        <a:chOff x="0" y="0"/>
+        <a:chExt cx="0" cy="0"/>
+      </a:xfrm>
+    </dsp:grpSpPr>
+    <dsp:sp>
       <dsp:nvSpPr>
-        <dsp:cNvPr id="0" name=""/>
+        <dsp:cNvPr id="1" name="圆角矩形 0"/>
         <dsp:cNvSpPr/>
       </dsp:nvSpPr>
       <dsp:spPr>
@@ -11302,9 +11215,9 @@
         <a:ext cx="5345634" cy="580674"/>
       </dsp:txXfrm>
     </dsp:sp>
-    <dsp:sp modelId="{98BA2F7B-50FF-4082-A415-82158AD29035}">
+    <dsp:sp>
       <dsp:nvSpPr>
-        <dsp:cNvPr id="0" name=""/>
+        <dsp:cNvPr id="2" name="矩形 1"/>
         <dsp:cNvSpPr/>
       </dsp:nvSpPr>
       <dsp:spPr>
@@ -11349,7 +11262,7 @@
             <a:spcAft>
               <a:spcPct val="20000"/>
             </a:spcAft>
-            <a:buChar char="••"/>
+            <a:buChar char="•"/>
           </a:pPr>
           <a:r>
             <a:rPr lang="zh-CN" altLang="en-US" sz="2000" kern="1200" dirty="0" smtClean="0"/>
@@ -11363,9 +11276,9 @@
         <a:ext cx="5408460" cy="672750"/>
       </dsp:txXfrm>
     </dsp:sp>
-    <dsp:sp modelId="{A2C68BA3-B3EA-4021-8E3E-D52398495AFC}">
+    <dsp:sp>
       <dsp:nvSpPr>
-        <dsp:cNvPr id="0" name=""/>
+        <dsp:cNvPr id="3" name="圆角矩形 2"/>
         <dsp:cNvSpPr/>
       </dsp:nvSpPr>
       <dsp:spPr>
@@ -11440,9 +11353,9 @@
         <a:ext cx="5345634" cy="580674"/>
       </dsp:txXfrm>
     </dsp:sp>
-    <dsp:sp modelId="{BBA439B9-2D33-42AF-95A4-B87D4EA42CAB}">
+    <dsp:sp>
       <dsp:nvSpPr>
-        <dsp:cNvPr id="0" name=""/>
+        <dsp:cNvPr id="4" name="矩形 3"/>
         <dsp:cNvSpPr/>
       </dsp:nvSpPr>
       <dsp:spPr>
@@ -11487,7 +11400,7 @@
             <a:spcAft>
               <a:spcPct val="20000"/>
             </a:spcAft>
-            <a:buChar char="••"/>
+            <a:buChar char="•"/>
           </a:pPr>
           <a:r>
             <a:rPr lang="zh-CN" altLang="en-US" sz="2000" kern="1200" dirty="0" smtClean="0"/>
@@ -11506,16 +11419,23 @@
 </file>
 
 <file path=ppt/diagrams/drawing6.xml><?xml version="1.0" encoding="utf-8"?>
-<dsp:drawing xmlns:dgm="http://schemas.openxmlformats.org/drawingml/2006/diagram" xmlns:dsp="http://schemas.microsoft.com/office/drawing/2008/diagram" xmlns:a="http://schemas.openxmlformats.org/drawingml/2006/main">
+<dsp:drawing xmlns:dgm="http://schemas.openxmlformats.org/drawingml/2006/diagram" xmlns:dsp="http://schemas.microsoft.com/office/drawing/2008/diagram" xmlns:a="http://schemas.openxmlformats.org/drawingml/2006/main" xmlns:r="http://schemas.openxmlformats.org/officeDocument/2006/relationships">
   <dsp:spTree>
     <dsp:nvGrpSpPr>
       <dsp:cNvPr id="0" name=""/>
       <dsp:cNvGrpSpPr/>
     </dsp:nvGrpSpPr>
-    <dsp:grpSpPr/>
-    <dsp:sp modelId="{2F5E6A9B-7A21-4785-BAF1-F9F1CFC684BB}">
+    <dsp:grpSpPr>
+      <a:xfrm>
+        <a:off x="0" y="0"/>
+        <a:ext cx="5408460" cy="2706201"/>
+        <a:chOff x="0" y="0"/>
+        <a:chExt cx="0" cy="0"/>
+      </a:xfrm>
+    </dsp:grpSpPr>
+    <dsp:sp>
       <dsp:nvSpPr>
-        <dsp:cNvPr id="0" name=""/>
+        <dsp:cNvPr id="1" name="圆角矩形 0"/>
         <dsp:cNvSpPr/>
       </dsp:nvSpPr>
       <dsp:spPr>
@@ -11590,9 +11510,9 @@
         <a:ext cx="5330556" cy="720036"/>
       </dsp:txXfrm>
     </dsp:sp>
-    <dsp:sp modelId="{98BA2F7B-50FF-4082-A415-82158AD29035}">
+    <dsp:sp>
       <dsp:nvSpPr>
-        <dsp:cNvPr id="0" name=""/>
+        <dsp:cNvPr id="2" name="矩形 1"/>
         <dsp:cNvSpPr/>
       </dsp:nvSpPr>
       <dsp:spPr>
@@ -11637,7 +11557,7 @@
             <a:spcAft>
               <a:spcPct val="20000"/>
             </a:spcAft>
-            <a:buChar char="••"/>
+            <a:buChar char="•"/>
           </a:pPr>
           <a:r>
             <a:rPr lang="zh-CN" altLang="en-US" sz="2400" kern="1200" dirty="0" smtClean="0"/>
@@ -11651,9 +11571,9 @@
         <a:ext cx="5408460" cy="513360"/>
       </dsp:txXfrm>
     </dsp:sp>
-    <dsp:sp modelId="{A2C68BA3-B3EA-4021-8E3E-D52398495AFC}">
+    <dsp:sp>
       <dsp:nvSpPr>
-        <dsp:cNvPr id="0" name=""/>
+        <dsp:cNvPr id="3" name="圆角矩形 2"/>
         <dsp:cNvSpPr/>
       </dsp:nvSpPr>
       <dsp:spPr>
@@ -11732,9 +11652,9 @@
         <a:ext cx="5330556" cy="720036"/>
       </dsp:txXfrm>
     </dsp:sp>
-    <dsp:sp modelId="{BBA439B9-2D33-42AF-95A4-B87D4EA42CAB}">
+    <dsp:sp>
       <dsp:nvSpPr>
-        <dsp:cNvPr id="0" name=""/>
+        <dsp:cNvPr id="4" name="矩形 3"/>
         <dsp:cNvSpPr/>
       </dsp:nvSpPr>
       <dsp:spPr>
@@ -11779,7 +11699,7 @@
             <a:spcAft>
               <a:spcPct val="20000"/>
             </a:spcAft>
-            <a:buChar char="••"/>
+            <a:buChar char="•"/>
           </a:pPr>
           <a:r>
             <a:rPr lang="zh-CN" altLang="en-US" sz="2400" kern="1200" dirty="0" smtClean="0"/>
@@ -22167,7 +22087,6 @@
           <a:p>
             <a:fld id="{2EF5AC47-1AC4-47CE-A93B-69BD784FE48A}" type="datetimeFigureOut">
               <a:rPr lang="en-US" altLang="zh-CN"/>
-              <a:t>3/10/2016</a:t>
             </a:fld>
             <a:endParaRPr lang="zh-CN"/>
           </a:p>
@@ -22232,19 +22151,13 @@
           </a:lstStyle>
           <a:p>
             <a:fld id="{4D43AAD8-78B0-4EF6-84C7-32A82E764FCB}" type="slidenum">
-              <a:rPr lang="en-US" altLang="zh-CN"/>
-              <a:t>‹#›</a:t>
+              <a:rPr lang="zh-CN"/>
             </a:fld>
             <a:endParaRPr lang="zh-CN"/>
           </a:p>
         </p:txBody>
       </p:sp>
     </p:spTree>
-    <p:extLst>
-      <p:ext uri="{BB962C8B-B14F-4D97-AF65-F5344CB8AC3E}">
-        <p14:creationId xmlns:p14="http://schemas.microsoft.com/office/powerpoint/2010/main" val="843223556"/>
-      </p:ext>
-    </p:extLst>
   </p:cSld>
   <p:clrMap bg1="lt1" tx1="dk1" bg2="lt2" tx2="dk2" accent1="accent1" accent2="accent2" accent3="accent3" accent4="accent4" accent5="accent5" accent6="accent6" hlink="hlink" folHlink="folHlink"/>
 </p:handoutMaster>
@@ -22331,8 +22244,7 @@
           </a:lstStyle>
           <a:p>
             <a:fld id="{4AD7794F-1BC9-4278-AE26-4DD2F6BD4056}" type="datetimeFigureOut">
-              <a:rPr lang="zh-CN" altLang="en-US"/>
-              <a:t>2016/3/10</a:t>
+              <a:rPr/>
             </a:fld>
             <a:endParaRPr lang="zh-CN"/>
           </a:p>
@@ -22399,6 +22311,7 @@
               <a:rPr lang="zh-CN"/>
               <a:t>单击此处编辑母版文本样式</a:t>
             </a:r>
+            <a:endParaRPr lang="zh-CN"/>
           </a:p>
           <a:p>
             <a:pPr lvl="1"/>
@@ -22406,6 +22319,7 @@
               <a:rPr lang="zh-CN"/>
               <a:t>第二级</a:t>
             </a:r>
+            <a:endParaRPr lang="zh-CN"/>
           </a:p>
           <a:p>
             <a:pPr lvl="2"/>
@@ -22413,6 +22327,7 @@
               <a:rPr lang="zh-CN"/>
               <a:t>第三级</a:t>
             </a:r>
+            <a:endParaRPr lang="zh-CN"/>
           </a:p>
           <a:p>
             <a:pPr lvl="3"/>
@@ -22420,6 +22335,7 @@
               <a:rPr lang="zh-CN"/>
               <a:t>第四级</a:t>
             </a:r>
+            <a:endParaRPr lang="zh-CN"/>
           </a:p>
           <a:p>
             <a:pPr lvl="4"/>
@@ -22427,6 +22343,7 @@
               <a:rPr lang="zh-CN"/>
               <a:t>第五级</a:t>
             </a:r>
+            <a:endParaRPr lang="zh-CN"/>
           </a:p>
         </p:txBody>
       </p:sp>
@@ -22490,18 +22407,12 @@
           <a:p>
             <a:fld id="{5E984417-8091-4A5A-B5F1-70C19F410C1B}" type="slidenum">
               <a:rPr/>
-              <a:t>‹#›</a:t>
             </a:fld>
             <a:endParaRPr lang="zh-CN"/>
           </a:p>
         </p:txBody>
       </p:sp>
     </p:spTree>
-    <p:extLst>
-      <p:ext uri="{BB962C8B-B14F-4D97-AF65-F5344CB8AC3E}">
-        <p14:creationId xmlns:p14="http://schemas.microsoft.com/office/powerpoint/2010/main" val="257048759"/>
-      </p:ext>
-    </p:extLst>
   </p:cSld>
   <p:clrMap bg1="lt1" tx1="dk1" bg2="lt2" tx2="dk2" accent1="accent1" accent2="accent2" accent3="accent3" accent4="accent4" accent5="accent5" accent6="accent6" hlink="hlink" folHlink="folHlink"/>
   <p:notesStyle>
@@ -22740,8 +22651,7 @@
           <a:lstStyle/>
           <a:p>
             <a:fld id="{A8224893-DBDA-4BFA-9CE1-4BFE7CD0F8CF}" type="datetime1">
-              <a:rPr lang="zh-CN" altLang="en-US"/>
-              <a:t>2016/3/10</a:t>
+              <a:rPr/>
             </a:fld>
             <a:endParaRPr lang="zh-CN"/>
           </a:p>
@@ -22783,7 +22693,6 @@
           <a:p>
             <a:fld id="{4FAB73BC-B049-4115-A692-8D63A059BFB8}" type="slidenum">
               <a:rPr/>
-              <a:t>‹#›</a:t>
             </a:fld>
             <a:endParaRPr lang="zh-CN"/>
           </a:p>
@@ -22857,6 +22766,7 @@
               <a:rPr lang="zh-CN" altLang="en-US" smtClean="0"/>
               <a:t>单击此处编辑母版文本样式</a:t>
             </a:r>
+            <a:endParaRPr lang="zh-CN" altLang="en-US" smtClean="0"/>
           </a:p>
           <a:p>
             <a:pPr lvl="1"/>
@@ -22864,6 +22774,7 @@
               <a:rPr lang="zh-CN" altLang="en-US" smtClean="0"/>
               <a:t>第二级</a:t>
             </a:r>
+            <a:endParaRPr lang="zh-CN" altLang="en-US" smtClean="0"/>
           </a:p>
           <a:p>
             <a:pPr lvl="2"/>
@@ -22871,6 +22782,7 @@
               <a:rPr lang="zh-CN" altLang="en-US" smtClean="0"/>
               <a:t>第三级</a:t>
             </a:r>
+            <a:endParaRPr lang="zh-CN" altLang="en-US" smtClean="0"/>
           </a:p>
           <a:p>
             <a:pPr lvl="3"/>
@@ -22878,6 +22790,7 @@
               <a:rPr lang="zh-CN" altLang="en-US" smtClean="0"/>
               <a:t>第四级</a:t>
             </a:r>
+            <a:endParaRPr lang="zh-CN" altLang="en-US" smtClean="0"/>
           </a:p>
           <a:p>
             <a:pPr lvl="4"/>
@@ -22905,8 +22818,7 @@
           <a:lstStyle/>
           <a:p>
             <a:fld id="{5F4E5243-F52A-4D37-9694-EB26C6C31910}" type="datetime1">
-              <a:rPr lang="zh-CN" altLang="en-US"/>
-              <a:t>2016/3/10</a:t>
+              <a:rPr/>
             </a:fld>
             <a:endParaRPr lang="zh-CN"/>
           </a:p>
@@ -22948,7 +22860,6 @@
           <a:p>
             <a:fld id="{4FAB73BC-B049-4115-A692-8D63A059BFB8}" type="slidenum">
               <a:rPr/>
-              <a:t>‹#›</a:t>
             </a:fld>
             <a:endParaRPr lang="zh-CN"/>
           </a:p>
@@ -23032,6 +22943,7 @@
               <a:rPr lang="zh-CN" altLang="en-US" smtClean="0"/>
               <a:t>单击此处编辑母版文本样式</a:t>
             </a:r>
+            <a:endParaRPr lang="zh-CN" altLang="en-US" smtClean="0"/>
           </a:p>
           <a:p>
             <a:pPr lvl="1"/>
@@ -23039,6 +22951,7 @@
               <a:rPr lang="zh-CN" altLang="en-US" smtClean="0"/>
               <a:t>第二级</a:t>
             </a:r>
+            <a:endParaRPr lang="zh-CN" altLang="en-US" smtClean="0"/>
           </a:p>
           <a:p>
             <a:pPr lvl="2"/>
@@ -23046,6 +22959,7 @@
               <a:rPr lang="zh-CN" altLang="en-US" smtClean="0"/>
               <a:t>第三级</a:t>
             </a:r>
+            <a:endParaRPr lang="zh-CN" altLang="en-US" smtClean="0"/>
           </a:p>
           <a:p>
             <a:pPr lvl="3"/>
@@ -23053,6 +22967,7 @@
               <a:rPr lang="zh-CN" altLang="en-US" smtClean="0"/>
               <a:t>第四级</a:t>
             </a:r>
+            <a:endParaRPr lang="zh-CN" altLang="en-US" smtClean="0"/>
           </a:p>
           <a:p>
             <a:pPr lvl="4"/>
@@ -23080,8 +22995,7 @@
           <a:lstStyle/>
           <a:p>
             <a:fld id="{3A77B6E1-634A-48DC-9E8B-D894023267EF}" type="datetime1">
-              <a:rPr lang="zh-CN" altLang="en-US"/>
-              <a:t>2016/3/10</a:t>
+              <a:rPr/>
             </a:fld>
             <a:endParaRPr lang="zh-CN"/>
           </a:p>
@@ -23123,7 +23037,6 @@
           <a:p>
             <a:fld id="{4FAB73BC-B049-4115-A692-8D63A059BFB8}" type="slidenum">
               <a:rPr/>
-              <a:t>‹#›</a:t>
             </a:fld>
             <a:endParaRPr lang="zh-CN"/>
           </a:p>
@@ -23138,7 +23051,7 @@
 </file>
 
 <file path=ppt/slideLayouts/slideLayout12.xml><?xml version="1.0" encoding="utf-8"?>
-<p:sldLayout xmlns:a="http://schemas.openxmlformats.org/drawingml/2006/main" xmlns:r="http://schemas.openxmlformats.org/officeDocument/2006/relationships" xmlns:p="http://schemas.openxmlformats.org/presentationml/2006/main" showMasterSp="0" type="title" preserve="1">
+<p:sldLayout xmlns:a="http://schemas.openxmlformats.org/drawingml/2006/main" xmlns:r="http://schemas.openxmlformats.org/officeDocument/2006/relationships" xmlns:p="http://schemas.openxmlformats.org/presentationml/2006/main" type="title" preserve="1" showMasterSp="0">
   <p:cSld name="标题幻灯片">
     <p:spTree>
       <p:nvGrpSpPr>
@@ -23859,7 +23772,6 @@
           <a:p>
             <a:fld id="{A8224893-DBDA-4BFA-9CE1-4BFE7CD0F8CF}" type="datetime1">
               <a:rPr lang="zh-CN" altLang="en-US" smtClean="0"/>
-              <a:t>2016/3/10</a:t>
             </a:fld>
             <a:endParaRPr lang="zh-CN"/>
           </a:p>
@@ -23901,7 +23813,6 @@
           <a:p>
             <a:fld id="{4FAB73BC-B049-4115-A692-8D63A059BFB8}" type="slidenum">
               <a:rPr lang="en-US" altLang="zh-CN" smtClean="0"/>
-              <a:t>‹#›</a:t>
             </a:fld>
             <a:endParaRPr lang="zh-CN" altLang="en-US"/>
           </a:p>
@@ -23981,6 +23892,7 @@
               <a:rPr lang="zh-CN" altLang="en-US" smtClean="0"/>
               <a:t>单击此处编辑母版文本样式</a:t>
             </a:r>
+            <a:endParaRPr lang="zh-CN" altLang="en-US" smtClean="0"/>
           </a:p>
           <a:p>
             <a:pPr lvl="1"/>
@@ -23988,6 +23900,7 @@
               <a:rPr lang="zh-CN" altLang="en-US" smtClean="0"/>
               <a:t>第二级</a:t>
             </a:r>
+            <a:endParaRPr lang="zh-CN" altLang="en-US" smtClean="0"/>
           </a:p>
           <a:p>
             <a:pPr lvl="2"/>
@@ -23995,6 +23908,7 @@
               <a:rPr lang="zh-CN" altLang="en-US" smtClean="0"/>
               <a:t>第三级</a:t>
             </a:r>
+            <a:endParaRPr lang="zh-CN" altLang="en-US" smtClean="0"/>
           </a:p>
           <a:p>
             <a:pPr lvl="3"/>
@@ -24002,6 +23916,7 @@
               <a:rPr lang="zh-CN" altLang="en-US" smtClean="0"/>
               <a:t>第四级</a:t>
             </a:r>
+            <a:endParaRPr lang="zh-CN" altLang="en-US" smtClean="0"/>
           </a:p>
           <a:p>
             <a:pPr lvl="4"/>
@@ -24030,7 +23945,6 @@
           <a:p>
             <a:fld id="{7B2D3E9E-A95C-48F2-B4BF-A71542E0BE9A}" type="datetime1">
               <a:rPr lang="zh-CN" altLang="en-US" smtClean="0"/>
-              <a:t>2016/3/10</a:t>
             </a:fld>
             <a:endParaRPr lang="zh-CN"/>
           </a:p>
@@ -24072,7 +23986,6 @@
           <a:p>
             <a:fld id="{4FAB73BC-B049-4115-A692-8D63A059BFB8}" type="slidenum">
               <a:rPr lang="en-US" altLang="zh-CN" smtClean="0"/>
-              <a:t>‹#›</a:t>
             </a:fld>
             <a:endParaRPr lang="zh-CN" altLang="en-US"/>
           </a:p>
@@ -24252,6 +24165,7 @@
               <a:rPr lang="zh-CN" altLang="en-US" smtClean="0"/>
               <a:t>单击此处编辑母版文本样式</a:t>
             </a:r>
+            <a:endParaRPr lang="zh-CN" altLang="en-US" smtClean="0"/>
           </a:p>
         </p:txBody>
       </p:sp>
@@ -24272,7 +24186,6 @@
           <a:p>
             <a:fld id="{A50F84E2-2D7A-43CF-AC90-352A289A783A}" type="datetime1">
               <a:rPr lang="zh-CN" altLang="en-US" smtClean="0"/>
-              <a:t>2016/3/10</a:t>
             </a:fld>
             <a:endParaRPr lang="zh-CN"/>
           </a:p>
@@ -24314,7 +24227,6 @@
           <a:p>
             <a:fld id="{4FAB73BC-B049-4115-A692-8D63A059BFB8}" type="slidenum">
               <a:rPr lang="en-US" altLang="zh-CN" smtClean="0"/>
-              <a:t>‹#›</a:t>
             </a:fld>
             <a:endParaRPr lang="zh-CN" altLang="en-US"/>
           </a:p>
@@ -24393,6 +24305,7 @@
               <a:rPr lang="zh-CN" altLang="en-US" smtClean="0"/>
               <a:t>单击此处编辑母版文本样式</a:t>
             </a:r>
+            <a:endParaRPr lang="zh-CN" altLang="en-US" smtClean="0"/>
           </a:p>
           <a:p>
             <a:pPr lvl="1"/>
@@ -24400,6 +24313,7 @@
               <a:rPr lang="zh-CN" altLang="en-US" smtClean="0"/>
               <a:t>第二级</a:t>
             </a:r>
+            <a:endParaRPr lang="zh-CN" altLang="en-US" smtClean="0"/>
           </a:p>
           <a:p>
             <a:pPr lvl="2"/>
@@ -24407,6 +24321,7 @@
               <a:rPr lang="zh-CN" altLang="en-US" smtClean="0"/>
               <a:t>第三级</a:t>
             </a:r>
+            <a:endParaRPr lang="zh-CN" altLang="en-US" smtClean="0"/>
           </a:p>
           <a:p>
             <a:pPr lvl="3"/>
@@ -24414,6 +24329,7 @@
               <a:rPr lang="zh-CN" altLang="en-US" smtClean="0"/>
               <a:t>第四级</a:t>
             </a:r>
+            <a:endParaRPr lang="zh-CN" altLang="en-US" smtClean="0"/>
           </a:p>
           <a:p>
             <a:pPr lvl="4"/>
@@ -24450,6 +24366,7 @@
               <a:rPr lang="zh-CN" altLang="en-US" smtClean="0"/>
               <a:t>单击此处编辑母版文本样式</a:t>
             </a:r>
+            <a:endParaRPr lang="zh-CN" altLang="en-US" smtClean="0"/>
           </a:p>
           <a:p>
             <a:pPr lvl="1"/>
@@ -24457,6 +24374,7 @@
               <a:rPr lang="zh-CN" altLang="en-US" smtClean="0"/>
               <a:t>第二级</a:t>
             </a:r>
+            <a:endParaRPr lang="zh-CN" altLang="en-US" smtClean="0"/>
           </a:p>
           <a:p>
             <a:pPr lvl="2"/>
@@ -24464,6 +24382,7 @@
               <a:rPr lang="zh-CN" altLang="en-US" smtClean="0"/>
               <a:t>第三级</a:t>
             </a:r>
+            <a:endParaRPr lang="zh-CN" altLang="en-US" smtClean="0"/>
           </a:p>
           <a:p>
             <a:pPr lvl="3"/>
@@ -24471,6 +24390,7 @@
               <a:rPr lang="zh-CN" altLang="en-US" smtClean="0"/>
               <a:t>第四级</a:t>
             </a:r>
+            <a:endParaRPr lang="zh-CN" altLang="en-US" smtClean="0"/>
           </a:p>
           <a:p>
             <a:pPr lvl="4"/>
@@ -24499,7 +24419,6 @@
           <a:p>
             <a:fld id="{F12952B5-7A2F-4CC8-B7CE-9234E21C2837}" type="datetime1">
               <a:rPr lang="zh-CN" altLang="en-US" smtClean="0"/>
-              <a:t>2016/3/10</a:t>
             </a:fld>
             <a:endParaRPr lang="zh-CN"/>
           </a:p>
@@ -24541,7 +24460,6 @@
           <a:p>
             <a:fld id="{4FAB73BC-B049-4115-A692-8D63A059BFB8}" type="slidenum">
               <a:rPr lang="en-US" altLang="zh-CN" smtClean="0"/>
-              <a:t>‹#›</a:t>
             </a:fld>
             <a:endParaRPr lang="zh-CN" altLang="en-US"/>
           </a:p>
@@ -24663,6 +24581,7 @@
               <a:rPr lang="zh-CN" altLang="en-US" smtClean="0"/>
               <a:t>单击此处编辑母版文本样式</a:t>
             </a:r>
+            <a:endParaRPr lang="zh-CN" altLang="en-US" smtClean="0"/>
           </a:p>
         </p:txBody>
       </p:sp>
@@ -24693,6 +24612,7 @@
               <a:rPr lang="zh-CN" altLang="en-US" smtClean="0"/>
               <a:t>单击此处编辑母版文本样式</a:t>
             </a:r>
+            <a:endParaRPr lang="zh-CN" altLang="en-US" smtClean="0"/>
           </a:p>
           <a:p>
             <a:pPr lvl="1"/>
@@ -24700,6 +24620,7 @@
               <a:rPr lang="zh-CN" altLang="en-US" smtClean="0"/>
               <a:t>第二级</a:t>
             </a:r>
+            <a:endParaRPr lang="zh-CN" altLang="en-US" smtClean="0"/>
           </a:p>
           <a:p>
             <a:pPr lvl="2"/>
@@ -24707,6 +24628,7 @@
               <a:rPr lang="zh-CN" altLang="en-US" smtClean="0"/>
               <a:t>第三级</a:t>
             </a:r>
+            <a:endParaRPr lang="zh-CN" altLang="en-US" smtClean="0"/>
           </a:p>
           <a:p>
             <a:pPr lvl="3"/>
@@ -24714,6 +24636,7 @@
               <a:rPr lang="zh-CN" altLang="en-US" smtClean="0"/>
               <a:t>第四级</a:t>
             </a:r>
+            <a:endParaRPr lang="zh-CN" altLang="en-US" smtClean="0"/>
           </a:p>
           <a:p>
             <a:pPr lvl="4"/>
@@ -24789,6 +24712,7 @@
               <a:rPr lang="zh-CN" altLang="en-US" smtClean="0"/>
               <a:t>单击此处编辑母版文本样式</a:t>
             </a:r>
+            <a:endParaRPr lang="zh-CN" altLang="en-US" smtClean="0"/>
           </a:p>
         </p:txBody>
       </p:sp>
@@ -24819,6 +24743,7 @@
               <a:rPr lang="zh-CN" altLang="en-US" smtClean="0"/>
               <a:t>单击此处编辑母版文本样式</a:t>
             </a:r>
+            <a:endParaRPr lang="zh-CN" altLang="en-US" smtClean="0"/>
           </a:p>
           <a:p>
             <a:pPr lvl="1"/>
@@ -24826,6 +24751,7 @@
               <a:rPr lang="zh-CN" altLang="en-US" smtClean="0"/>
               <a:t>第二级</a:t>
             </a:r>
+            <a:endParaRPr lang="zh-CN" altLang="en-US" smtClean="0"/>
           </a:p>
           <a:p>
             <a:pPr lvl="2"/>
@@ -24833,6 +24759,7 @@
               <a:rPr lang="zh-CN" altLang="en-US" smtClean="0"/>
               <a:t>第三级</a:t>
             </a:r>
+            <a:endParaRPr lang="zh-CN" altLang="en-US" smtClean="0"/>
           </a:p>
           <a:p>
             <a:pPr lvl="3"/>
@@ -24840,6 +24767,7 @@
               <a:rPr lang="zh-CN" altLang="en-US" smtClean="0"/>
               <a:t>第四级</a:t>
             </a:r>
+            <a:endParaRPr lang="zh-CN" altLang="en-US" smtClean="0"/>
           </a:p>
           <a:p>
             <a:pPr lvl="4"/>
@@ -24868,7 +24796,6 @@
           <a:p>
             <a:fld id="{CE1DA07A-9201-4B4B-BAF2-015AFA30F520}" type="datetime1">
               <a:rPr lang="zh-CN" altLang="en-US" smtClean="0"/>
-              <a:t>2016/3/10</a:t>
             </a:fld>
             <a:endParaRPr lang="zh-CN"/>
           </a:p>
@@ -24910,7 +24837,6 @@
           <a:p>
             <a:fld id="{4FAB73BC-B049-4115-A692-8D63A059BFB8}" type="slidenum">
               <a:rPr lang="en-US" altLang="zh-CN" smtClean="0"/>
-              <a:t>‹#›</a:t>
             </a:fld>
             <a:endParaRPr lang="zh-CN" altLang="en-US"/>
           </a:p>
@@ -24986,7 +24912,6 @@
           <a:p>
             <a:fld id="{73D7E00A-486F-4252-8B1D-E32645521F49}" type="datetime1">
               <a:rPr lang="zh-CN" altLang="en-US" smtClean="0"/>
-              <a:t>2016/3/10</a:t>
             </a:fld>
             <a:endParaRPr lang="zh-CN"/>
           </a:p>
@@ -25028,7 +24953,6 @@
           <a:p>
             <a:fld id="{4FAB73BC-B049-4115-A692-8D63A059BFB8}" type="slidenum">
               <a:rPr lang="en-US" altLang="zh-CN" smtClean="0"/>
-              <a:t>‹#›</a:t>
             </a:fld>
             <a:endParaRPr lang="zh-CN" altLang="en-US"/>
           </a:p>
@@ -25076,7 +25000,6 @@
           <a:p>
             <a:fld id="{8DDF5F92-E675-4B36-9A60-69A962A68675}" type="datetime1">
               <a:rPr lang="zh-CN" altLang="en-US" smtClean="0"/>
-              <a:t>2016/3/10</a:t>
             </a:fld>
             <a:endParaRPr lang="zh-CN"/>
           </a:p>
@@ -25118,7 +25041,6 @@
           <a:p>
             <a:fld id="{4FAB73BC-B049-4115-A692-8D63A059BFB8}" type="slidenum">
               <a:rPr lang="en-US" altLang="zh-CN" smtClean="0"/>
-              <a:t>‹#›</a:t>
             </a:fld>
             <a:endParaRPr lang="zh-CN" altLang="en-US"/>
           </a:p>
@@ -25210,6 +25132,7 @@
               <a:rPr lang="zh-CN" altLang="en-US" smtClean="0"/>
               <a:t>单击此处编辑母版文本样式</a:t>
             </a:r>
+            <a:endParaRPr lang="zh-CN" altLang="en-US" smtClean="0"/>
           </a:p>
           <a:p>
             <a:pPr lvl="1"/>
@@ -25217,6 +25140,7 @@
               <a:rPr lang="zh-CN" altLang="en-US" smtClean="0"/>
               <a:t>第二级</a:t>
             </a:r>
+            <a:endParaRPr lang="zh-CN" altLang="en-US" smtClean="0"/>
           </a:p>
           <a:p>
             <a:pPr lvl="2"/>
@@ -25224,6 +25148,7 @@
               <a:rPr lang="zh-CN" altLang="en-US" smtClean="0"/>
               <a:t>第三级</a:t>
             </a:r>
+            <a:endParaRPr lang="zh-CN" altLang="en-US" smtClean="0"/>
           </a:p>
           <a:p>
             <a:pPr lvl="3"/>
@@ -25231,6 +25156,7 @@
               <a:rPr lang="zh-CN" altLang="en-US" smtClean="0"/>
               <a:t>第四级</a:t>
             </a:r>
+            <a:endParaRPr lang="zh-CN" altLang="en-US" smtClean="0"/>
           </a:p>
           <a:p>
             <a:pPr lvl="4"/>
@@ -25306,6 +25232,7 @@
               <a:rPr lang="zh-CN" altLang="en-US" smtClean="0"/>
               <a:t>单击此处编辑母版文本样式</a:t>
             </a:r>
+            <a:endParaRPr lang="zh-CN" altLang="en-US" smtClean="0"/>
           </a:p>
         </p:txBody>
       </p:sp>
@@ -25326,7 +25253,6 @@
           <a:p>
             <a:fld id="{5586B75A-687E-405C-8A0B-8D00578BA2C3}" type="datetime1">
               <a:rPr lang="en-US" altLang="zh-CN" smtClean="0"/>
-              <a:t>3/10/2016</a:t>
             </a:fld>
             <a:endParaRPr lang="zh-CN" altLang="en-US"/>
           </a:p>
@@ -25368,7 +25294,6 @@
           <a:p>
             <a:fld id="{4FAB73BC-B049-4115-A692-8D63A059BFB8}" type="slidenum">
               <a:rPr lang="en-US" altLang="zh-CN" smtClean="0"/>
-              <a:t>‹#›</a:t>
             </a:fld>
             <a:endParaRPr lang="en-US" altLang="zh-CN"/>
           </a:p>
@@ -25443,6 +25368,7 @@
               <a:rPr lang="zh-CN" altLang="en-US" smtClean="0"/>
               <a:t>单击此处编辑母版文本样式</a:t>
             </a:r>
+            <a:endParaRPr lang="zh-CN" altLang="en-US" smtClean="0"/>
           </a:p>
           <a:p>
             <a:pPr lvl="1"/>
@@ -25450,6 +25376,7 @@
               <a:rPr lang="zh-CN" altLang="en-US" smtClean="0"/>
               <a:t>第二级</a:t>
             </a:r>
+            <a:endParaRPr lang="zh-CN" altLang="en-US" smtClean="0"/>
           </a:p>
           <a:p>
             <a:pPr lvl="2"/>
@@ -25457,6 +25384,7 @@
               <a:rPr lang="zh-CN" altLang="en-US" smtClean="0"/>
               <a:t>第三级</a:t>
             </a:r>
+            <a:endParaRPr lang="zh-CN" altLang="en-US" smtClean="0"/>
           </a:p>
           <a:p>
             <a:pPr lvl="3"/>
@@ -25464,6 +25392,7 @@
               <a:rPr lang="zh-CN" altLang="en-US" smtClean="0"/>
               <a:t>第四级</a:t>
             </a:r>
+            <a:endParaRPr lang="zh-CN" altLang="en-US" smtClean="0"/>
           </a:p>
           <a:p>
             <a:pPr lvl="4"/>
@@ -25491,8 +25420,7 @@
           <a:lstStyle/>
           <a:p>
             <a:fld id="{7B2D3E9E-A95C-48F2-B4BF-A71542E0BE9A}" type="datetime1">
-              <a:rPr lang="zh-CN" altLang="en-US"/>
-              <a:t>2016/3/10</a:t>
+              <a:rPr/>
             </a:fld>
             <a:endParaRPr lang="zh-CN"/>
           </a:p>
@@ -25534,7 +25462,6 @@
           <a:p>
             <a:fld id="{4FAB73BC-B049-4115-A692-8D63A059BFB8}" type="slidenum">
               <a:rPr/>
-              <a:t>‹#›</a:t>
             </a:fld>
             <a:endParaRPr lang="zh-CN"/>
           </a:p>
@@ -25730,6 +25657,7 @@
               <a:rPr lang="zh-CN" altLang="en-US" smtClean="0"/>
               <a:t>单击此处编辑母版文本样式</a:t>
             </a:r>
+            <a:endParaRPr lang="zh-CN" altLang="en-US" smtClean="0"/>
           </a:p>
         </p:txBody>
       </p:sp>
@@ -25750,7 +25678,6 @@
           <a:p>
             <a:fld id="{5586B75A-687E-405C-8A0B-8D00578BA2C3}" type="datetime1">
               <a:rPr lang="en-US" altLang="zh-CN" smtClean="0"/>
-              <a:t>3/10/2016</a:t>
             </a:fld>
             <a:endParaRPr lang="zh-CN" altLang="en-US"/>
           </a:p>
@@ -25792,7 +25719,6 @@
           <a:p>
             <a:fld id="{4FAB73BC-B049-4115-A692-8D63A059BFB8}" type="slidenum">
               <a:rPr lang="en-US" altLang="zh-CN" smtClean="0"/>
-              <a:t>‹#›</a:t>
             </a:fld>
             <a:endParaRPr lang="en-US" altLang="zh-CN"/>
           </a:p>
@@ -25977,6 +25903,7 @@
               <a:rPr lang="zh-CN" altLang="en-US" smtClean="0"/>
               <a:t>单击此处编辑母版文本样式</a:t>
             </a:r>
+            <a:endParaRPr lang="zh-CN" altLang="en-US" smtClean="0"/>
           </a:p>
         </p:txBody>
       </p:sp>
@@ -25997,7 +25924,6 @@
           <a:p>
             <a:fld id="{5586B75A-687E-405C-8A0B-8D00578BA2C3}" type="datetime1">
               <a:rPr lang="en-US" altLang="zh-CN" smtClean="0"/>
-              <a:t>3/10/2016</a:t>
             </a:fld>
             <a:endParaRPr lang="zh-CN" altLang="en-US"/>
           </a:p>
@@ -26039,7 +25965,6 @@
           <a:p>
             <a:fld id="{4FAB73BC-B049-4115-A692-8D63A059BFB8}" type="slidenum">
               <a:rPr lang="en-US" altLang="zh-CN" smtClean="0"/>
-              <a:t>‹#›</a:t>
             </a:fld>
             <a:endParaRPr lang="en-US" altLang="zh-CN"/>
           </a:p>
@@ -26165,6 +26090,7 @@
               <a:rPr lang="zh-CN" altLang="en-US" smtClean="0"/>
               <a:t>单击此处编辑母版文本样式</a:t>
             </a:r>
+            <a:endParaRPr lang="zh-CN" altLang="en-US" smtClean="0"/>
           </a:p>
         </p:txBody>
       </p:sp>
@@ -26287,6 +26213,7 @@
               <a:rPr lang="zh-CN" altLang="en-US" smtClean="0"/>
               <a:t>单击此处编辑母版文本样式</a:t>
             </a:r>
+            <a:endParaRPr lang="zh-CN" altLang="en-US" smtClean="0"/>
           </a:p>
         </p:txBody>
       </p:sp>
@@ -26307,7 +26234,6 @@
           <a:p>
             <a:fld id="{5586B75A-687E-405C-8A0B-8D00578BA2C3}" type="datetime1">
               <a:rPr lang="en-US" altLang="zh-CN" smtClean="0"/>
-              <a:t>3/10/2016</a:t>
             </a:fld>
             <a:endParaRPr lang="zh-CN" altLang="en-US"/>
           </a:p>
@@ -26349,7 +26275,6 @@
           <a:p>
             <a:fld id="{4FAB73BC-B049-4115-A692-8D63A059BFB8}" type="slidenum">
               <a:rPr lang="en-US" altLang="zh-CN" smtClean="0"/>
-              <a:t>‹#›</a:t>
             </a:fld>
             <a:endParaRPr lang="en-US" altLang="zh-CN"/>
           </a:p>
@@ -26393,6 +26318,19 @@
               </a:rPr>
               <a:t>“</a:t>
             </a:r>
+            <a:endParaRPr lang="en-US" sz="8000" baseline="0" dirty="0">
+              <a:ln w="3175" cmpd="sng">
+                <a:noFill/>
+              </a:ln>
+              <a:solidFill>
+                <a:schemeClr val="accent1">
+                  <a:lumMod val="60000"/>
+                  <a:lumOff val="40000"/>
+                </a:schemeClr>
+              </a:solidFill>
+              <a:effectLst/>
+              <a:latin typeface="Arial"/>
+            </a:endParaRPr>
           </a:p>
         </p:txBody>
       </p:sp>
@@ -26624,6 +26562,7 @@
               <a:rPr lang="zh-CN" altLang="en-US" smtClean="0"/>
               <a:t>单击此处编辑母版文本样式</a:t>
             </a:r>
+            <a:endParaRPr lang="zh-CN" altLang="en-US" smtClean="0"/>
           </a:p>
         </p:txBody>
       </p:sp>
@@ -26644,7 +26583,6 @@
           <a:p>
             <a:fld id="{5586B75A-687E-405C-8A0B-8D00578BA2C3}" type="datetime1">
               <a:rPr lang="en-US" altLang="zh-CN" smtClean="0"/>
-              <a:t>3/10/2016</a:t>
             </a:fld>
             <a:endParaRPr lang="zh-CN" altLang="en-US"/>
           </a:p>
@@ -26686,7 +26624,6 @@
           <a:p>
             <a:fld id="{4FAB73BC-B049-4115-A692-8D63A059BFB8}" type="slidenum">
               <a:rPr lang="en-US" altLang="zh-CN" smtClean="0"/>
-              <a:t>‹#›</a:t>
             </a:fld>
             <a:endParaRPr lang="en-US" altLang="zh-CN"/>
           </a:p>
@@ -26812,6 +26749,7 @@
               <a:rPr lang="zh-CN" altLang="en-US" smtClean="0"/>
               <a:t>单击此处编辑母版文本样式</a:t>
             </a:r>
+            <a:endParaRPr lang="zh-CN" altLang="en-US" smtClean="0"/>
           </a:p>
         </p:txBody>
       </p:sp>
@@ -26934,6 +26872,7 @@
               <a:rPr lang="zh-CN" altLang="en-US" smtClean="0"/>
               <a:t>单击此处编辑母版文本样式</a:t>
             </a:r>
+            <a:endParaRPr lang="zh-CN" altLang="en-US" smtClean="0"/>
           </a:p>
         </p:txBody>
       </p:sp>
@@ -26954,7 +26893,6 @@
           <a:p>
             <a:fld id="{5586B75A-687E-405C-8A0B-8D00578BA2C3}" type="datetime1">
               <a:rPr lang="en-US" altLang="zh-CN" smtClean="0"/>
-              <a:t>3/10/2016</a:t>
             </a:fld>
             <a:endParaRPr lang="zh-CN" altLang="en-US"/>
           </a:p>
@@ -26996,7 +26934,6 @@
           <a:p>
             <a:fld id="{4FAB73BC-B049-4115-A692-8D63A059BFB8}" type="slidenum">
               <a:rPr lang="en-US" altLang="zh-CN" smtClean="0"/>
-              <a:t>‹#›</a:t>
             </a:fld>
             <a:endParaRPr lang="en-US" altLang="zh-CN"/>
           </a:p>
@@ -27040,6 +26977,19 @@
               </a:rPr>
               <a:t>“</a:t>
             </a:r>
+            <a:endParaRPr lang="en-US" sz="8000" baseline="0" dirty="0">
+              <a:ln w="3175" cmpd="sng">
+                <a:noFill/>
+              </a:ln>
+              <a:solidFill>
+                <a:schemeClr val="accent1">
+                  <a:lumMod val="60000"/>
+                  <a:lumOff val="40000"/>
+                </a:schemeClr>
+              </a:solidFill>
+              <a:effectLst/>
+              <a:latin typeface="Arial"/>
+            </a:endParaRPr>
           </a:p>
         </p:txBody>
       </p:sp>
@@ -27081,6 +27031,19 @@
               </a:rPr>
               <a:t>”</a:t>
             </a:r>
+            <a:endParaRPr lang="en-US" sz="8000" baseline="0" dirty="0">
+              <a:ln w="3175" cmpd="sng">
+                <a:noFill/>
+              </a:ln>
+              <a:solidFill>
+                <a:schemeClr val="accent1">
+                  <a:lumMod val="60000"/>
+                  <a:lumOff val="40000"/>
+                </a:schemeClr>
+              </a:solidFill>
+              <a:effectLst/>
+              <a:latin typeface="Arial"/>
+            </a:endParaRPr>
           </a:p>
         </p:txBody>
       </p:sp>
@@ -27201,6 +27164,7 @@
               <a:rPr lang="zh-CN" altLang="en-US" smtClean="0"/>
               <a:t>单击此处编辑母版文本样式</a:t>
             </a:r>
+            <a:endParaRPr lang="zh-CN" altLang="en-US" smtClean="0"/>
           </a:p>
         </p:txBody>
       </p:sp>
@@ -27323,6 +27287,7 @@
               <a:rPr lang="zh-CN" altLang="en-US" smtClean="0"/>
               <a:t>单击此处编辑母版文本样式</a:t>
             </a:r>
+            <a:endParaRPr lang="zh-CN" altLang="en-US" smtClean="0"/>
           </a:p>
         </p:txBody>
       </p:sp>
@@ -27343,7 +27308,6 @@
           <a:p>
             <a:fld id="{5586B75A-687E-405C-8A0B-8D00578BA2C3}" type="datetime1">
               <a:rPr lang="en-US" altLang="zh-CN" smtClean="0"/>
-              <a:t>3/10/2016</a:t>
             </a:fld>
             <a:endParaRPr lang="zh-CN" altLang="en-US"/>
           </a:p>
@@ -27385,7 +27349,6 @@
           <a:p>
             <a:fld id="{4FAB73BC-B049-4115-A692-8D63A059BFB8}" type="slidenum">
               <a:rPr lang="en-US" altLang="zh-CN" smtClean="0"/>
-              <a:t>‹#›</a:t>
             </a:fld>
             <a:endParaRPr lang="en-US" altLang="zh-CN"/>
           </a:p>
@@ -27460,6 +27423,7 @@
               <a:rPr lang="zh-CN" altLang="en-US" smtClean="0"/>
               <a:t>单击此处编辑母版文本样式</a:t>
             </a:r>
+            <a:endParaRPr lang="zh-CN" altLang="en-US" smtClean="0"/>
           </a:p>
           <a:p>
             <a:pPr lvl="1"/>
@@ -27467,6 +27431,7 @@
               <a:rPr lang="zh-CN" altLang="en-US" smtClean="0"/>
               <a:t>第二级</a:t>
             </a:r>
+            <a:endParaRPr lang="zh-CN" altLang="en-US" smtClean="0"/>
           </a:p>
           <a:p>
             <a:pPr lvl="2"/>
@@ -27474,6 +27439,7 @@
               <a:rPr lang="zh-CN" altLang="en-US" smtClean="0"/>
               <a:t>第三级</a:t>
             </a:r>
+            <a:endParaRPr lang="zh-CN" altLang="en-US" smtClean="0"/>
           </a:p>
           <a:p>
             <a:pPr lvl="3"/>
@@ -27481,6 +27447,7 @@
               <a:rPr lang="zh-CN" altLang="en-US" smtClean="0"/>
               <a:t>第四级</a:t>
             </a:r>
+            <a:endParaRPr lang="zh-CN" altLang="en-US" smtClean="0"/>
           </a:p>
           <a:p>
             <a:pPr lvl="4"/>
@@ -27509,7 +27476,6 @@
           <a:p>
             <a:fld id="{5F4E5243-F52A-4D37-9694-EB26C6C31910}" type="datetime1">
               <a:rPr lang="zh-CN" altLang="en-US" smtClean="0"/>
-              <a:t>2016/3/10</a:t>
             </a:fld>
             <a:endParaRPr lang="zh-CN"/>
           </a:p>
@@ -27551,7 +27517,6 @@
           <a:p>
             <a:fld id="{4FAB73BC-B049-4115-A692-8D63A059BFB8}" type="slidenum">
               <a:rPr lang="en-US" altLang="zh-CN" smtClean="0"/>
-              <a:t>‹#›</a:t>
             </a:fld>
             <a:endParaRPr lang="zh-CN" altLang="en-US"/>
           </a:p>
@@ -27635,6 +27600,7 @@
               <a:rPr lang="zh-CN" altLang="en-US" smtClean="0"/>
               <a:t>单击此处编辑母版文本样式</a:t>
             </a:r>
+            <a:endParaRPr lang="zh-CN" altLang="en-US" smtClean="0"/>
           </a:p>
           <a:p>
             <a:pPr lvl="1"/>
@@ -27642,6 +27608,7 @@
               <a:rPr lang="zh-CN" altLang="en-US" smtClean="0"/>
               <a:t>第二级</a:t>
             </a:r>
+            <a:endParaRPr lang="zh-CN" altLang="en-US" smtClean="0"/>
           </a:p>
           <a:p>
             <a:pPr lvl="2"/>
@@ -27649,6 +27616,7 @@
               <a:rPr lang="zh-CN" altLang="en-US" smtClean="0"/>
               <a:t>第三级</a:t>
             </a:r>
+            <a:endParaRPr lang="zh-CN" altLang="en-US" smtClean="0"/>
           </a:p>
           <a:p>
             <a:pPr lvl="3"/>
@@ -27656,6 +27624,7 @@
               <a:rPr lang="zh-CN" altLang="en-US" smtClean="0"/>
               <a:t>第四级</a:t>
             </a:r>
+            <a:endParaRPr lang="zh-CN" altLang="en-US" smtClean="0"/>
           </a:p>
           <a:p>
             <a:pPr lvl="4"/>
@@ -27684,7 +27653,6 @@
           <a:p>
             <a:fld id="{5586B75A-687E-405C-8A0B-8D00578BA2C3}" type="datetime1">
               <a:rPr lang="en-US" altLang="zh-CN" smtClean="0"/>
-              <a:t>3/10/2016</a:t>
             </a:fld>
             <a:endParaRPr lang="zh-CN" altLang="en-US"/>
           </a:p>
@@ -27726,7 +27694,6 @@
           <a:p>
             <a:fld id="{4FAB73BC-B049-4115-A692-8D63A059BFB8}" type="slidenum">
               <a:rPr lang="en-US" altLang="zh-CN" smtClean="0"/>
-              <a:t>‹#›</a:t>
             </a:fld>
             <a:endParaRPr lang="en-US" altLang="zh-CN"/>
           </a:p>
@@ -27911,6 +27878,7 @@
               <a:rPr lang="zh-CN" altLang="en-US" smtClean="0"/>
               <a:t>单击此处编辑母版文本样式</a:t>
             </a:r>
+            <a:endParaRPr lang="zh-CN" altLang="en-US" smtClean="0"/>
           </a:p>
         </p:txBody>
       </p:sp>
@@ -27930,8 +27898,7 @@
           <a:lstStyle/>
           <a:p>
             <a:fld id="{A50F84E2-2D7A-43CF-AC90-352A289A783A}" type="datetime1">
-              <a:rPr lang="zh-CN" altLang="en-US"/>
-              <a:t>2016/3/10</a:t>
+              <a:rPr/>
             </a:fld>
             <a:endParaRPr lang="zh-CN"/>
           </a:p>
@@ -27973,7 +27940,6 @@
           <a:p>
             <a:fld id="{4FAB73BC-B049-4115-A692-8D63A059BFB8}" type="slidenum">
               <a:rPr/>
-              <a:t>‹#›</a:t>
             </a:fld>
             <a:endParaRPr lang="zh-CN"/>
           </a:p>
@@ -28080,6 +28046,7 @@
               <a:rPr lang="zh-CN" altLang="en-US" smtClean="0"/>
               <a:t>单击此处编辑母版文本样式</a:t>
             </a:r>
+            <a:endParaRPr lang="zh-CN" altLang="en-US" smtClean="0"/>
           </a:p>
           <a:p>
             <a:pPr lvl="1"/>
@@ -28087,6 +28054,7 @@
               <a:rPr lang="zh-CN" altLang="en-US" smtClean="0"/>
               <a:t>第二级</a:t>
             </a:r>
+            <a:endParaRPr lang="zh-CN" altLang="en-US" smtClean="0"/>
           </a:p>
           <a:p>
             <a:pPr lvl="2"/>
@@ -28094,6 +28062,7 @@
               <a:rPr lang="zh-CN" altLang="en-US" smtClean="0"/>
               <a:t>第三级</a:t>
             </a:r>
+            <a:endParaRPr lang="zh-CN" altLang="en-US" smtClean="0"/>
           </a:p>
           <a:p>
             <a:pPr lvl="3"/>
@@ -28101,6 +28070,7 @@
               <a:rPr lang="zh-CN" altLang="en-US" smtClean="0"/>
               <a:t>第四级</a:t>
             </a:r>
+            <a:endParaRPr lang="zh-CN" altLang="en-US" smtClean="0"/>
           </a:p>
           <a:p>
             <a:pPr lvl="4"/>
@@ -28165,6 +28135,7 @@
               <a:rPr lang="zh-CN" altLang="en-US" smtClean="0"/>
               <a:t>单击此处编辑母版文本样式</a:t>
             </a:r>
+            <a:endParaRPr lang="zh-CN" altLang="en-US" smtClean="0"/>
           </a:p>
           <a:p>
             <a:pPr lvl="1"/>
@@ -28172,6 +28143,7 @@
               <a:rPr lang="zh-CN" altLang="en-US" smtClean="0"/>
               <a:t>第二级</a:t>
             </a:r>
+            <a:endParaRPr lang="zh-CN" altLang="en-US" smtClean="0"/>
           </a:p>
           <a:p>
             <a:pPr lvl="2"/>
@@ -28179,6 +28151,7 @@
               <a:rPr lang="zh-CN" altLang="en-US" smtClean="0"/>
               <a:t>第三级</a:t>
             </a:r>
+            <a:endParaRPr lang="zh-CN" altLang="en-US" smtClean="0"/>
           </a:p>
           <a:p>
             <a:pPr lvl="3"/>
@@ -28186,6 +28159,7 @@
               <a:rPr lang="zh-CN" altLang="en-US" smtClean="0"/>
               <a:t>第四级</a:t>
             </a:r>
+            <a:endParaRPr lang="zh-CN" altLang="en-US" smtClean="0"/>
           </a:p>
           <a:p>
             <a:pPr lvl="4"/>
@@ -28213,8 +28187,7 @@
           <a:lstStyle/>
           <a:p>
             <a:fld id="{F12952B5-7A2F-4CC8-B7CE-9234E21C2837}" type="datetime1">
-              <a:rPr lang="zh-CN" altLang="en-US"/>
-              <a:t>2016/3/10</a:t>
+              <a:rPr/>
             </a:fld>
             <a:endParaRPr lang="zh-CN"/>
           </a:p>
@@ -28256,7 +28229,6 @@
           <a:p>
             <a:fld id="{4FAB73BC-B049-4115-A692-8D63A059BFB8}" type="slidenum">
               <a:rPr/>
-              <a:t>‹#›</a:t>
             </a:fld>
             <a:endParaRPr lang="zh-CN"/>
           </a:p>
@@ -28351,6 +28323,7 @@
               <a:rPr lang="zh-CN" altLang="en-US" smtClean="0"/>
               <a:t>单击此处编辑母版文本样式</a:t>
             </a:r>
+            <a:endParaRPr lang="zh-CN" altLang="en-US" smtClean="0"/>
           </a:p>
         </p:txBody>
       </p:sp>
@@ -28407,6 +28380,7 @@
               <a:rPr lang="zh-CN" altLang="en-US" smtClean="0"/>
               <a:t>单击此处编辑母版文本样式</a:t>
             </a:r>
+            <a:endParaRPr lang="zh-CN" altLang="en-US" smtClean="0"/>
           </a:p>
           <a:p>
             <a:pPr lvl="1"/>
@@ -28414,6 +28388,7 @@
               <a:rPr lang="zh-CN" altLang="en-US" smtClean="0"/>
               <a:t>第二级</a:t>
             </a:r>
+            <a:endParaRPr lang="zh-CN" altLang="en-US" smtClean="0"/>
           </a:p>
           <a:p>
             <a:pPr lvl="2"/>
@@ -28421,6 +28396,7 @@
               <a:rPr lang="zh-CN" altLang="en-US" smtClean="0"/>
               <a:t>第三级</a:t>
             </a:r>
+            <a:endParaRPr lang="zh-CN" altLang="en-US" smtClean="0"/>
           </a:p>
           <a:p>
             <a:pPr lvl="3"/>
@@ -28428,6 +28404,7 @@
               <a:rPr lang="zh-CN" altLang="en-US" smtClean="0"/>
               <a:t>第四级</a:t>
             </a:r>
+            <a:endParaRPr lang="zh-CN" altLang="en-US" smtClean="0"/>
           </a:p>
           <a:p>
             <a:pPr lvl="4"/>
@@ -28501,6 +28478,7 @@
               <a:rPr lang="zh-CN" altLang="en-US" smtClean="0"/>
               <a:t>单击此处编辑母版文本样式</a:t>
             </a:r>
+            <a:endParaRPr lang="zh-CN" altLang="en-US" smtClean="0"/>
           </a:p>
         </p:txBody>
       </p:sp>
@@ -28557,6 +28535,7 @@
               <a:rPr lang="zh-CN" altLang="en-US" smtClean="0"/>
               <a:t>单击此处编辑母版文本样式</a:t>
             </a:r>
+            <a:endParaRPr lang="zh-CN" altLang="en-US" smtClean="0"/>
           </a:p>
           <a:p>
             <a:pPr lvl="1"/>
@@ -28564,6 +28543,7 @@
               <a:rPr lang="zh-CN" altLang="en-US" smtClean="0"/>
               <a:t>第二级</a:t>
             </a:r>
+            <a:endParaRPr lang="zh-CN" altLang="en-US" smtClean="0"/>
           </a:p>
           <a:p>
             <a:pPr lvl="2"/>
@@ -28571,6 +28551,7 @@
               <a:rPr lang="zh-CN" altLang="en-US" smtClean="0"/>
               <a:t>第三级</a:t>
             </a:r>
+            <a:endParaRPr lang="zh-CN" altLang="en-US" smtClean="0"/>
           </a:p>
           <a:p>
             <a:pPr lvl="3"/>
@@ -28578,6 +28559,7 @@
               <a:rPr lang="zh-CN" altLang="en-US" smtClean="0"/>
               <a:t>第四级</a:t>
             </a:r>
+            <a:endParaRPr lang="zh-CN" altLang="en-US" smtClean="0"/>
           </a:p>
           <a:p>
             <a:pPr lvl="4"/>
@@ -28605,8 +28587,7 @@
           <a:lstStyle/>
           <a:p>
             <a:fld id="{CE1DA07A-9201-4B4B-BAF2-015AFA30F520}" type="datetime1">
-              <a:rPr lang="zh-CN" altLang="en-US"/>
-              <a:t>2016/3/10</a:t>
+              <a:rPr/>
             </a:fld>
             <a:endParaRPr lang="zh-CN"/>
           </a:p>
@@ -28648,7 +28629,6 @@
           <a:p>
             <a:fld id="{4FAB73BC-B049-4115-A692-8D63A059BFB8}" type="slidenum">
               <a:rPr/>
-              <a:t>‹#›</a:t>
             </a:fld>
             <a:endParaRPr lang="zh-CN"/>
           </a:p>
@@ -28718,8 +28698,7 @@
           <a:lstStyle/>
           <a:p>
             <a:fld id="{73D7E00A-486F-4252-8B1D-E32645521F49}" type="datetime1">
-              <a:rPr lang="zh-CN" altLang="en-US"/>
-              <a:t>2016/3/10</a:t>
+              <a:rPr/>
             </a:fld>
             <a:endParaRPr lang="zh-CN"/>
           </a:p>
@@ -28761,7 +28740,6 @@
           <a:p>
             <a:fld id="{4FAB73BC-B049-4115-A692-8D63A059BFB8}" type="slidenum">
               <a:rPr/>
-              <a:t>‹#›</a:t>
             </a:fld>
             <a:endParaRPr lang="zh-CN"/>
           </a:p>
@@ -28838,8 +28816,7 @@
           <a:lstStyle/>
           <a:p>
             <a:fld id="{8DDF5F92-E675-4B36-9A60-69A962A68675}" type="datetime1">
-              <a:rPr lang="zh-CN" altLang="en-US"/>
-              <a:t>2016/3/10</a:t>
+              <a:rPr/>
             </a:fld>
             <a:endParaRPr lang="zh-CN"/>
           </a:p>
@@ -28881,7 +28858,6 @@
           <a:p>
             <a:fld id="{4FAB73BC-B049-4115-A692-8D63A059BFB8}" type="slidenum">
               <a:rPr/>
-              <a:t>‹#›</a:t>
             </a:fld>
             <a:endParaRPr lang="zh-CN"/>
           </a:p>
@@ -28999,6 +28975,7 @@
               <a:rPr lang="zh-CN" altLang="en-US" smtClean="0"/>
               <a:t>单击此处编辑母版文本样式</a:t>
             </a:r>
+            <a:endParaRPr lang="zh-CN" altLang="en-US" smtClean="0"/>
           </a:p>
           <a:p>
             <a:pPr lvl="1"/>
@@ -29006,6 +28983,7 @@
               <a:rPr lang="zh-CN" altLang="en-US" smtClean="0"/>
               <a:t>第二级</a:t>
             </a:r>
+            <a:endParaRPr lang="zh-CN" altLang="en-US" smtClean="0"/>
           </a:p>
           <a:p>
             <a:pPr lvl="2"/>
@@ -29013,6 +28991,7 @@
               <a:rPr lang="zh-CN" altLang="en-US" smtClean="0"/>
               <a:t>第三级</a:t>
             </a:r>
+            <a:endParaRPr lang="zh-CN" altLang="en-US" smtClean="0"/>
           </a:p>
           <a:p>
             <a:pPr lvl="3"/>
@@ -29020,6 +28999,7 @@
               <a:rPr lang="zh-CN" altLang="en-US" smtClean="0"/>
               <a:t>第四级</a:t>
             </a:r>
+            <a:endParaRPr lang="zh-CN" altLang="en-US" smtClean="0"/>
           </a:p>
           <a:p>
             <a:pPr lvl="4"/>
@@ -29095,6 +29075,7 @@
               <a:rPr lang="zh-CN" altLang="en-US" smtClean="0"/>
               <a:t>单击此处编辑母版文本样式</a:t>
             </a:r>
+            <a:endParaRPr lang="zh-CN" altLang="en-US" smtClean="0"/>
           </a:p>
         </p:txBody>
       </p:sp>
@@ -29114,8 +29095,7 @@
           <a:lstStyle/>
           <a:p>
             <a:fld id="{AF6E2C9B-5FA2-460D-9BE7-B0812FC2A6FF}" type="datetime1">
-              <a:rPr lang="zh-CN" altLang="en-US"/>
-              <a:t>2016/3/10</a:t>
+              <a:rPr/>
             </a:fld>
             <a:endParaRPr lang="zh-CN"/>
           </a:p>
@@ -29157,7 +29137,6 @@
           <a:p>
             <a:fld id="{4FAB73BC-B049-4115-A692-8D63A059BFB8}" type="slidenum">
               <a:rPr/>
-              <a:t>‹#›</a:t>
             </a:fld>
             <a:endParaRPr lang="zh-CN"/>
           </a:p>
@@ -29351,6 +29330,7 @@
               <a:rPr lang="zh-CN" altLang="en-US" smtClean="0"/>
               <a:t>单击此处编辑母版文本样式</a:t>
             </a:r>
+            <a:endParaRPr lang="zh-CN" altLang="en-US" smtClean="0"/>
           </a:p>
         </p:txBody>
       </p:sp>
@@ -29370,8 +29350,7 @@
           <a:lstStyle/>
           <a:p>
             <a:fld id="{1D374940-A916-4C8B-9648-02A2D3898F9E}" type="datetime1">
-              <a:rPr lang="zh-CN" altLang="en-US"/>
-              <a:t>2016/3/10</a:t>
+              <a:rPr/>
             </a:fld>
             <a:endParaRPr lang="zh-CN"/>
           </a:p>
@@ -29413,7 +29392,6 @@
           <a:p>
             <a:fld id="{4FAB73BC-B049-4115-A692-8D63A059BFB8}" type="slidenum">
               <a:rPr/>
-              <a:t>‹#›</a:t>
             </a:fld>
             <a:endParaRPr lang="zh-CN"/>
           </a:p>
@@ -29478,6 +29456,7 @@
               <a:rPr lang="zh-CN"/>
               <a:t>单击此处编辑母版标题样式</a:t>
             </a:r>
+            <a:endParaRPr lang="zh-CN"/>
           </a:p>
         </p:txBody>
       </p:sp>
@@ -29511,6 +29490,7 @@
               <a:rPr lang="zh-CN"/>
               <a:t>单击此处编辑母版文本样式</a:t>
             </a:r>
+            <a:endParaRPr lang="zh-CN"/>
           </a:p>
           <a:p>
             <a:pPr lvl="1"/>
@@ -29518,6 +29498,7 @@
               <a:rPr lang="zh-CN"/>
               <a:t>第二级</a:t>
             </a:r>
+            <a:endParaRPr lang="zh-CN"/>
           </a:p>
           <a:p>
             <a:pPr lvl="2"/>
@@ -29525,6 +29506,7 @@
               <a:rPr lang="zh-CN"/>
               <a:t>第三级</a:t>
             </a:r>
+            <a:endParaRPr lang="zh-CN"/>
           </a:p>
           <a:p>
             <a:pPr lvl="3"/>
@@ -29532,6 +29514,7 @@
               <a:rPr lang="zh-CN"/>
               <a:t>第四级</a:t>
             </a:r>
+            <a:endParaRPr lang="zh-CN"/>
           </a:p>
           <a:p>
             <a:pPr lvl="4"/>
@@ -29539,6 +29522,7 @@
               <a:rPr lang="zh-CN"/>
               <a:t>第五级</a:t>
             </a:r>
+            <a:endParaRPr lang="zh-CN"/>
           </a:p>
         </p:txBody>
       </p:sp>
@@ -29580,7 +29564,6 @@
           <a:p>
             <a:fld id="{5586B75A-687E-405C-8A0B-8D00578BA2C3}" type="datetime1">
               <a:rPr lang="en-US" altLang="zh-CN" smtClean="0"/>
-              <a:t>3/10/2016</a:t>
             </a:fld>
             <a:endParaRPr lang="zh-CN" altLang="en-US"/>
           </a:p>
@@ -29663,7 +29646,6 @@
           <a:p>
             <a:fld id="{4FAB73BC-B049-4115-A692-8D63A059BFB8}" type="slidenum">
               <a:rPr lang="en-US" altLang="zh-CN" smtClean="0"/>
-              <a:t>‹#›</a:t>
             </a:fld>
             <a:endParaRPr lang="en-US" altLang="zh-CN"/>
           </a:p>
@@ -30584,6 +30566,7 @@
               <a:rPr lang="zh-CN" altLang="en-US" smtClean="0"/>
               <a:t>单击此处编辑母版文本样式</a:t>
             </a:r>
+            <a:endParaRPr lang="zh-CN" altLang="en-US" smtClean="0"/>
           </a:p>
           <a:p>
             <a:pPr lvl="1"/>
@@ -30591,6 +30574,7 @@
               <a:rPr lang="zh-CN" altLang="en-US" smtClean="0"/>
               <a:t>第二级</a:t>
             </a:r>
+            <a:endParaRPr lang="zh-CN" altLang="en-US" smtClean="0"/>
           </a:p>
           <a:p>
             <a:pPr lvl="2"/>
@@ -30598,6 +30582,7 @@
               <a:rPr lang="zh-CN" altLang="en-US" smtClean="0"/>
               <a:t>第三级</a:t>
             </a:r>
+            <a:endParaRPr lang="zh-CN" altLang="en-US" smtClean="0"/>
           </a:p>
           <a:p>
             <a:pPr lvl="3"/>
@@ -30605,6 +30590,7 @@
               <a:rPr lang="zh-CN" altLang="en-US" smtClean="0"/>
               <a:t>第四级</a:t>
             </a:r>
+            <a:endParaRPr lang="zh-CN" altLang="en-US" smtClean="0"/>
           </a:p>
           <a:p>
             <a:pPr lvl="4"/>
@@ -30651,7 +30637,6 @@
           <a:p>
             <a:fld id="{5586B75A-687E-405C-8A0B-8D00578BA2C3}" type="datetime1">
               <a:rPr lang="en-US" altLang="zh-CN" smtClean="0"/>
-              <a:t>3/10/2016</a:t>
             </a:fld>
             <a:endParaRPr lang="zh-CN" altLang="en-US"/>
           </a:p>
@@ -30727,7 +30712,6 @@
           <a:p>
             <a:fld id="{4FAB73BC-B049-4115-A692-8D63A059BFB8}" type="slidenum">
               <a:rPr lang="en-US" altLang="zh-CN" smtClean="0"/>
-              <a:t>‹#›</a:t>
             </a:fld>
             <a:endParaRPr lang="en-US" altLang="zh-CN"/>
           </a:p>
@@ -31314,7 +31298,7 @@
           <p:nvPr/>
         </p:nvPicPr>
         <p:blipFill>
-          <a:blip r:embed="rId2">
+          <a:blip r:embed="rId1">
             <a:extLst>
               <a:ext uri="{28A0092B-C50C-407E-A947-70E740481C1C}">
                 <a14:useLocalDpi xmlns:a14="http://schemas.microsoft.com/office/drawing/2010/main" val="0"/>
@@ -31399,6 +31383,7 @@
               <a:rPr lang="zh-CN" altLang="en-US"/>
               <a:t>接口</a:t>
             </a:r>
+            <a:endParaRPr lang="zh-CN" altLang="en-US"/>
           </a:p>
         </p:txBody>
       </p:sp>
@@ -31411,7 +31396,7 @@
           <p:nvPr/>
         </p:nvPicPr>
         <p:blipFill>
-          <a:blip r:embed="rId2"/>
+          <a:blip r:embed="rId1"/>
           <a:stretch>
             <a:fillRect/>
           </a:stretch>
@@ -31459,7 +31444,6 @@
           <a:bodyPr wrap="square" rtlCol="0">
             <a:spAutoFit/>
           </a:bodyPr>
-          <a:lstStyle/>
           <a:p>
             <a:r>
               <a:rPr lang="zh-CN" altLang="en-US" sz="2800"/>
@@ -31473,6 +31457,7 @@
               <a:rPr lang="zh-CN" altLang="en-US" sz="2800"/>
               <a:t>参数配置与网络流读取</a:t>
             </a:r>
+            <a:endParaRPr lang="zh-CN" altLang="en-US" sz="2800"/>
           </a:p>
         </p:txBody>
       </p:sp>
@@ -31509,7 +31494,6 @@
           <a:bodyPr wrap="square" rtlCol="0">
             <a:spAutoFit/>
           </a:bodyPr>
-          <a:lstStyle/>
           <a:p>
             <a:r>
               <a:rPr lang="zh-CN" altLang="en-US"/>
@@ -31523,6 +31507,7 @@
               <a:rPr lang="zh-CN" altLang="en-US"/>
               <a:t>的两种属性读取方式</a:t>
             </a:r>
+            <a:endParaRPr lang="zh-CN" altLang="en-US"/>
           </a:p>
           <a:p>
             <a:r>
@@ -31535,7 +31520,11 @@
             </a:r>
             <a:r>
               <a:rPr lang="zh-CN" altLang="en-US"/>
-              <a:t>提供了多种种类型的</a:t>
+              <a:t>提供了多种</a:t>
+            </a:r>
+            <a:r>
+              <a:rPr lang="zh-CN" altLang="en-US"/>
+              <a:t>种类型的</a:t>
             </a:r>
             <a:r>
               <a:rPr lang="en-US" altLang="zh-CN"/>
@@ -31545,6 +31534,7 @@
               <a:rPr lang="zh-CN" altLang="en-US"/>
               <a:t>）</a:t>
             </a:r>
+            <a:endParaRPr lang="zh-CN" altLang="en-US"/>
           </a:p>
         </p:txBody>
       </p:sp>
@@ -31568,12 +31558,12 @@
           <a:bodyPr wrap="square" rtlCol="0">
             <a:spAutoFit/>
           </a:bodyPr>
-          <a:lstStyle/>
           <a:p>
             <a:r>
               <a:rPr lang="zh-CN" altLang="en-US"/>
               <a:t>更加灵活的选择属性获取方式</a:t>
             </a:r>
+            <a:endParaRPr lang="zh-CN" altLang="en-US"/>
           </a:p>
         </p:txBody>
       </p:sp>
@@ -31769,6 +31759,7 @@
               <a:rPr lang="zh-CN" altLang="en-US" dirty="0"/>
               <a:t>设计</a:t>
             </a:r>
+            <a:endParaRPr lang="zh-CN" altLang="en-US" dirty="0"/>
           </a:p>
         </p:txBody>
       </p:sp>
@@ -31836,172 +31827,6 @@
           </a:p>
         </p:txBody>
       </p:sp>
-      <p:sp>
-        <p:nvSpPr>
-          <p:cNvPr id="4" name="文本框 3"/>
-          <p:cNvSpPr txBox="1"/>
-          <p:nvPr/>
-        </p:nvSpPr>
-        <p:spPr>
-          <a:xfrm>
-            <a:off x="892934" y="1189076"/>
-            <a:ext cx="6542468" cy="477054"/>
-          </a:xfrm>
-          <a:prstGeom prst="rect">
-            <a:avLst/>
-          </a:prstGeom>
-          <a:noFill/>
-        </p:spPr>
-        <p:txBody>
-          <a:bodyPr wrap="square" rtlCol="0">
-            <a:spAutoFit/>
-          </a:bodyPr>
-          <a:lstStyle/>
-          <a:p>
-            <a:r>
-              <a:rPr lang="en-US" altLang="zh-CN" sz="2500" dirty="0" smtClean="0"/>
-              <a:t>xml</a:t>
-            </a:r>
-            <a:r>
-              <a:rPr lang="zh-CN" altLang="en-US" sz="2500" dirty="0" smtClean="0"/>
-              <a:t>配置文件设置界面参数</a:t>
-            </a:r>
-            <a:endParaRPr lang="zh-CN" altLang="en-US" sz="2500" dirty="0"/>
-          </a:p>
-        </p:txBody>
-      </p:sp>
-      <p:pic>
-        <p:nvPicPr>
-          <p:cNvPr id="7" name="图片 6"/>
-          <p:cNvPicPr>
-            <a:picLocks noChangeAspect="1"/>
-          </p:cNvPicPr>
-          <p:nvPr/>
-        </p:nvPicPr>
-        <p:blipFill>
-          <a:blip r:embed="rId2"/>
-          <a:stretch>
-            <a:fillRect/>
-          </a:stretch>
-        </p:blipFill>
-        <p:spPr>
-          <a:xfrm>
-            <a:off x="780365" y="1666130"/>
-            <a:ext cx="10458450" cy="1057275"/>
-          </a:xfrm>
-          <a:prstGeom prst="rect">
-            <a:avLst/>
-          </a:prstGeom>
-        </p:spPr>
-      </p:pic>
-      <p:sp>
-        <p:nvSpPr>
-          <p:cNvPr id="8" name="文本框 7"/>
-          <p:cNvSpPr txBox="1"/>
-          <p:nvPr/>
-        </p:nvSpPr>
-        <p:spPr>
-          <a:xfrm>
-            <a:off x="892934" y="2723405"/>
-            <a:ext cx="4649273" cy="477054"/>
-          </a:xfrm>
-          <a:prstGeom prst="rect">
-            <a:avLst/>
-          </a:prstGeom>
-          <a:noFill/>
-        </p:spPr>
-        <p:txBody>
-          <a:bodyPr wrap="square" rtlCol="0">
-            <a:spAutoFit/>
-          </a:bodyPr>
-          <a:lstStyle/>
-          <a:p>
-            <a:r>
-              <a:rPr lang="zh-CN" altLang="en-US" sz="2500" dirty="0" smtClean="0"/>
-              <a:t>重制界面组件</a:t>
-            </a:r>
-            <a:endParaRPr lang="en-US" altLang="zh-CN" sz="2500" dirty="0" smtClean="0"/>
-          </a:p>
-        </p:txBody>
-      </p:sp>
-      <p:pic>
-        <p:nvPicPr>
-          <p:cNvPr id="9" name="图片 8"/>
-          <p:cNvPicPr>
-            <a:picLocks noChangeAspect="1"/>
-          </p:cNvPicPr>
-          <p:nvPr/>
-        </p:nvPicPr>
-        <p:blipFill>
-          <a:blip r:embed="rId3"/>
-          <a:stretch>
-            <a:fillRect/>
-          </a:stretch>
-        </p:blipFill>
-        <p:spPr>
-          <a:xfrm>
-            <a:off x="1010823" y="3200458"/>
-            <a:ext cx="2200275" cy="3290493"/>
-          </a:xfrm>
-          <a:prstGeom prst="rect">
-            <a:avLst/>
-          </a:prstGeom>
-        </p:spPr>
-      </p:pic>
-      <p:sp>
-        <p:nvSpPr>
-          <p:cNvPr id="12" name="文本框 11"/>
-          <p:cNvSpPr txBox="1"/>
-          <p:nvPr/>
-        </p:nvSpPr>
-        <p:spPr>
-          <a:xfrm>
-            <a:off x="3584620" y="2707517"/>
-            <a:ext cx="3348507" cy="477054"/>
-          </a:xfrm>
-          <a:prstGeom prst="rect">
-            <a:avLst/>
-          </a:prstGeom>
-          <a:noFill/>
-        </p:spPr>
-        <p:txBody>
-          <a:bodyPr wrap="square" rtlCol="0">
-            <a:spAutoFit/>
-          </a:bodyPr>
-          <a:lstStyle/>
-          <a:p>
-            <a:r>
-              <a:rPr lang="zh-CN" altLang="en-US" sz="2500" dirty="0" smtClean="0"/>
-              <a:t>反射运用</a:t>
-            </a:r>
-            <a:endParaRPr lang="zh-CN" altLang="en-US" sz="2500" dirty="0"/>
-          </a:p>
-        </p:txBody>
-      </p:sp>
-      <p:pic>
-        <p:nvPicPr>
-          <p:cNvPr id="13" name="图片 12"/>
-          <p:cNvPicPr>
-            <a:picLocks noChangeAspect="1"/>
-          </p:cNvPicPr>
-          <p:nvPr/>
-        </p:nvPicPr>
-        <p:blipFill>
-          <a:blip r:embed="rId4"/>
-          <a:stretch>
-            <a:fillRect/>
-          </a:stretch>
-        </p:blipFill>
-        <p:spPr>
-          <a:xfrm>
-            <a:off x="3328987" y="3184571"/>
-            <a:ext cx="7972425" cy="3562350"/>
-          </a:xfrm>
-          <a:prstGeom prst="rect">
-            <a:avLst/>
-          </a:prstGeom>
-        </p:spPr>
-      </p:pic>
     </p:spTree>
   </p:cSld>
   <p:clrMapOvr>
@@ -32132,7 +31957,7 @@
           <p:nvPr/>
         </p:nvPicPr>
         <p:blipFill>
-          <a:blip r:embed="rId2">
+          <a:blip r:embed="rId1">
             <a:extLst>
               <a:ext uri="{28A0092B-C50C-407E-A947-70E740481C1C}">
                 <a14:useLocalDpi xmlns:a14="http://schemas.microsoft.com/office/drawing/2010/main" val="0"/>
@@ -32214,7 +32039,7 @@
           <p:nvPr/>
         </p:nvPicPr>
         <p:blipFill>
-          <a:blip r:embed="rId2">
+          <a:blip r:embed="rId1">
             <a:extLst>
               <a:ext uri="{28A0092B-C50C-407E-A947-70E740481C1C}">
                 <a14:useLocalDpi xmlns:a14="http://schemas.microsoft.com/office/drawing/2010/main" val="0"/>
@@ -32320,7 +32145,7 @@
           <p:nvPr/>
         </p:nvPicPr>
         <p:blipFill>
-          <a:blip r:embed="rId2">
+          <a:blip r:embed="rId1">
             <a:extLst>
               <a:ext uri="{28A0092B-C50C-407E-A947-70E740481C1C}">
                 <a14:useLocalDpi xmlns:a14="http://schemas.microsoft.com/office/drawing/2010/main" val="0"/>

</xml_diff>